<commit_message>
updated slides for LED wiring and pull-ups
</commit_message>
<xml_diff>
--- a/y-hack-Sunnyvale-2013-workshop.pptx
+++ b/y-hack-Sunnyvale-2013-workshop.pptx
@@ -5,10 +5,10 @@
     <p:sldMasterId id="2147483648" r:id="rId1"/>
   </p:sldMasterIdLst>
   <p:notesMasterIdLst>
-    <p:notesMasterId r:id="rId17"/>
+    <p:notesMasterId r:id="rId18"/>
   </p:notesMasterIdLst>
   <p:handoutMasterIdLst>
-    <p:handoutMasterId r:id="rId18"/>
+    <p:handoutMasterId r:id="rId19"/>
   </p:handoutMasterIdLst>
   <p:sldIdLst>
     <p:sldId id="258" r:id="rId2"/>
@@ -19,13 +19,14 @@
     <p:sldId id="274" r:id="rId7"/>
     <p:sldId id="275" r:id="rId8"/>
     <p:sldId id="276" r:id="rId9"/>
-    <p:sldId id="263" r:id="rId10"/>
-    <p:sldId id="271" r:id="rId11"/>
-    <p:sldId id="273" r:id="rId12"/>
-    <p:sldId id="264" r:id="rId13"/>
-    <p:sldId id="267" r:id="rId14"/>
-    <p:sldId id="269" r:id="rId15"/>
-    <p:sldId id="265" r:id="rId16"/>
+    <p:sldId id="277" r:id="rId10"/>
+    <p:sldId id="263" r:id="rId11"/>
+    <p:sldId id="271" r:id="rId12"/>
+    <p:sldId id="273" r:id="rId13"/>
+    <p:sldId id="264" r:id="rId14"/>
+    <p:sldId id="267" r:id="rId15"/>
+    <p:sldId id="269" r:id="rId16"/>
+    <p:sldId id="265" r:id="rId17"/>
   </p:sldIdLst>
   <p:sldSz cx="14630400" cy="8229600"/>
   <p:notesSz cx="6858000" cy="9144000"/>
@@ -3249,118 +3250,7 @@
             <a:spLocks noGrp="1"/>
           </p:cNvSpPr>
           <p:nvPr>
-            <p:ph type="title"/>
-          </p:nvPr>
-        </p:nvSpPr>
-        <p:spPr/>
-        <p:txBody>
-          <a:bodyPr>
-            <a:normAutofit fontScale="90000"/>
-          </a:bodyPr>
-          <a:lstStyle/>
-          <a:p>
-            <a:r>
-              <a:rPr lang="en" dirty="0"/>
-              <a:t>Pulse-width Modulation</a:t>
-            </a:r>
-            <a:endParaRPr lang="en-US" dirty="0"/>
-          </a:p>
-        </p:txBody>
-      </p:sp>
-      <p:sp>
-        <p:nvSpPr>
-          <p:cNvPr id="3" name="Content Placeholder 2"/>
-          <p:cNvSpPr>
-            <a:spLocks noGrp="1"/>
-          </p:cNvSpPr>
-          <p:nvPr>
-            <p:ph idx="1"/>
-          </p:nvPr>
-        </p:nvSpPr>
-        <p:spPr/>
-        <p:txBody>
-          <a:bodyPr>
-            <a:normAutofit fontScale="92500" lnSpcReduction="20000"/>
-          </a:bodyPr>
-          <a:lstStyle/>
-          <a:p>
-            <a:pPr marL="457200" lvl="0" indent="-419100">
-              <a:buClr>
-                <a:schemeClr val="dk1"/>
-              </a:buClr>
-              <a:buSzPct val="166666"/>
-              <a:buFont typeface="Arial"/>
-              <a:buChar char="•"/>
-            </a:pPr>
-            <a:r>
-              <a:rPr lang="en" dirty="0"/>
-              <a:t>Microcontrollers can only output 0 or 1</a:t>
-            </a:r>
-          </a:p>
-          <a:p>
-            <a:endParaRPr lang="en" dirty="0"/>
-          </a:p>
-          <a:p>
-            <a:pPr marL="457200" lvl="0" indent="-419100">
-              <a:buClr>
-                <a:schemeClr val="dk1"/>
-              </a:buClr>
-              <a:buSzPct val="166666"/>
-              <a:buFont typeface="Arial"/>
-              <a:buChar char="•"/>
-            </a:pPr>
-            <a:r>
-              <a:rPr lang="en" dirty="0"/>
-              <a:t>By toggling the pin “on” 50% of the time, we can reduce the total power output to 50%</a:t>
-            </a:r>
-          </a:p>
-          <a:p>
-            <a:endParaRPr lang="en" dirty="0"/>
-          </a:p>
-          <a:p>
-            <a:pPr marL="457200" lvl="0" indent="-419100">
-              <a:buClr>
-                <a:schemeClr val="dk1"/>
-              </a:buClr>
-              <a:buSzPct val="166666"/>
-              <a:buFont typeface="Arial"/>
-              <a:buChar char="•"/>
-            </a:pPr>
-            <a:r>
-              <a:rPr lang="en" dirty="0"/>
-              <a:t>By varying the % of time the pin is on, we can simulate analog output</a:t>
-            </a:r>
-          </a:p>
-          <a:p>
-            <a:endParaRPr lang="en" dirty="0"/>
-          </a:p>
-          <a:p>
-            <a:pPr marL="457200" lvl="0" indent="-419100">
-              <a:buClr>
-                <a:schemeClr val="dk1"/>
-              </a:buClr>
-              <a:buSzPct val="166666"/>
-              <a:buFont typeface="Arial"/>
-              <a:buChar char="•"/>
-            </a:pPr>
-            <a:r>
-              <a:rPr lang="en" dirty="0"/>
-              <a:t>For a cleaner signal, the PWM output can be passed thru a RC filter circuit</a:t>
-            </a:r>
-          </a:p>
-          <a:p>
-            <a:endParaRPr lang="en-US" dirty="0"/>
-          </a:p>
-        </p:txBody>
-      </p:sp>
-      <p:sp>
-        <p:nvSpPr>
-          <p:cNvPr id="4" name="Slide Number Placeholder 3"/>
-          <p:cNvSpPr>
-            <a:spLocks noGrp="1"/>
-          </p:cNvSpPr>
-          <p:nvPr>
-            <p:ph type="sldNum" sz="quarter" idx="12"/>
+            <p:ph type="ctrTitle"/>
           </p:nvPr>
         </p:nvSpPr>
         <p:spPr/>
@@ -3368,18 +3258,41 @@
           <a:bodyPr/>
           <a:lstStyle/>
           <a:p>
-            <a:fld id="{B2ACCBA8-5022-9E46-8DEA-AF9CA5E1705D}" type="slidenum">
-              <a:rPr lang="en-US" smtClean="0"/>
-              <a:t>10</a:t>
-            </a:fld>
-            <a:endParaRPr lang="en-US"/>
+            <a:r>
+              <a:rPr lang="en-US" dirty="0" smtClean="0"/>
+              <a:t>Fading Lights</a:t>
+            </a:r>
+            <a:endParaRPr lang="en-US" dirty="0"/>
+          </a:p>
+        </p:txBody>
+      </p:sp>
+      <p:sp>
+        <p:nvSpPr>
+          <p:cNvPr id="3" name="Subtitle 2"/>
+          <p:cNvSpPr>
+            <a:spLocks noGrp="1"/>
+          </p:cNvSpPr>
+          <p:nvPr>
+            <p:ph type="subTitle" idx="1"/>
+          </p:nvPr>
+        </p:nvSpPr>
+        <p:spPr/>
+        <p:txBody>
+          <a:bodyPr/>
+          <a:lstStyle/>
+          <a:p>
+            <a:r>
+              <a:rPr lang="en-US" dirty="0" smtClean="0"/>
+              <a:t>Changing the brightness of the LED</a:t>
+            </a:r>
+            <a:endParaRPr lang="en-US" dirty="0"/>
           </a:p>
         </p:txBody>
       </p:sp>
     </p:spTree>
     <p:extLst>
       <p:ext uri="{BB962C8B-B14F-4D97-AF65-F5344CB8AC3E}">
-        <p14:creationId xmlns:p14="http://schemas.microsoft.com/office/powerpoint/2010/main" val="2949335602"/>
+        <p14:creationId xmlns:p14="http://schemas.microsoft.com/office/powerpoint/2010/main" val="1411645589"/>
       </p:ext>
     </p:extLst>
   </p:cSld>
@@ -3433,6 +3346,92 @@
       </p:sp>
       <p:sp>
         <p:nvSpPr>
+          <p:cNvPr id="3" name="Content Placeholder 2"/>
+          <p:cNvSpPr>
+            <a:spLocks noGrp="1"/>
+          </p:cNvSpPr>
+          <p:nvPr>
+            <p:ph idx="1"/>
+          </p:nvPr>
+        </p:nvSpPr>
+        <p:spPr/>
+        <p:txBody>
+          <a:bodyPr>
+            <a:normAutofit fontScale="92500" lnSpcReduction="20000"/>
+          </a:bodyPr>
+          <a:lstStyle/>
+          <a:p>
+            <a:pPr marL="457200" lvl="0" indent="-419100">
+              <a:buClr>
+                <a:schemeClr val="dk1"/>
+              </a:buClr>
+              <a:buSzPct val="166666"/>
+              <a:buFont typeface="Arial"/>
+              <a:buChar char="•"/>
+            </a:pPr>
+            <a:r>
+              <a:rPr lang="en" dirty="0"/>
+              <a:t>Microcontrollers can only output 0 or 1</a:t>
+            </a:r>
+          </a:p>
+          <a:p>
+            <a:endParaRPr lang="en" dirty="0"/>
+          </a:p>
+          <a:p>
+            <a:pPr marL="457200" lvl="0" indent="-419100">
+              <a:buClr>
+                <a:schemeClr val="dk1"/>
+              </a:buClr>
+              <a:buSzPct val="166666"/>
+              <a:buFont typeface="Arial"/>
+              <a:buChar char="•"/>
+            </a:pPr>
+            <a:r>
+              <a:rPr lang="en" dirty="0"/>
+              <a:t>By toggling the pin “on” 50% of the time, we can reduce the total power output to 50%</a:t>
+            </a:r>
+          </a:p>
+          <a:p>
+            <a:endParaRPr lang="en" dirty="0"/>
+          </a:p>
+          <a:p>
+            <a:pPr marL="457200" lvl="0" indent="-419100">
+              <a:buClr>
+                <a:schemeClr val="dk1"/>
+              </a:buClr>
+              <a:buSzPct val="166666"/>
+              <a:buFont typeface="Arial"/>
+              <a:buChar char="•"/>
+            </a:pPr>
+            <a:r>
+              <a:rPr lang="en" dirty="0"/>
+              <a:t>By varying the % of time the pin is on, we can simulate analog output</a:t>
+            </a:r>
+          </a:p>
+          <a:p>
+            <a:endParaRPr lang="en" dirty="0"/>
+          </a:p>
+          <a:p>
+            <a:pPr marL="457200" lvl="0" indent="-419100">
+              <a:buClr>
+                <a:schemeClr val="dk1"/>
+              </a:buClr>
+              <a:buSzPct val="166666"/>
+              <a:buFont typeface="Arial"/>
+              <a:buChar char="•"/>
+            </a:pPr>
+            <a:r>
+              <a:rPr lang="en" dirty="0"/>
+              <a:t>For a cleaner signal, the PWM output can be passed thru a RC filter circuit</a:t>
+            </a:r>
+          </a:p>
+          <a:p>
+            <a:endParaRPr lang="en-US" dirty="0"/>
+          </a:p>
+        </p:txBody>
+      </p:sp>
+      <p:sp>
+        <p:nvSpPr>
           <p:cNvPr id="4" name="Slide Number Placeholder 3"/>
           <p:cNvSpPr>
             <a:spLocks noGrp="1"/>
@@ -3454,35 +3453,10 @@
           </a:p>
         </p:txBody>
       </p:sp>
-      <p:sp>
-        <p:nvSpPr>
-          <p:cNvPr id="6" name="Shape 102"/>
-          <p:cNvSpPr/>
-          <p:nvPr/>
-        </p:nvSpPr>
-        <p:spPr>
-          <a:xfrm>
-            <a:off x="2694716" y="1617645"/>
-            <a:ext cx="9279867" cy="5064054"/>
-          </a:xfrm>
-          <a:prstGeom prst="rect">
-            <a:avLst/>
-          </a:prstGeom>
-          <a:blipFill>
-            <a:blip r:embed="rId2"/>
-            <a:stretch>
-              <a:fillRect/>
-            </a:stretch>
-          </a:blipFill>
-          <a:ln>
-            <a:noFill/>
-          </a:ln>
-        </p:spPr>
-      </p:sp>
     </p:spTree>
     <p:extLst>
       <p:ext uri="{BB962C8B-B14F-4D97-AF65-F5344CB8AC3E}">
-        <p14:creationId xmlns:p14="http://schemas.microsoft.com/office/powerpoint/2010/main" val="2672700463"/>
+        <p14:creationId xmlns:p14="http://schemas.microsoft.com/office/powerpoint/2010/main" val="2949335602"/>
       </p:ext>
     </p:extLst>
   </p:cSld>
@@ -3516,7 +3490,32 @@
             <a:spLocks noGrp="1"/>
           </p:cNvSpPr>
           <p:nvPr>
-            <p:ph type="ctrTitle"/>
+            <p:ph type="title"/>
+          </p:nvPr>
+        </p:nvSpPr>
+        <p:spPr/>
+        <p:txBody>
+          <a:bodyPr>
+            <a:normAutofit fontScale="90000"/>
+          </a:bodyPr>
+          <a:lstStyle/>
+          <a:p>
+            <a:r>
+              <a:rPr lang="en" dirty="0"/>
+              <a:t>Pulse-width Modulation</a:t>
+            </a:r>
+            <a:endParaRPr lang="en-US" dirty="0"/>
+          </a:p>
+        </p:txBody>
+      </p:sp>
+      <p:sp>
+        <p:nvSpPr>
+          <p:cNvPr id="4" name="Slide Number Placeholder 3"/>
+          <p:cNvSpPr>
+            <a:spLocks noGrp="1"/>
+          </p:cNvSpPr>
+          <p:nvPr>
+            <p:ph type="sldNum" sz="quarter" idx="12"/>
           </p:nvPr>
         </p:nvSpPr>
         <p:spPr/>
@@ -3524,41 +3523,43 @@
           <a:bodyPr/>
           <a:lstStyle/>
           <a:p>
-            <a:r>
-              <a:rPr lang="en-US" dirty="0" smtClean="0"/>
-              <a:t>Making Noise</a:t>
-            </a:r>
-            <a:endParaRPr lang="en-US" dirty="0"/>
-          </a:p>
-        </p:txBody>
-      </p:sp>
-      <p:sp>
-        <p:nvSpPr>
-          <p:cNvPr id="3" name="Subtitle 2"/>
-          <p:cNvSpPr>
-            <a:spLocks noGrp="1"/>
-          </p:cNvSpPr>
-          <p:nvPr>
-            <p:ph type="subTitle" idx="1"/>
-          </p:nvPr>
-        </p:nvSpPr>
-        <p:spPr/>
-        <p:txBody>
-          <a:bodyPr/>
-          <a:lstStyle/>
-          <a:p>
-            <a:r>
-              <a:rPr lang="en-US" dirty="0" smtClean="0"/>
-              <a:t>Generating Sound</a:t>
-            </a:r>
-            <a:endParaRPr lang="en-US" dirty="0"/>
-          </a:p>
-        </p:txBody>
+            <a:fld id="{B2ACCBA8-5022-9E46-8DEA-AF9CA5E1705D}" type="slidenum">
+              <a:rPr lang="en-US" smtClean="0"/>
+              <a:t>12</a:t>
+            </a:fld>
+            <a:endParaRPr lang="en-US"/>
+          </a:p>
+        </p:txBody>
+      </p:sp>
+      <p:sp>
+        <p:nvSpPr>
+          <p:cNvPr id="6" name="Shape 102"/>
+          <p:cNvSpPr/>
+          <p:nvPr/>
+        </p:nvSpPr>
+        <p:spPr>
+          <a:xfrm>
+            <a:off x="2694716" y="1617645"/>
+            <a:ext cx="9279867" cy="5064054"/>
+          </a:xfrm>
+          <a:prstGeom prst="rect">
+            <a:avLst/>
+          </a:prstGeom>
+          <a:blipFill>
+            <a:blip r:embed="rId2"/>
+            <a:stretch>
+              <a:fillRect/>
+            </a:stretch>
+          </a:blipFill>
+          <a:ln>
+            <a:noFill/>
+          </a:ln>
+        </p:spPr>
       </p:sp>
     </p:spTree>
     <p:extLst>
       <p:ext uri="{BB962C8B-B14F-4D97-AF65-F5344CB8AC3E}">
-        <p14:creationId xmlns:p14="http://schemas.microsoft.com/office/powerpoint/2010/main" val="2354486593"/>
+        <p14:creationId xmlns:p14="http://schemas.microsoft.com/office/powerpoint/2010/main" val="2672700463"/>
       </p:ext>
     </p:extLst>
   </p:cSld>
@@ -3602,7 +3603,7 @@
           <a:p>
             <a:r>
               <a:rPr lang="en-US" dirty="0" smtClean="0"/>
-              <a:t>Sensing Light</a:t>
+              <a:t>Making Noise</a:t>
             </a:r>
             <a:endParaRPr lang="en-US" dirty="0"/>
           </a:p>
@@ -3625,7 +3626,7 @@
           <a:p>
             <a:r>
               <a:rPr lang="en-US" dirty="0" smtClean="0"/>
-              <a:t>Responding to ambient light</a:t>
+              <a:t>Generating Sound</a:t>
             </a:r>
             <a:endParaRPr lang="en-US" dirty="0"/>
           </a:p>
@@ -3634,7 +3635,7 @@
     </p:spTree>
     <p:extLst>
       <p:ext uri="{BB962C8B-B14F-4D97-AF65-F5344CB8AC3E}">
-        <p14:creationId xmlns:p14="http://schemas.microsoft.com/office/powerpoint/2010/main" val="1454269794"/>
+        <p14:creationId xmlns:p14="http://schemas.microsoft.com/office/powerpoint/2010/main" val="2354486593"/>
       </p:ext>
     </p:extLst>
   </p:cSld>
@@ -3668,32 +3669,7 @@
             <a:spLocks noGrp="1"/>
           </p:cNvSpPr>
           <p:nvPr>
-            <p:ph type="title"/>
-          </p:nvPr>
-        </p:nvSpPr>
-        <p:spPr/>
-        <p:txBody>
-          <a:bodyPr>
-            <a:normAutofit fontScale="90000"/>
-          </a:bodyPr>
-          <a:lstStyle/>
-          <a:p>
-            <a:r>
-              <a:rPr lang="en-US" dirty="0" smtClean="0"/>
-              <a:t>More…</a:t>
-            </a:r>
-            <a:endParaRPr lang="en-US" dirty="0"/>
-          </a:p>
-        </p:txBody>
-      </p:sp>
-      <p:sp>
-        <p:nvSpPr>
-          <p:cNvPr id="3" name="Content Placeholder 2"/>
-          <p:cNvSpPr>
-            <a:spLocks noGrp="1"/>
-          </p:cNvSpPr>
-          <p:nvPr>
-            <p:ph idx="1"/>
+            <p:ph type="ctrTitle"/>
           </p:nvPr>
         </p:nvSpPr>
         <p:spPr/>
@@ -3701,33 +3677,9 @@
           <a:bodyPr/>
           <a:lstStyle/>
           <a:p>
-            <a:pPr marL="571500" indent="-571500">
-              <a:buFont typeface="Arial"/>
-              <a:buChar char="•"/>
-            </a:pPr>
             <a:r>
               <a:rPr lang="en-US" dirty="0" smtClean="0"/>
-              <a:t>Slide Switch (Pin D2)</a:t>
-            </a:r>
-          </a:p>
-          <a:p>
-            <a:pPr marL="571500" indent="-571500">
-              <a:buFont typeface="Arial"/>
-              <a:buChar char="•"/>
-            </a:pPr>
-            <a:r>
-              <a:rPr lang="en-US" dirty="0" smtClean="0"/>
-              <a:t>Temperature sensor (Pin A1)</a:t>
-            </a:r>
-          </a:p>
-          <a:p>
-            <a:pPr marL="571500" indent="-571500">
-              <a:buFont typeface="Arial"/>
-              <a:buChar char="•"/>
-            </a:pPr>
-            <a:r>
-              <a:rPr lang="en-US" dirty="0" smtClean="0"/>
-              <a:t>Vibe Board (Pin 3)</a:t>
+              <a:t>Sensing Light</a:t>
             </a:r>
             <a:endParaRPr lang="en-US" dirty="0"/>
           </a:p>
@@ -3735,12 +3687,12 @@
       </p:sp>
       <p:sp>
         <p:nvSpPr>
-          <p:cNvPr id="4" name="Slide Number Placeholder 3"/>
-          <p:cNvSpPr>
-            <a:spLocks noGrp="1"/>
-          </p:cNvSpPr>
-          <p:nvPr>
-            <p:ph type="sldNum" sz="quarter" idx="12"/>
+          <p:cNvPr id="3" name="Subtitle 2"/>
+          <p:cNvSpPr>
+            <a:spLocks noGrp="1"/>
+          </p:cNvSpPr>
+          <p:nvPr>
+            <p:ph type="subTitle" idx="1"/>
           </p:nvPr>
         </p:nvSpPr>
         <p:spPr/>
@@ -3748,18 +3700,18 @@
           <a:bodyPr/>
           <a:lstStyle/>
           <a:p>
-            <a:fld id="{B2ACCBA8-5022-9E46-8DEA-AF9CA5E1705D}" type="slidenum">
-              <a:rPr lang="en-US" smtClean="0"/>
-              <a:t>14</a:t>
-            </a:fld>
-            <a:endParaRPr lang="en-US"/>
+            <a:r>
+              <a:rPr lang="en-US" dirty="0" smtClean="0"/>
+              <a:t>Responding to ambient light</a:t>
+            </a:r>
+            <a:endParaRPr lang="en-US" dirty="0"/>
           </a:p>
         </p:txBody>
       </p:sp>
     </p:spTree>
     <p:extLst>
       <p:ext uri="{BB962C8B-B14F-4D97-AF65-F5344CB8AC3E}">
-        <p14:creationId xmlns:p14="http://schemas.microsoft.com/office/powerpoint/2010/main" val="1177392317"/>
+        <p14:creationId xmlns:p14="http://schemas.microsoft.com/office/powerpoint/2010/main" val="1454269794"/>
       </p:ext>
     </p:extLst>
   </p:cSld>
@@ -3805,6 +3757,131 @@
           <a:p>
             <a:r>
               <a:rPr lang="en-US" dirty="0" smtClean="0"/>
+              <a:t>More…</a:t>
+            </a:r>
+            <a:endParaRPr lang="en-US" dirty="0"/>
+          </a:p>
+        </p:txBody>
+      </p:sp>
+      <p:sp>
+        <p:nvSpPr>
+          <p:cNvPr id="3" name="Content Placeholder 2"/>
+          <p:cNvSpPr>
+            <a:spLocks noGrp="1"/>
+          </p:cNvSpPr>
+          <p:nvPr>
+            <p:ph idx="1"/>
+          </p:nvPr>
+        </p:nvSpPr>
+        <p:spPr/>
+        <p:txBody>
+          <a:bodyPr/>
+          <a:lstStyle/>
+          <a:p>
+            <a:pPr marL="571500" indent="-571500">
+              <a:buFont typeface="Arial"/>
+              <a:buChar char="•"/>
+            </a:pPr>
+            <a:r>
+              <a:rPr lang="en-US" dirty="0" smtClean="0"/>
+              <a:t>Slide Switch (Pin D2)</a:t>
+            </a:r>
+          </a:p>
+          <a:p>
+            <a:pPr marL="571500" indent="-571500">
+              <a:buFont typeface="Arial"/>
+              <a:buChar char="•"/>
+            </a:pPr>
+            <a:r>
+              <a:rPr lang="en-US" dirty="0" smtClean="0"/>
+              <a:t>Temperature sensor (Pin A1)</a:t>
+            </a:r>
+          </a:p>
+          <a:p>
+            <a:pPr marL="571500" indent="-571500">
+              <a:buFont typeface="Arial"/>
+              <a:buChar char="•"/>
+            </a:pPr>
+            <a:r>
+              <a:rPr lang="en-US" dirty="0" smtClean="0"/>
+              <a:t>Vibe Board (Pin 3)</a:t>
+            </a:r>
+            <a:endParaRPr lang="en-US" dirty="0"/>
+          </a:p>
+        </p:txBody>
+      </p:sp>
+      <p:sp>
+        <p:nvSpPr>
+          <p:cNvPr id="4" name="Slide Number Placeholder 3"/>
+          <p:cNvSpPr>
+            <a:spLocks noGrp="1"/>
+          </p:cNvSpPr>
+          <p:nvPr>
+            <p:ph type="sldNum" sz="quarter" idx="12"/>
+          </p:nvPr>
+        </p:nvSpPr>
+        <p:spPr/>
+        <p:txBody>
+          <a:bodyPr/>
+          <a:lstStyle/>
+          <a:p>
+            <a:fld id="{B2ACCBA8-5022-9E46-8DEA-AF9CA5E1705D}" type="slidenum">
+              <a:rPr lang="en-US" smtClean="0"/>
+              <a:t>15</a:t>
+            </a:fld>
+            <a:endParaRPr lang="en-US"/>
+          </a:p>
+        </p:txBody>
+      </p:sp>
+    </p:spTree>
+    <p:extLst>
+      <p:ext uri="{BB962C8B-B14F-4D97-AF65-F5344CB8AC3E}">
+        <p14:creationId xmlns:p14="http://schemas.microsoft.com/office/powerpoint/2010/main" val="1177392317"/>
+      </p:ext>
+    </p:extLst>
+  </p:cSld>
+  <p:clrMapOvr>
+    <a:masterClrMapping/>
+  </p:clrMapOvr>
+</p:sld>
+</file>
+
+<file path=ppt/slides/slide16.xml><?xml version="1.0" encoding="utf-8"?>
+<p:sld xmlns:a="http://schemas.openxmlformats.org/drawingml/2006/main" xmlns:r="http://schemas.openxmlformats.org/officeDocument/2006/relationships" xmlns:p="http://schemas.openxmlformats.org/presentationml/2006/main">
+  <p:cSld>
+    <p:spTree>
+      <p:nvGrpSpPr>
+        <p:cNvPr id="1" name=""/>
+        <p:cNvGrpSpPr/>
+        <p:nvPr/>
+      </p:nvGrpSpPr>
+      <p:grpSpPr>
+        <a:xfrm>
+          <a:off x="0" y="0"/>
+          <a:ext cx="0" cy="0"/>
+          <a:chOff x="0" y="0"/>
+          <a:chExt cx="0" cy="0"/>
+        </a:xfrm>
+      </p:grpSpPr>
+      <p:sp>
+        <p:nvSpPr>
+          <p:cNvPr id="2" name="Title 1"/>
+          <p:cNvSpPr>
+            <a:spLocks noGrp="1"/>
+          </p:cNvSpPr>
+          <p:nvPr>
+            <p:ph type="title"/>
+          </p:nvPr>
+        </p:nvSpPr>
+        <p:spPr/>
+        <p:txBody>
+          <a:bodyPr>
+            <a:normAutofit fontScale="90000"/>
+          </a:bodyPr>
+          <a:lstStyle/>
+          <a:p>
+            <a:r>
+              <a:rPr lang="en-US" dirty="0" smtClean="0"/>
               <a:t>Resources</a:t>
             </a:r>
             <a:endParaRPr lang="en-US" dirty="0"/>
@@ -4101,7 +4178,6 @@
                 <a:solidFill>
                   <a:schemeClr val="hlink"/>
                 </a:solidFill>
-                <a:hlinkClick r:id="rId9"/>
               </a:rPr>
               <a:t>http</a:t>
             </a:r>
@@ -4110,12 +4186,28 @@
                 <a:solidFill>
                   <a:schemeClr val="hlink"/>
                 </a:solidFill>
-                <a:hlinkClick r:id="rId9"/>
-              </a:rPr>
-              <a:t>://www.protostack.com/blog/2011/06/atmega168a-pulse-width-modulation-pwm/</a:t>
-            </a:r>
-          </a:p>
-          <a:p>
+              </a:rPr>
+              <a:t>://www.protostack.com/blog/2011/06/atmega168a-pulse-width-modulation-pwm</a:t>
+            </a:r>
+            <a:r>
+              <a:rPr lang="en" sz="1400" u="sng" dirty="0" smtClean="0">
+                <a:solidFill>
+                  <a:schemeClr val="hlink"/>
+                </a:solidFill>
+              </a:rPr>
+              <a:t>/</a:t>
+            </a:r>
+            <a:endParaRPr lang="en-US" sz="1400" u="sng" dirty="0" smtClean="0">
+              <a:solidFill>
+                <a:schemeClr val="hlink"/>
+              </a:solidFill>
+            </a:endParaRPr>
+          </a:p>
+          <a:p>
+            <a:r>
+              <a:rPr lang="en-US" sz="1400" b="1" dirty="0" smtClean="0"/>
+              <a:t>Pull-ups and pull-downs</a:t>
+            </a:r>
             <a:endParaRPr lang="en" sz="1400" u="sng" dirty="0">
               <a:solidFill>
                 <a:schemeClr val="hlink"/>
@@ -4124,6 +4216,18 @@
             </a:endParaRPr>
           </a:p>
           <a:p>
+            <a:pPr marL="285750" lvl="0" indent="-285750">
+              <a:buFont typeface="Arial"/>
+              <a:buChar char="•"/>
+            </a:pPr>
+            <a:r>
+              <a:rPr lang="en" sz="1400" u="sng">
+                <a:solidFill>
+                  <a:schemeClr val="hlink"/>
+                </a:solidFill>
+              </a:rPr>
+              <a:t>https://learn.sparkfun.com/tutorials/pull-up-resistors</a:t>
+            </a:r>
             <a:endParaRPr lang="en" sz="1400" u="sng" dirty="0">
               <a:solidFill>
                 <a:schemeClr val="hlink"/>
@@ -4132,14 +4236,6 @@
             </a:endParaRPr>
           </a:p>
           <a:p>
-            <a:endParaRPr lang="en" sz="1400" u="sng" dirty="0">
-              <a:solidFill>
-                <a:schemeClr val="hlink"/>
-              </a:solidFill>
-              <a:hlinkClick r:id="rId9"/>
-            </a:endParaRPr>
-          </a:p>
-          <a:p>
             <a:pPr lvl="1"/>
             <a:endParaRPr lang="en-US" sz="1400" dirty="0" smtClean="0"/>
           </a:p>
@@ -4165,7 +4261,7 @@
           <a:p>
             <a:fld id="{B2ACCBA8-5022-9E46-8DEA-AF9CA5E1705D}" type="slidenum">
               <a:rPr lang="en-US" smtClean="0"/>
-              <a:t>15</a:t>
+              <a:t>16</a:t>
             </a:fld>
             <a:endParaRPr lang="en-US"/>
           </a:p>
@@ -6208,7 +6304,32 @@
             <a:spLocks noGrp="1"/>
           </p:cNvSpPr>
           <p:nvPr>
-            <p:ph type="ctrTitle"/>
+            <p:ph type="title"/>
+          </p:nvPr>
+        </p:nvSpPr>
+        <p:spPr/>
+        <p:txBody>
+          <a:bodyPr>
+            <a:normAutofit fontScale="90000"/>
+          </a:bodyPr>
+          <a:lstStyle/>
+          <a:p>
+            <a:r>
+              <a:rPr lang="en-US" dirty="0" smtClean="0"/>
+              <a:t>Pull-Up and Pull-Down Resistor</a:t>
+            </a:r>
+            <a:endParaRPr lang="en-US" dirty="0"/>
+          </a:p>
+        </p:txBody>
+      </p:sp>
+      <p:sp>
+        <p:nvSpPr>
+          <p:cNvPr id="3" name="Content Placeholder 2"/>
+          <p:cNvSpPr>
+            <a:spLocks noGrp="1"/>
+          </p:cNvSpPr>
+          <p:nvPr>
+            <p:ph idx="1"/>
           </p:nvPr>
         </p:nvSpPr>
         <p:spPr/>
@@ -6216,22 +6337,18 @@
           <a:bodyPr/>
           <a:lstStyle/>
           <a:p>
-            <a:r>
-              <a:rPr lang="en-US" dirty="0" smtClean="0"/>
-              <a:t>Fading Lights</a:t>
-            </a:r>
             <a:endParaRPr lang="en-US" dirty="0"/>
           </a:p>
         </p:txBody>
       </p:sp>
       <p:sp>
         <p:nvSpPr>
-          <p:cNvPr id="3" name="Subtitle 2"/>
-          <p:cNvSpPr>
-            <a:spLocks noGrp="1"/>
-          </p:cNvSpPr>
-          <p:nvPr>
-            <p:ph type="subTitle" idx="1"/>
+          <p:cNvPr id="4" name="Slide Number Placeholder 3"/>
+          <p:cNvSpPr>
+            <a:spLocks noGrp="1"/>
+          </p:cNvSpPr>
+          <p:nvPr>
+            <p:ph type="sldNum" sz="quarter" idx="12"/>
           </p:nvPr>
         </p:nvSpPr>
         <p:spPr/>
@@ -6239,18 +6356,18 @@
           <a:bodyPr/>
           <a:lstStyle/>
           <a:p>
-            <a:r>
-              <a:rPr lang="en-US" dirty="0" smtClean="0"/>
-              <a:t>Changing the brightness of the LED</a:t>
-            </a:r>
-            <a:endParaRPr lang="en-US" dirty="0"/>
+            <a:fld id="{B2ACCBA8-5022-9E46-8DEA-AF9CA5E1705D}" type="slidenum">
+              <a:rPr lang="en-US" smtClean="0"/>
+              <a:t>9</a:t>
+            </a:fld>
+            <a:endParaRPr lang="en-US"/>
           </a:p>
         </p:txBody>
       </p:sp>
     </p:spTree>
     <p:extLst>
       <p:ext uri="{BB962C8B-B14F-4D97-AF65-F5344CB8AC3E}">
-        <p14:creationId xmlns:p14="http://schemas.microsoft.com/office/powerpoint/2010/main" val="1411645589"/>
+        <p14:creationId xmlns:p14="http://schemas.microsoft.com/office/powerpoint/2010/main" val="542764799"/>
       </p:ext>
     </p:extLst>
   </p:cSld>

</xml_diff>

<commit_message>
updated resources and setup slide
</commit_message>
<xml_diff>
--- a/y-hack-Sunnyvale-2013-workshop.pptx
+++ b/y-hack-Sunnyvale-2013-workshop.pptx
@@ -5,30 +5,32 @@
     <p:sldMasterId id="2147483648" r:id="rId1"/>
   </p:sldMasterIdLst>
   <p:notesMasterIdLst>
-    <p:notesMasterId r:id="rId20"/>
+    <p:notesMasterId r:id="rId22"/>
   </p:notesMasterIdLst>
   <p:handoutMasterIdLst>
-    <p:handoutMasterId r:id="rId21"/>
+    <p:handoutMasterId r:id="rId23"/>
   </p:handoutMasterIdLst>
   <p:sldIdLst>
     <p:sldId id="278" r:id="rId2"/>
     <p:sldId id="258" r:id="rId3"/>
     <p:sldId id="260" r:id="rId4"/>
-    <p:sldId id="259" r:id="rId5"/>
-    <p:sldId id="279" r:id="rId6"/>
-    <p:sldId id="261" r:id="rId7"/>
-    <p:sldId id="262" r:id="rId8"/>
-    <p:sldId id="274" r:id="rId9"/>
-    <p:sldId id="275" r:id="rId10"/>
-    <p:sldId id="276" r:id="rId11"/>
-    <p:sldId id="277" r:id="rId12"/>
-    <p:sldId id="263" r:id="rId13"/>
-    <p:sldId id="271" r:id="rId14"/>
-    <p:sldId id="273" r:id="rId15"/>
-    <p:sldId id="264" r:id="rId16"/>
-    <p:sldId id="267" r:id="rId17"/>
-    <p:sldId id="269" r:id="rId18"/>
-    <p:sldId id="265" r:id="rId19"/>
+    <p:sldId id="280" r:id="rId5"/>
+    <p:sldId id="259" r:id="rId6"/>
+    <p:sldId id="279" r:id="rId7"/>
+    <p:sldId id="261" r:id="rId8"/>
+    <p:sldId id="262" r:id="rId9"/>
+    <p:sldId id="274" r:id="rId10"/>
+    <p:sldId id="275" r:id="rId11"/>
+    <p:sldId id="276" r:id="rId12"/>
+    <p:sldId id="277" r:id="rId13"/>
+    <p:sldId id="263" r:id="rId14"/>
+    <p:sldId id="271" r:id="rId15"/>
+    <p:sldId id="273" r:id="rId16"/>
+    <p:sldId id="264" r:id="rId17"/>
+    <p:sldId id="267" r:id="rId18"/>
+    <p:sldId id="269" r:id="rId19"/>
+    <p:sldId id="282" r:id="rId20"/>
+    <p:sldId id="281" r:id="rId21"/>
   </p:sldIdLst>
   <p:sldSz cx="14630400" cy="8229600"/>
   <p:notesSz cx="6858000" cy="9144000"/>
@@ -3335,1319 +3337,11 @@
           </a:bodyPr>
           <a:lstStyle/>
           <a:p>
-            <a:pPr lvl="0"/>
             <a:r>
               <a:rPr lang="en" dirty="0"/>
-              <a:t>Solution </a:t>
-            </a:r>
-            <a:r>
-              <a:rPr lang="en" sz="6000" dirty="0" smtClean="0"/>
-              <a:t>- </a:t>
-            </a:r>
-            <a:r>
-              <a:rPr lang="en" sz="6000" dirty="0"/>
-              <a:t>from </a:t>
-            </a:r>
-            <a:r>
-              <a:rPr lang="en" sz="6000" u="sng" dirty="0">
-                <a:solidFill>
-                  <a:schemeClr val="hlink"/>
-                </a:solidFill>
-                <a:hlinkClick r:id="rId2"/>
-              </a:rPr>
-              <a:t>Adafruit</a:t>
+              <a:t>Debouncing an Input</a:t>
             </a:r>
             <a:endParaRPr lang="en-US" dirty="0"/>
-          </a:p>
-        </p:txBody>
-      </p:sp>
-      <p:sp>
-        <p:nvSpPr>
-          <p:cNvPr id="3" name="Content Placeholder 2"/>
-          <p:cNvSpPr>
-            <a:spLocks noGrp="1"/>
-          </p:cNvSpPr>
-          <p:nvPr>
-            <p:ph idx="1"/>
-          </p:nvPr>
-        </p:nvSpPr>
-        <p:spPr>
-          <a:xfrm>
-            <a:off x="2105169" y="1360469"/>
-            <a:ext cx="9641943" cy="5715019"/>
-          </a:xfrm>
-        </p:spPr>
-        <p:txBody>
-          <a:bodyPr>
-            <a:noAutofit/>
-          </a:bodyPr>
-          <a:lstStyle/>
-          <a:p>
-            <a:pPr marL="457200" lvl="0" indent="-304800">
-              <a:lnSpc>
-                <a:spcPct val="135000"/>
-              </a:lnSpc>
-              <a:buClr>
-                <a:srgbClr val="BEBEC5"/>
-              </a:buClr>
-              <a:buSzPct val="100000"/>
-              <a:buFont typeface="Courier New"/>
-              <a:buAutoNum type="arabicPeriod"/>
-            </a:pPr>
-            <a:r>
-              <a:rPr lang="en" sz="1100" b="1" dirty="0">
-                <a:solidFill>
-                  <a:srgbClr val="1E347B"/>
-                </a:solidFill>
-                <a:latin typeface="Courier New"/>
-                <a:ea typeface="Courier New"/>
-                <a:cs typeface="Courier New"/>
-                <a:sym typeface="Courier New"/>
-              </a:rPr>
-              <a:t>void</a:t>
-            </a:r>
-            <a:r>
-              <a:rPr lang="en" sz="1100" b="1" dirty="0">
-                <a:solidFill>
-                  <a:srgbClr val="48484C"/>
-                </a:solidFill>
-                <a:latin typeface="Courier New"/>
-                <a:ea typeface="Courier New"/>
-                <a:cs typeface="Courier New"/>
-                <a:sym typeface="Courier New"/>
-              </a:rPr>
-              <a:t> loop</a:t>
-            </a:r>
-            <a:r>
-              <a:rPr lang="en" sz="1100" b="1" dirty="0">
-                <a:solidFill>
-                  <a:srgbClr val="93A1A1"/>
-                </a:solidFill>
-                <a:latin typeface="Courier New"/>
-                <a:ea typeface="Courier New"/>
-                <a:cs typeface="Courier New"/>
-                <a:sym typeface="Courier New"/>
-              </a:rPr>
-              <a:t>() {</a:t>
-            </a:r>
-          </a:p>
-          <a:p>
-            <a:pPr marL="457200" lvl="0" indent="-304800">
-              <a:lnSpc>
-                <a:spcPct val="135000"/>
-              </a:lnSpc>
-              <a:buClr>
-                <a:srgbClr val="BEBEC5"/>
-              </a:buClr>
-              <a:buSzPct val="100000"/>
-              <a:buFont typeface="Courier New"/>
-              <a:buAutoNum type="arabicPeriod"/>
-            </a:pPr>
-            <a:r>
-              <a:rPr lang="en" sz="1100" b="1" dirty="0">
-                <a:solidFill>
-                  <a:srgbClr val="48484C"/>
-                </a:solidFill>
-                <a:latin typeface="Courier New"/>
-                <a:ea typeface="Courier New"/>
-                <a:cs typeface="Courier New"/>
-                <a:sym typeface="Courier New"/>
-              </a:rPr>
-              <a:t>    </a:t>
-            </a:r>
-            <a:r>
-              <a:rPr lang="en" sz="1100" b="1" dirty="0">
-                <a:solidFill>
-                  <a:srgbClr val="1E347B"/>
-                </a:solidFill>
-                <a:latin typeface="Courier New"/>
-                <a:ea typeface="Courier New"/>
-                <a:cs typeface="Courier New"/>
-                <a:sym typeface="Courier New"/>
-              </a:rPr>
-              <a:t>int</a:t>
-            </a:r>
-            <a:r>
-              <a:rPr lang="en" sz="1100" b="1" dirty="0">
-                <a:solidFill>
-                  <a:srgbClr val="48484C"/>
-                </a:solidFill>
-                <a:latin typeface="Courier New"/>
-                <a:ea typeface="Courier New"/>
-                <a:cs typeface="Courier New"/>
-                <a:sym typeface="Courier New"/>
-              </a:rPr>
-              <a:t> switchstate</a:t>
-            </a:r>
-            <a:r>
-              <a:rPr lang="en" sz="1100" b="1" dirty="0">
-                <a:solidFill>
-                  <a:srgbClr val="93A1A1"/>
-                </a:solidFill>
-                <a:latin typeface="Courier New"/>
-                <a:ea typeface="Courier New"/>
-                <a:cs typeface="Courier New"/>
-                <a:sym typeface="Courier New"/>
-              </a:rPr>
-              <a:t>;</a:t>
-            </a:r>
-          </a:p>
-          <a:p>
-            <a:pPr marL="457200" lvl="0" indent="-304800">
-              <a:lnSpc>
-                <a:spcPct val="135000"/>
-              </a:lnSpc>
-              <a:buClr>
-                <a:srgbClr val="BEBEC5"/>
-              </a:buClr>
-              <a:buSzPct val="100000"/>
-              <a:buFont typeface="Courier New"/>
-              <a:buAutoNum type="arabicPeriod"/>
-            </a:pPr>
-            <a:r>
-              <a:rPr lang="en" sz="1100" b="1" dirty="0">
-                <a:solidFill>
-                  <a:srgbClr val="48484C"/>
-                </a:solidFill>
-                <a:latin typeface="Courier New"/>
-                <a:ea typeface="Courier New"/>
-                <a:cs typeface="Courier New"/>
-                <a:sym typeface="Courier New"/>
-              </a:rPr>
-              <a:t>    reading </a:t>
-            </a:r>
-            <a:r>
-              <a:rPr lang="en" sz="1100" b="1" dirty="0">
-                <a:solidFill>
-                  <a:srgbClr val="93A1A1"/>
-                </a:solidFill>
-                <a:latin typeface="Courier New"/>
-                <a:ea typeface="Courier New"/>
-                <a:cs typeface="Courier New"/>
-                <a:sym typeface="Courier New"/>
-              </a:rPr>
-              <a:t>=</a:t>
-            </a:r>
-            <a:r>
-              <a:rPr lang="en" sz="1100" b="1" dirty="0">
-                <a:solidFill>
-                  <a:srgbClr val="48484C"/>
-                </a:solidFill>
-                <a:latin typeface="Courier New"/>
-                <a:ea typeface="Courier New"/>
-                <a:cs typeface="Courier New"/>
-                <a:sym typeface="Courier New"/>
-              </a:rPr>
-              <a:t> digitalRead</a:t>
-            </a:r>
-            <a:r>
-              <a:rPr lang="en" sz="1100" b="1" dirty="0">
-                <a:solidFill>
-                  <a:srgbClr val="93A1A1"/>
-                </a:solidFill>
-                <a:latin typeface="Courier New"/>
-                <a:ea typeface="Courier New"/>
-                <a:cs typeface="Courier New"/>
-                <a:sym typeface="Courier New"/>
-              </a:rPr>
-              <a:t>(</a:t>
-            </a:r>
-            <a:r>
-              <a:rPr lang="en" sz="1100" b="1" dirty="0">
-                <a:solidFill>
-                  <a:srgbClr val="48484C"/>
-                </a:solidFill>
-                <a:latin typeface="Courier New"/>
-                <a:ea typeface="Courier New"/>
-                <a:cs typeface="Courier New"/>
-                <a:sym typeface="Courier New"/>
-              </a:rPr>
-              <a:t>inPin</a:t>
-            </a:r>
-            <a:r>
-              <a:rPr lang="en" sz="1100" b="1" dirty="0" smtClean="0">
-                <a:solidFill>
-                  <a:srgbClr val="93A1A1"/>
-                </a:solidFill>
-                <a:latin typeface="Courier New"/>
-                <a:ea typeface="Courier New"/>
-                <a:cs typeface="Courier New"/>
-                <a:sym typeface="Courier New"/>
-              </a:rPr>
-              <a:t>);</a:t>
-            </a:r>
-            <a:endParaRPr lang="en" sz="1100" b="1" dirty="0">
-              <a:solidFill>
-                <a:srgbClr val="93A1A1"/>
-              </a:solidFill>
-              <a:latin typeface="Courier New"/>
-              <a:ea typeface="Courier New"/>
-              <a:cs typeface="Courier New"/>
-              <a:sym typeface="Courier New"/>
-            </a:endParaRPr>
-          </a:p>
-          <a:p>
-            <a:pPr marL="457200" lvl="0" indent="-304800">
-              <a:lnSpc>
-                <a:spcPct val="135000"/>
-              </a:lnSpc>
-              <a:buClr>
-                <a:srgbClr val="BEBEC5"/>
-              </a:buClr>
-              <a:buSzPct val="100000"/>
-              <a:buFont typeface="Courier New"/>
-              <a:buAutoNum type="arabicPeriod"/>
-            </a:pPr>
-            <a:r>
-              <a:rPr lang="en" sz="1100" b="1" dirty="0">
-                <a:solidFill>
-                  <a:srgbClr val="48484C"/>
-                </a:solidFill>
-                <a:latin typeface="Courier New"/>
-                <a:ea typeface="Courier New"/>
-                <a:cs typeface="Courier New"/>
-                <a:sym typeface="Courier New"/>
-              </a:rPr>
-              <a:t>    </a:t>
-            </a:r>
-            <a:r>
-              <a:rPr lang="en" sz="1100" b="1" dirty="0">
-                <a:solidFill>
-                  <a:srgbClr val="1E347B"/>
-                </a:solidFill>
-                <a:latin typeface="Courier New"/>
-                <a:ea typeface="Courier New"/>
-                <a:cs typeface="Courier New"/>
-                <a:sym typeface="Courier New"/>
-              </a:rPr>
-              <a:t>if</a:t>
-            </a:r>
-            <a:r>
-              <a:rPr lang="en" sz="1100" b="1" dirty="0">
-                <a:solidFill>
-                  <a:srgbClr val="48484C"/>
-                </a:solidFill>
-                <a:latin typeface="Courier New"/>
-                <a:ea typeface="Courier New"/>
-                <a:cs typeface="Courier New"/>
-                <a:sym typeface="Courier New"/>
-              </a:rPr>
-              <a:t> </a:t>
-            </a:r>
-            <a:r>
-              <a:rPr lang="en" sz="1100" b="1" dirty="0">
-                <a:solidFill>
-                  <a:srgbClr val="93A1A1"/>
-                </a:solidFill>
-                <a:latin typeface="Courier New"/>
-                <a:ea typeface="Courier New"/>
-                <a:cs typeface="Courier New"/>
-                <a:sym typeface="Courier New"/>
-              </a:rPr>
-              <a:t>(</a:t>
-            </a:r>
-            <a:r>
-              <a:rPr lang="en" sz="1100" b="1" dirty="0">
-                <a:solidFill>
-                  <a:srgbClr val="48484C"/>
-                </a:solidFill>
-                <a:latin typeface="Courier New"/>
-                <a:ea typeface="Courier New"/>
-                <a:cs typeface="Courier New"/>
-                <a:sym typeface="Courier New"/>
-              </a:rPr>
-              <a:t>reading </a:t>
-            </a:r>
-            <a:r>
-              <a:rPr lang="en" sz="1100" b="1" dirty="0">
-                <a:solidFill>
-                  <a:srgbClr val="93A1A1"/>
-                </a:solidFill>
-                <a:latin typeface="Courier New"/>
-                <a:ea typeface="Courier New"/>
-                <a:cs typeface="Courier New"/>
-                <a:sym typeface="Courier New"/>
-              </a:rPr>
-              <a:t>!=</a:t>
-            </a:r>
-            <a:r>
-              <a:rPr lang="en" sz="1100" b="1" dirty="0">
-                <a:solidFill>
-                  <a:srgbClr val="48484C"/>
-                </a:solidFill>
-                <a:latin typeface="Courier New"/>
-                <a:ea typeface="Courier New"/>
-                <a:cs typeface="Courier New"/>
-                <a:sym typeface="Courier New"/>
-              </a:rPr>
-              <a:t> previous</a:t>
-            </a:r>
-            <a:r>
-              <a:rPr lang="en" sz="1100" b="1" dirty="0">
-                <a:solidFill>
-                  <a:srgbClr val="93A1A1"/>
-                </a:solidFill>
-                <a:latin typeface="Courier New"/>
-                <a:ea typeface="Courier New"/>
-                <a:cs typeface="Courier New"/>
-                <a:sym typeface="Courier New"/>
-              </a:rPr>
-              <a:t>)</a:t>
-            </a:r>
-            <a:r>
-              <a:rPr lang="en" sz="1100" b="1" dirty="0">
-                <a:solidFill>
-                  <a:srgbClr val="48484C"/>
-                </a:solidFill>
-                <a:latin typeface="Courier New"/>
-                <a:ea typeface="Courier New"/>
-                <a:cs typeface="Courier New"/>
-                <a:sym typeface="Courier New"/>
-              </a:rPr>
-              <a:t> </a:t>
-            </a:r>
-            <a:r>
-              <a:rPr lang="en" sz="1100" b="1" dirty="0">
-                <a:solidFill>
-                  <a:srgbClr val="93A1A1"/>
-                </a:solidFill>
-                <a:latin typeface="Courier New"/>
-                <a:ea typeface="Courier New"/>
-                <a:cs typeface="Courier New"/>
-                <a:sym typeface="Courier New"/>
-              </a:rPr>
-              <a:t>{</a:t>
-            </a:r>
-          </a:p>
-          <a:p>
-            <a:pPr marL="457200" lvl="0" indent="-304800">
-              <a:lnSpc>
-                <a:spcPct val="135000"/>
-              </a:lnSpc>
-              <a:buClr>
-                <a:srgbClr val="BEBEC5"/>
-              </a:buClr>
-              <a:buSzPct val="100000"/>
-              <a:buFont typeface="Courier New"/>
-              <a:buAutoNum type="arabicPeriod"/>
-            </a:pPr>
-            <a:r>
-              <a:rPr lang="en" sz="1100" b="1" dirty="0">
-                <a:solidFill>
-                  <a:srgbClr val="48484C"/>
-                </a:solidFill>
-                <a:latin typeface="Courier New"/>
-                <a:ea typeface="Courier New"/>
-                <a:cs typeface="Courier New"/>
-                <a:sym typeface="Courier New"/>
-              </a:rPr>
-              <a:t>        time </a:t>
-            </a:r>
-            <a:r>
-              <a:rPr lang="en" sz="1100" b="1" dirty="0">
-                <a:solidFill>
-                  <a:srgbClr val="93A1A1"/>
-                </a:solidFill>
-                <a:latin typeface="Courier New"/>
-                <a:ea typeface="Courier New"/>
-                <a:cs typeface="Courier New"/>
-                <a:sym typeface="Courier New"/>
-              </a:rPr>
-              <a:t>=</a:t>
-            </a:r>
-            <a:r>
-              <a:rPr lang="en" sz="1100" b="1" dirty="0">
-                <a:solidFill>
-                  <a:srgbClr val="48484C"/>
-                </a:solidFill>
-                <a:latin typeface="Courier New"/>
-                <a:ea typeface="Courier New"/>
-                <a:cs typeface="Courier New"/>
-                <a:sym typeface="Courier New"/>
-              </a:rPr>
-              <a:t> millis</a:t>
-            </a:r>
-            <a:r>
-              <a:rPr lang="en" sz="1100" b="1" dirty="0">
-                <a:solidFill>
-                  <a:srgbClr val="93A1A1"/>
-                </a:solidFill>
-                <a:latin typeface="Courier New"/>
-                <a:ea typeface="Courier New"/>
-                <a:cs typeface="Courier New"/>
-                <a:sym typeface="Courier New"/>
-              </a:rPr>
-              <a:t>();</a:t>
-            </a:r>
-          </a:p>
-          <a:p>
-            <a:pPr marL="457200" lvl="0" indent="-304800">
-              <a:lnSpc>
-                <a:spcPct val="135000"/>
-              </a:lnSpc>
-              <a:buClr>
-                <a:srgbClr val="BEBEC5"/>
-              </a:buClr>
-              <a:buSzPct val="100000"/>
-              <a:buFont typeface="Courier New"/>
-              <a:buAutoNum type="arabicPeriod"/>
-            </a:pPr>
-            <a:r>
-              <a:rPr lang="en" sz="1100" b="1" dirty="0">
-                <a:solidFill>
-                  <a:srgbClr val="48484C"/>
-                </a:solidFill>
-                <a:latin typeface="Courier New"/>
-                <a:ea typeface="Courier New"/>
-                <a:cs typeface="Courier New"/>
-                <a:sym typeface="Courier New"/>
-              </a:rPr>
-              <a:t>    </a:t>
-            </a:r>
-            <a:r>
-              <a:rPr lang="en" sz="1100" b="1" dirty="0" smtClean="0">
-                <a:solidFill>
-                  <a:srgbClr val="93A1A1"/>
-                </a:solidFill>
-                <a:latin typeface="Courier New"/>
-                <a:ea typeface="Courier New"/>
-                <a:cs typeface="Courier New"/>
-                <a:sym typeface="Courier New"/>
-              </a:rPr>
-              <a:t>}</a:t>
-            </a:r>
-            <a:endParaRPr lang="en" sz="1100" b="1" dirty="0">
-              <a:solidFill>
-                <a:srgbClr val="93A1A1"/>
-              </a:solidFill>
-              <a:latin typeface="Courier New"/>
-              <a:ea typeface="Courier New"/>
-              <a:cs typeface="Courier New"/>
-              <a:sym typeface="Courier New"/>
-            </a:endParaRPr>
-          </a:p>
-          <a:p>
-            <a:pPr marL="457200" lvl="0" indent="-304800">
-              <a:lnSpc>
-                <a:spcPct val="135000"/>
-              </a:lnSpc>
-              <a:buClr>
-                <a:srgbClr val="BEBEC5"/>
-              </a:buClr>
-              <a:buSzPct val="100000"/>
-              <a:buFont typeface="Courier New"/>
-              <a:buAutoNum type="arabicPeriod"/>
-            </a:pPr>
-            <a:r>
-              <a:rPr lang="en" sz="1100" b="1" dirty="0">
-                <a:solidFill>
-                  <a:srgbClr val="48484C"/>
-                </a:solidFill>
-                <a:latin typeface="Courier New"/>
-                <a:ea typeface="Courier New"/>
-                <a:cs typeface="Courier New"/>
-                <a:sym typeface="Courier New"/>
-              </a:rPr>
-              <a:t>    </a:t>
-            </a:r>
-            <a:r>
-              <a:rPr lang="en" sz="1100" b="1" dirty="0">
-                <a:solidFill>
-                  <a:srgbClr val="1E347B"/>
-                </a:solidFill>
-                <a:latin typeface="Courier New"/>
-                <a:ea typeface="Courier New"/>
-                <a:cs typeface="Courier New"/>
-                <a:sym typeface="Courier New"/>
-              </a:rPr>
-              <a:t>if</a:t>
-            </a:r>
-            <a:r>
-              <a:rPr lang="en" sz="1100" b="1" dirty="0">
-                <a:solidFill>
-                  <a:srgbClr val="48484C"/>
-                </a:solidFill>
-                <a:latin typeface="Courier New"/>
-                <a:ea typeface="Courier New"/>
-                <a:cs typeface="Courier New"/>
-                <a:sym typeface="Courier New"/>
-              </a:rPr>
-              <a:t> </a:t>
-            </a:r>
-            <a:r>
-              <a:rPr lang="en" sz="1100" b="1" dirty="0">
-                <a:solidFill>
-                  <a:srgbClr val="93A1A1"/>
-                </a:solidFill>
-                <a:latin typeface="Courier New"/>
-                <a:ea typeface="Courier New"/>
-                <a:cs typeface="Courier New"/>
-                <a:sym typeface="Courier New"/>
-              </a:rPr>
-              <a:t>((</a:t>
-            </a:r>
-            <a:r>
-              <a:rPr lang="en" sz="1100" b="1" dirty="0">
-                <a:solidFill>
-                  <a:srgbClr val="48484C"/>
-                </a:solidFill>
-                <a:latin typeface="Courier New"/>
-                <a:ea typeface="Courier New"/>
-                <a:cs typeface="Courier New"/>
-                <a:sym typeface="Courier New"/>
-              </a:rPr>
-              <a:t>millis</a:t>
-            </a:r>
-            <a:r>
-              <a:rPr lang="en" sz="1100" b="1" dirty="0">
-                <a:solidFill>
-                  <a:srgbClr val="93A1A1"/>
-                </a:solidFill>
-                <a:latin typeface="Courier New"/>
-                <a:ea typeface="Courier New"/>
-                <a:cs typeface="Courier New"/>
-                <a:sym typeface="Courier New"/>
-              </a:rPr>
-              <a:t>()</a:t>
-            </a:r>
-            <a:r>
-              <a:rPr lang="en" sz="1100" b="1" dirty="0">
-                <a:solidFill>
-                  <a:srgbClr val="48484C"/>
-                </a:solidFill>
-                <a:latin typeface="Courier New"/>
-                <a:ea typeface="Courier New"/>
-                <a:cs typeface="Courier New"/>
-                <a:sym typeface="Courier New"/>
-              </a:rPr>
-              <a:t> </a:t>
-            </a:r>
-            <a:r>
-              <a:rPr lang="en" sz="1100" b="1" dirty="0">
-                <a:solidFill>
-                  <a:srgbClr val="93A1A1"/>
-                </a:solidFill>
-                <a:latin typeface="Courier New"/>
-                <a:ea typeface="Courier New"/>
-                <a:cs typeface="Courier New"/>
-                <a:sym typeface="Courier New"/>
-              </a:rPr>
-              <a:t>-</a:t>
-            </a:r>
-            <a:r>
-              <a:rPr lang="en" sz="1100" b="1" dirty="0">
-                <a:solidFill>
-                  <a:srgbClr val="48484C"/>
-                </a:solidFill>
-                <a:latin typeface="Courier New"/>
-                <a:ea typeface="Courier New"/>
-                <a:cs typeface="Courier New"/>
-                <a:sym typeface="Courier New"/>
-              </a:rPr>
-              <a:t> time</a:t>
-            </a:r>
-            <a:r>
-              <a:rPr lang="en" sz="1100" b="1" dirty="0">
-                <a:solidFill>
-                  <a:srgbClr val="93A1A1"/>
-                </a:solidFill>
-                <a:latin typeface="Courier New"/>
-                <a:ea typeface="Courier New"/>
-                <a:cs typeface="Courier New"/>
-                <a:sym typeface="Courier New"/>
-              </a:rPr>
-              <a:t>)</a:t>
-            </a:r>
-            <a:r>
-              <a:rPr lang="en" sz="1100" b="1" dirty="0">
-                <a:solidFill>
-                  <a:srgbClr val="48484C"/>
-                </a:solidFill>
-                <a:latin typeface="Courier New"/>
-                <a:ea typeface="Courier New"/>
-                <a:cs typeface="Courier New"/>
-                <a:sym typeface="Courier New"/>
-              </a:rPr>
-              <a:t> </a:t>
-            </a:r>
-            <a:r>
-              <a:rPr lang="en" sz="1100" b="1" dirty="0">
-                <a:solidFill>
-                  <a:srgbClr val="93A1A1"/>
-                </a:solidFill>
-                <a:latin typeface="Courier New"/>
-                <a:ea typeface="Courier New"/>
-                <a:cs typeface="Courier New"/>
-                <a:sym typeface="Courier New"/>
-              </a:rPr>
-              <a:t>&gt;</a:t>
-            </a:r>
-            <a:r>
-              <a:rPr lang="en" sz="1100" b="1" dirty="0">
-                <a:solidFill>
-                  <a:srgbClr val="48484C"/>
-                </a:solidFill>
-                <a:latin typeface="Courier New"/>
-                <a:ea typeface="Courier New"/>
-                <a:cs typeface="Courier New"/>
-                <a:sym typeface="Courier New"/>
-              </a:rPr>
-              <a:t> debounce</a:t>
-            </a:r>
-            <a:r>
-              <a:rPr lang="en" sz="1100" b="1" dirty="0">
-                <a:solidFill>
-                  <a:srgbClr val="93A1A1"/>
-                </a:solidFill>
-                <a:latin typeface="Courier New"/>
-                <a:ea typeface="Courier New"/>
-                <a:cs typeface="Courier New"/>
-                <a:sym typeface="Courier New"/>
-              </a:rPr>
-              <a:t>)</a:t>
-            </a:r>
-            <a:r>
-              <a:rPr lang="en" sz="1100" b="1" dirty="0">
-                <a:solidFill>
-                  <a:srgbClr val="48484C"/>
-                </a:solidFill>
-                <a:latin typeface="Courier New"/>
-                <a:ea typeface="Courier New"/>
-                <a:cs typeface="Courier New"/>
-                <a:sym typeface="Courier New"/>
-              </a:rPr>
-              <a:t> </a:t>
-            </a:r>
-            <a:r>
-              <a:rPr lang="en" sz="1100" b="1" dirty="0">
-                <a:solidFill>
-                  <a:srgbClr val="93A1A1"/>
-                </a:solidFill>
-                <a:latin typeface="Courier New"/>
-                <a:ea typeface="Courier New"/>
-                <a:cs typeface="Courier New"/>
-                <a:sym typeface="Courier New"/>
-              </a:rPr>
-              <a:t>{</a:t>
-            </a:r>
-          </a:p>
-          <a:p>
-            <a:pPr marL="457200" lvl="0" indent="-304800">
-              <a:lnSpc>
-                <a:spcPct val="135000"/>
-              </a:lnSpc>
-              <a:buClr>
-                <a:srgbClr val="BEBEC5"/>
-              </a:buClr>
-              <a:buSzPct val="100000"/>
-              <a:buFont typeface="Courier New"/>
-              <a:buAutoNum type="arabicPeriod"/>
-            </a:pPr>
-            <a:r>
-              <a:rPr lang="en" sz="1100" b="1" dirty="0">
-                <a:solidFill>
-                  <a:srgbClr val="48484C"/>
-                </a:solidFill>
-                <a:latin typeface="Courier New"/>
-                <a:ea typeface="Courier New"/>
-                <a:cs typeface="Courier New"/>
-                <a:sym typeface="Courier New"/>
-              </a:rPr>
-              <a:t>        switchstate </a:t>
-            </a:r>
-            <a:r>
-              <a:rPr lang="en" sz="1100" b="1" dirty="0">
-                <a:solidFill>
-                  <a:srgbClr val="93A1A1"/>
-                </a:solidFill>
-                <a:latin typeface="Courier New"/>
-                <a:ea typeface="Courier New"/>
-                <a:cs typeface="Courier New"/>
-                <a:sym typeface="Courier New"/>
-              </a:rPr>
-              <a:t>=</a:t>
-            </a:r>
-            <a:r>
-              <a:rPr lang="en" sz="1100" b="1" dirty="0">
-                <a:solidFill>
-                  <a:srgbClr val="48484C"/>
-                </a:solidFill>
-                <a:latin typeface="Courier New"/>
-                <a:ea typeface="Courier New"/>
-                <a:cs typeface="Courier New"/>
-                <a:sym typeface="Courier New"/>
-              </a:rPr>
-              <a:t> reading</a:t>
-            </a:r>
-            <a:r>
-              <a:rPr lang="en" sz="1100" b="1" dirty="0" smtClean="0">
-                <a:solidFill>
-                  <a:srgbClr val="93A1A1"/>
-                </a:solidFill>
-                <a:latin typeface="Courier New"/>
-                <a:ea typeface="Courier New"/>
-                <a:cs typeface="Courier New"/>
-                <a:sym typeface="Courier New"/>
-              </a:rPr>
-              <a:t>;</a:t>
-            </a:r>
-            <a:endParaRPr lang="en" sz="1100" b="1" dirty="0">
-              <a:solidFill>
-                <a:srgbClr val="93A1A1"/>
-              </a:solidFill>
-              <a:latin typeface="Courier New"/>
-              <a:ea typeface="Courier New"/>
-              <a:cs typeface="Courier New"/>
-              <a:sym typeface="Courier New"/>
-            </a:endParaRPr>
-          </a:p>
-          <a:p>
-            <a:pPr marL="457200" lvl="0" indent="-304800">
-              <a:lnSpc>
-                <a:spcPct val="135000"/>
-              </a:lnSpc>
-              <a:buClr>
-                <a:srgbClr val="BEBEC5"/>
-              </a:buClr>
-              <a:buSzPct val="100000"/>
-              <a:buFont typeface="Courier New"/>
-              <a:buAutoNum type="arabicPeriod"/>
-            </a:pPr>
-            <a:r>
-              <a:rPr lang="en" sz="1100" b="1" dirty="0">
-                <a:solidFill>
-                  <a:srgbClr val="48484C"/>
-                </a:solidFill>
-                <a:latin typeface="Courier New"/>
-                <a:ea typeface="Courier New"/>
-                <a:cs typeface="Courier New"/>
-                <a:sym typeface="Courier New"/>
-              </a:rPr>
-              <a:t>        </a:t>
-            </a:r>
-            <a:r>
-              <a:rPr lang="en" sz="1100" b="1" dirty="0">
-                <a:solidFill>
-                  <a:srgbClr val="1E347B"/>
-                </a:solidFill>
-                <a:latin typeface="Courier New"/>
-                <a:ea typeface="Courier New"/>
-                <a:cs typeface="Courier New"/>
-                <a:sym typeface="Courier New"/>
-              </a:rPr>
-              <a:t>if</a:t>
-            </a:r>
-            <a:r>
-              <a:rPr lang="en" sz="1100" b="1" dirty="0">
-                <a:solidFill>
-                  <a:srgbClr val="48484C"/>
-                </a:solidFill>
-                <a:latin typeface="Courier New"/>
-                <a:ea typeface="Courier New"/>
-                <a:cs typeface="Courier New"/>
-                <a:sym typeface="Courier New"/>
-              </a:rPr>
-              <a:t> </a:t>
-            </a:r>
-            <a:r>
-              <a:rPr lang="en" sz="1100" b="1" dirty="0">
-                <a:solidFill>
-                  <a:srgbClr val="93A1A1"/>
-                </a:solidFill>
-                <a:latin typeface="Courier New"/>
-                <a:ea typeface="Courier New"/>
-                <a:cs typeface="Courier New"/>
-                <a:sym typeface="Courier New"/>
-              </a:rPr>
-              <a:t>(</a:t>
-            </a:r>
-            <a:r>
-              <a:rPr lang="en" sz="1100" b="1" dirty="0">
-                <a:solidFill>
-                  <a:srgbClr val="48484C"/>
-                </a:solidFill>
-                <a:latin typeface="Courier New"/>
-                <a:ea typeface="Courier New"/>
-                <a:cs typeface="Courier New"/>
-                <a:sym typeface="Courier New"/>
-              </a:rPr>
-              <a:t>switchstate </a:t>
-            </a:r>
-            <a:r>
-              <a:rPr lang="en" sz="1100" b="1" dirty="0">
-                <a:solidFill>
-                  <a:srgbClr val="93A1A1"/>
-                </a:solidFill>
-                <a:latin typeface="Courier New"/>
-                <a:ea typeface="Courier New"/>
-                <a:cs typeface="Courier New"/>
-                <a:sym typeface="Courier New"/>
-              </a:rPr>
-              <a:t>==</a:t>
-            </a:r>
-            <a:r>
-              <a:rPr lang="en" sz="1100" b="1" dirty="0">
-                <a:solidFill>
-                  <a:srgbClr val="48484C"/>
-                </a:solidFill>
-                <a:latin typeface="Courier New"/>
-                <a:ea typeface="Courier New"/>
-                <a:cs typeface="Courier New"/>
-                <a:sym typeface="Courier New"/>
-              </a:rPr>
-              <a:t> HIGH</a:t>
-            </a:r>
-            <a:r>
-              <a:rPr lang="en" sz="1100" b="1" dirty="0">
-                <a:solidFill>
-                  <a:srgbClr val="93A1A1"/>
-                </a:solidFill>
-                <a:latin typeface="Courier New"/>
-                <a:ea typeface="Courier New"/>
-                <a:cs typeface="Courier New"/>
-                <a:sym typeface="Courier New"/>
-              </a:rPr>
-              <a:t>)</a:t>
-            </a:r>
-          </a:p>
-          <a:p>
-            <a:pPr marL="457200" lvl="0" indent="-304800">
-              <a:lnSpc>
-                <a:spcPct val="135000"/>
-              </a:lnSpc>
-              <a:buClr>
-                <a:srgbClr val="BEBEC5"/>
-              </a:buClr>
-              <a:buSzPct val="100000"/>
-              <a:buFont typeface="Courier New"/>
-              <a:buAutoNum type="arabicPeriod"/>
-            </a:pPr>
-            <a:r>
-              <a:rPr lang="en" sz="1100" b="1" dirty="0">
-                <a:solidFill>
-                  <a:srgbClr val="48484C"/>
-                </a:solidFill>
-                <a:latin typeface="Courier New"/>
-                <a:ea typeface="Courier New"/>
-                <a:cs typeface="Courier New"/>
-                <a:sym typeface="Courier New"/>
-              </a:rPr>
-              <a:t>            </a:t>
-            </a:r>
-            <a:r>
-              <a:rPr lang="en" sz="1100" b="1" dirty="0">
-                <a:solidFill>
-                  <a:srgbClr val="008080"/>
-                </a:solidFill>
-                <a:latin typeface="Courier New"/>
-                <a:ea typeface="Courier New"/>
-                <a:cs typeface="Courier New"/>
-                <a:sym typeface="Courier New"/>
-              </a:rPr>
-              <a:t>LEDstate</a:t>
-            </a:r>
-            <a:r>
-              <a:rPr lang="en" sz="1100" b="1" dirty="0">
-                <a:solidFill>
-                  <a:srgbClr val="48484C"/>
-                </a:solidFill>
-                <a:latin typeface="Courier New"/>
-                <a:ea typeface="Courier New"/>
-                <a:cs typeface="Courier New"/>
-                <a:sym typeface="Courier New"/>
-              </a:rPr>
-              <a:t> </a:t>
-            </a:r>
-            <a:r>
-              <a:rPr lang="en" sz="1100" b="1" dirty="0">
-                <a:solidFill>
-                  <a:srgbClr val="93A1A1"/>
-                </a:solidFill>
-                <a:latin typeface="Courier New"/>
-                <a:ea typeface="Courier New"/>
-                <a:cs typeface="Courier New"/>
-                <a:sym typeface="Courier New"/>
-              </a:rPr>
-              <a:t>=</a:t>
-            </a:r>
-            <a:r>
-              <a:rPr lang="en" sz="1100" b="1" dirty="0">
-                <a:solidFill>
-                  <a:srgbClr val="48484C"/>
-                </a:solidFill>
-                <a:latin typeface="Courier New"/>
-                <a:ea typeface="Courier New"/>
-                <a:cs typeface="Courier New"/>
-                <a:sym typeface="Courier New"/>
-              </a:rPr>
-              <a:t> LOW</a:t>
-            </a:r>
-            <a:r>
-              <a:rPr lang="en" sz="1100" b="1" dirty="0">
-                <a:solidFill>
-                  <a:srgbClr val="93A1A1"/>
-                </a:solidFill>
-                <a:latin typeface="Courier New"/>
-                <a:ea typeface="Courier New"/>
-                <a:cs typeface="Courier New"/>
-                <a:sym typeface="Courier New"/>
-              </a:rPr>
-              <a:t>;</a:t>
-            </a:r>
-          </a:p>
-          <a:p>
-            <a:pPr marL="457200" lvl="0" indent="-304800">
-              <a:lnSpc>
-                <a:spcPct val="135000"/>
-              </a:lnSpc>
-              <a:buClr>
-                <a:srgbClr val="BEBEC5"/>
-              </a:buClr>
-              <a:buSzPct val="100000"/>
-              <a:buFont typeface="Courier New"/>
-              <a:buAutoNum type="arabicPeriod"/>
-            </a:pPr>
-            <a:r>
-              <a:rPr lang="en" sz="1100" b="1" dirty="0">
-                <a:solidFill>
-                  <a:srgbClr val="48484C"/>
-                </a:solidFill>
-                <a:latin typeface="Courier New"/>
-                <a:ea typeface="Courier New"/>
-                <a:cs typeface="Courier New"/>
-                <a:sym typeface="Courier New"/>
-              </a:rPr>
-              <a:t>        </a:t>
-            </a:r>
-            <a:r>
-              <a:rPr lang="en" sz="1100" b="1" dirty="0">
-                <a:solidFill>
-                  <a:srgbClr val="1E347B"/>
-                </a:solidFill>
-                <a:latin typeface="Courier New"/>
-                <a:ea typeface="Courier New"/>
-                <a:cs typeface="Courier New"/>
-                <a:sym typeface="Courier New"/>
-              </a:rPr>
-              <a:t>else</a:t>
-            </a:r>
-          </a:p>
-          <a:p>
-            <a:pPr marL="457200" lvl="0" indent="-304800">
-              <a:lnSpc>
-                <a:spcPct val="135000"/>
-              </a:lnSpc>
-              <a:buClr>
-                <a:srgbClr val="BEBEC5"/>
-              </a:buClr>
-              <a:buSzPct val="100000"/>
-              <a:buFont typeface="Courier New"/>
-              <a:buAutoNum type="arabicPeriod"/>
-            </a:pPr>
-            <a:r>
-              <a:rPr lang="en" sz="1100" b="1" dirty="0">
-                <a:solidFill>
-                  <a:srgbClr val="48484C"/>
-                </a:solidFill>
-                <a:latin typeface="Courier New"/>
-                <a:ea typeface="Courier New"/>
-                <a:cs typeface="Courier New"/>
-                <a:sym typeface="Courier New"/>
-              </a:rPr>
-              <a:t>            </a:t>
-            </a:r>
-            <a:r>
-              <a:rPr lang="en" sz="1100" b="1" dirty="0">
-                <a:solidFill>
-                  <a:srgbClr val="008080"/>
-                </a:solidFill>
-                <a:latin typeface="Courier New"/>
-                <a:ea typeface="Courier New"/>
-                <a:cs typeface="Courier New"/>
-                <a:sym typeface="Courier New"/>
-              </a:rPr>
-              <a:t>LEDstate</a:t>
-            </a:r>
-            <a:r>
-              <a:rPr lang="en" sz="1100" b="1" dirty="0">
-                <a:solidFill>
-                  <a:srgbClr val="48484C"/>
-                </a:solidFill>
-                <a:latin typeface="Courier New"/>
-                <a:ea typeface="Courier New"/>
-                <a:cs typeface="Courier New"/>
-                <a:sym typeface="Courier New"/>
-              </a:rPr>
-              <a:t> </a:t>
-            </a:r>
-            <a:r>
-              <a:rPr lang="en" sz="1100" b="1" dirty="0">
-                <a:solidFill>
-                  <a:srgbClr val="93A1A1"/>
-                </a:solidFill>
-                <a:latin typeface="Courier New"/>
-                <a:ea typeface="Courier New"/>
-                <a:cs typeface="Courier New"/>
-                <a:sym typeface="Courier New"/>
-              </a:rPr>
-              <a:t>=</a:t>
-            </a:r>
-            <a:r>
-              <a:rPr lang="en" sz="1100" b="1" dirty="0">
-                <a:solidFill>
-                  <a:srgbClr val="48484C"/>
-                </a:solidFill>
-                <a:latin typeface="Courier New"/>
-                <a:ea typeface="Courier New"/>
-                <a:cs typeface="Courier New"/>
-                <a:sym typeface="Courier New"/>
-              </a:rPr>
-              <a:t> HIGH</a:t>
-            </a:r>
-            <a:r>
-              <a:rPr lang="en" sz="1100" b="1" dirty="0">
-                <a:solidFill>
-                  <a:srgbClr val="93A1A1"/>
-                </a:solidFill>
-                <a:latin typeface="Courier New"/>
-                <a:ea typeface="Courier New"/>
-                <a:cs typeface="Courier New"/>
-                <a:sym typeface="Courier New"/>
-              </a:rPr>
-              <a:t>;</a:t>
-            </a:r>
-          </a:p>
-          <a:p>
-            <a:pPr marL="457200" lvl="0" indent="-304800">
-              <a:lnSpc>
-                <a:spcPct val="135000"/>
-              </a:lnSpc>
-              <a:buClr>
-                <a:srgbClr val="BEBEC5"/>
-              </a:buClr>
-              <a:buSzPct val="100000"/>
-              <a:buFont typeface="Courier New"/>
-              <a:buAutoNum type="arabicPeriod"/>
-            </a:pPr>
-            <a:r>
-              <a:rPr lang="en" sz="1100" b="1" dirty="0">
-                <a:solidFill>
-                  <a:srgbClr val="48484C"/>
-                </a:solidFill>
-                <a:latin typeface="Courier New"/>
-                <a:ea typeface="Courier New"/>
-                <a:cs typeface="Courier New"/>
-                <a:sym typeface="Courier New"/>
-              </a:rPr>
-              <a:t>    </a:t>
-            </a:r>
-            <a:r>
-              <a:rPr lang="en" sz="1100" b="1" dirty="0" smtClean="0">
-                <a:solidFill>
-                  <a:srgbClr val="93A1A1"/>
-                </a:solidFill>
-                <a:latin typeface="Courier New"/>
-                <a:ea typeface="Courier New"/>
-                <a:cs typeface="Courier New"/>
-                <a:sym typeface="Courier New"/>
-              </a:rPr>
-              <a:t>}</a:t>
-            </a:r>
-            <a:endParaRPr lang="en" sz="1100" b="1" dirty="0">
-              <a:solidFill>
-                <a:srgbClr val="93A1A1"/>
-              </a:solidFill>
-              <a:latin typeface="Courier New"/>
-              <a:ea typeface="Courier New"/>
-              <a:cs typeface="Courier New"/>
-              <a:sym typeface="Courier New"/>
-            </a:endParaRPr>
-          </a:p>
-          <a:p>
-            <a:pPr marL="457200" lvl="0" indent="-304800">
-              <a:lnSpc>
-                <a:spcPct val="135000"/>
-              </a:lnSpc>
-              <a:buClr>
-                <a:srgbClr val="BEBEC5"/>
-              </a:buClr>
-              <a:buSzPct val="100000"/>
-              <a:buFont typeface="Courier New"/>
-              <a:buAutoNum type="arabicPeriod"/>
-            </a:pPr>
-            <a:r>
-              <a:rPr lang="en" sz="1100" b="1" dirty="0">
-                <a:solidFill>
-                  <a:srgbClr val="48484C"/>
-                </a:solidFill>
-                <a:latin typeface="Courier New"/>
-                <a:ea typeface="Courier New"/>
-                <a:cs typeface="Courier New"/>
-                <a:sym typeface="Courier New"/>
-              </a:rPr>
-              <a:t>    digitalWrite</a:t>
-            </a:r>
-            <a:r>
-              <a:rPr lang="en" sz="1100" b="1" dirty="0">
-                <a:solidFill>
-                  <a:srgbClr val="93A1A1"/>
-                </a:solidFill>
-                <a:latin typeface="Courier New"/>
-                <a:ea typeface="Courier New"/>
-                <a:cs typeface="Courier New"/>
-                <a:sym typeface="Courier New"/>
-              </a:rPr>
-              <a:t>(</a:t>
-            </a:r>
-            <a:r>
-              <a:rPr lang="en" sz="1100" b="1" dirty="0">
-                <a:solidFill>
-                  <a:srgbClr val="48484C"/>
-                </a:solidFill>
-                <a:latin typeface="Courier New"/>
-                <a:ea typeface="Courier New"/>
-                <a:cs typeface="Courier New"/>
-                <a:sym typeface="Courier New"/>
-              </a:rPr>
-              <a:t>outPin</a:t>
-            </a:r>
-            <a:r>
-              <a:rPr lang="en" sz="1100" b="1" dirty="0">
-                <a:solidFill>
-                  <a:srgbClr val="93A1A1"/>
-                </a:solidFill>
-                <a:latin typeface="Courier New"/>
-                <a:ea typeface="Courier New"/>
-                <a:cs typeface="Courier New"/>
-                <a:sym typeface="Courier New"/>
-              </a:rPr>
-              <a:t>,</a:t>
-            </a:r>
-            <a:r>
-              <a:rPr lang="en" sz="1100" b="1" dirty="0">
-                <a:solidFill>
-                  <a:srgbClr val="48484C"/>
-                </a:solidFill>
-                <a:latin typeface="Courier New"/>
-                <a:ea typeface="Courier New"/>
-                <a:cs typeface="Courier New"/>
-                <a:sym typeface="Courier New"/>
-              </a:rPr>
-              <a:t> </a:t>
-            </a:r>
-            <a:r>
-              <a:rPr lang="en" sz="1100" b="1" dirty="0">
-                <a:solidFill>
-                  <a:srgbClr val="008080"/>
-                </a:solidFill>
-                <a:latin typeface="Courier New"/>
-                <a:ea typeface="Courier New"/>
-                <a:cs typeface="Courier New"/>
-                <a:sym typeface="Courier New"/>
-              </a:rPr>
-              <a:t>LEDstate</a:t>
-            </a:r>
-            <a:r>
-              <a:rPr lang="en" sz="1100" b="1" dirty="0">
-                <a:solidFill>
-                  <a:srgbClr val="93A1A1"/>
-                </a:solidFill>
-                <a:latin typeface="Courier New"/>
-                <a:ea typeface="Courier New"/>
-                <a:cs typeface="Courier New"/>
-                <a:sym typeface="Courier New"/>
-              </a:rPr>
-              <a:t>);</a:t>
-            </a:r>
-          </a:p>
-          <a:p>
-            <a:pPr marL="457200" lvl="0" indent="-304800">
-              <a:lnSpc>
-                <a:spcPct val="135000"/>
-              </a:lnSpc>
-              <a:buClr>
-                <a:srgbClr val="BEBEC5"/>
-              </a:buClr>
-              <a:buSzPct val="100000"/>
-              <a:buFont typeface="Courier New"/>
-              <a:buAutoNum type="arabicPeriod"/>
-            </a:pPr>
-            <a:r>
-              <a:rPr lang="en" sz="1100" b="1" dirty="0">
-                <a:solidFill>
-                  <a:srgbClr val="48484C"/>
-                </a:solidFill>
-                <a:latin typeface="Courier New"/>
-                <a:ea typeface="Courier New"/>
-                <a:cs typeface="Courier New"/>
-                <a:sym typeface="Courier New"/>
-              </a:rPr>
-              <a:t>    previous </a:t>
-            </a:r>
-            <a:r>
-              <a:rPr lang="en" sz="1100" b="1" dirty="0">
-                <a:solidFill>
-                  <a:srgbClr val="93A1A1"/>
-                </a:solidFill>
-                <a:latin typeface="Courier New"/>
-                <a:ea typeface="Courier New"/>
-                <a:cs typeface="Courier New"/>
-                <a:sym typeface="Courier New"/>
-              </a:rPr>
-              <a:t>=</a:t>
-            </a:r>
-            <a:r>
-              <a:rPr lang="en" sz="1100" b="1" dirty="0">
-                <a:solidFill>
-                  <a:srgbClr val="48484C"/>
-                </a:solidFill>
-                <a:latin typeface="Courier New"/>
-                <a:ea typeface="Courier New"/>
-                <a:cs typeface="Courier New"/>
-                <a:sym typeface="Courier New"/>
-              </a:rPr>
-              <a:t> reading</a:t>
-            </a:r>
-            <a:r>
-              <a:rPr lang="en" sz="1100" b="1" dirty="0">
-                <a:solidFill>
-                  <a:srgbClr val="93A1A1"/>
-                </a:solidFill>
-                <a:latin typeface="Courier New"/>
-                <a:ea typeface="Courier New"/>
-                <a:cs typeface="Courier New"/>
-                <a:sym typeface="Courier New"/>
-              </a:rPr>
-              <a:t>;</a:t>
-            </a:r>
-          </a:p>
-          <a:p>
-            <a:pPr marL="457200" lvl="0" indent="-304800">
-              <a:lnSpc>
-                <a:spcPct val="135000"/>
-              </a:lnSpc>
-              <a:buClr>
-                <a:srgbClr val="BEBEC5"/>
-              </a:buClr>
-              <a:buSzPct val="100000"/>
-              <a:buFont typeface="Courier New"/>
-              <a:buAutoNum type="arabicPeriod"/>
-            </a:pPr>
-            <a:r>
-              <a:rPr lang="en" sz="1100" b="1" dirty="0">
-                <a:solidFill>
-                  <a:srgbClr val="93A1A1"/>
-                </a:solidFill>
-                <a:latin typeface="Courier New"/>
-                <a:ea typeface="Courier New"/>
-                <a:cs typeface="Courier New"/>
-                <a:sym typeface="Courier New"/>
-              </a:rPr>
-              <a:t>}</a:t>
-            </a:r>
-          </a:p>
-          <a:p>
-            <a:endParaRPr lang="en-US" sz="1100" dirty="0"/>
           </a:p>
         </p:txBody>
       </p:sp>
@@ -4674,10 +3368,35 @@
           </a:p>
         </p:txBody>
       </p:sp>
+      <p:sp>
+        <p:nvSpPr>
+          <p:cNvPr id="5" name="Shape 139"/>
+          <p:cNvSpPr/>
+          <p:nvPr/>
+        </p:nvSpPr>
+        <p:spPr>
+          <a:xfrm>
+            <a:off x="4423407" y="1425513"/>
+            <a:ext cx="6657769" cy="5447266"/>
+          </a:xfrm>
+          <a:prstGeom prst="rect">
+            <a:avLst/>
+          </a:prstGeom>
+          <a:blipFill>
+            <a:blip r:embed="rId2"/>
+            <a:stretch>
+              <a:fillRect/>
+            </a:stretch>
+          </a:blipFill>
+          <a:ln>
+            <a:noFill/>
+          </a:ln>
+        </p:spPr>
+      </p:sp>
     </p:spTree>
     <p:extLst>
       <p:ext uri="{BB962C8B-B14F-4D97-AF65-F5344CB8AC3E}">
-        <p14:creationId xmlns:p14="http://schemas.microsoft.com/office/powerpoint/2010/main" val="3371149037"/>
+        <p14:creationId xmlns:p14="http://schemas.microsoft.com/office/powerpoint/2010/main" val="3462022439"/>
       </p:ext>
     </p:extLst>
   </p:cSld>
@@ -4728,19 +3447,1319 @@
           </a:bodyPr>
           <a:lstStyle/>
           <a:p>
-            <a:r>
-              <a:rPr lang="en-US" dirty="0" smtClean="0"/>
-              <a:t>Pull-</a:t>
-            </a:r>
-            <a:r>
-              <a:rPr lang="en-US" dirty="0"/>
-              <a:t>u</a:t>
-            </a:r>
-            <a:r>
-              <a:rPr lang="en-US" dirty="0" smtClean="0"/>
-              <a:t>p Resistor</a:t>
+            <a:pPr lvl="0"/>
+            <a:r>
+              <a:rPr lang="en" dirty="0"/>
+              <a:t>Solution </a:t>
+            </a:r>
+            <a:r>
+              <a:rPr lang="en" sz="6000" dirty="0" smtClean="0"/>
+              <a:t>- </a:t>
+            </a:r>
+            <a:r>
+              <a:rPr lang="en" sz="6000" dirty="0"/>
+              <a:t>from </a:t>
+            </a:r>
+            <a:r>
+              <a:rPr lang="en" sz="6000" u="sng" dirty="0">
+                <a:solidFill>
+                  <a:schemeClr val="hlink"/>
+                </a:solidFill>
+                <a:hlinkClick r:id="rId2"/>
+              </a:rPr>
+              <a:t>Adafruit</a:t>
             </a:r>
             <a:endParaRPr lang="en-US" dirty="0"/>
+          </a:p>
+        </p:txBody>
+      </p:sp>
+      <p:sp>
+        <p:nvSpPr>
+          <p:cNvPr id="3" name="Content Placeholder 2"/>
+          <p:cNvSpPr>
+            <a:spLocks noGrp="1"/>
+          </p:cNvSpPr>
+          <p:nvPr>
+            <p:ph idx="1"/>
+          </p:nvPr>
+        </p:nvSpPr>
+        <p:spPr>
+          <a:xfrm>
+            <a:off x="2105169" y="1360469"/>
+            <a:ext cx="9641943" cy="5715019"/>
+          </a:xfrm>
+        </p:spPr>
+        <p:txBody>
+          <a:bodyPr>
+            <a:noAutofit/>
+          </a:bodyPr>
+          <a:lstStyle/>
+          <a:p>
+            <a:pPr marL="457200" lvl="0" indent="-304800">
+              <a:lnSpc>
+                <a:spcPct val="135000"/>
+              </a:lnSpc>
+              <a:buClr>
+                <a:srgbClr val="BEBEC5"/>
+              </a:buClr>
+              <a:buSzPct val="100000"/>
+              <a:buFont typeface="Courier New"/>
+              <a:buAutoNum type="arabicPeriod"/>
+            </a:pPr>
+            <a:r>
+              <a:rPr lang="en" sz="1100" b="1" dirty="0">
+                <a:solidFill>
+                  <a:srgbClr val="1E347B"/>
+                </a:solidFill>
+                <a:latin typeface="Courier New"/>
+                <a:ea typeface="Courier New"/>
+                <a:cs typeface="Courier New"/>
+                <a:sym typeface="Courier New"/>
+              </a:rPr>
+              <a:t>void</a:t>
+            </a:r>
+            <a:r>
+              <a:rPr lang="en" sz="1100" b="1" dirty="0">
+                <a:solidFill>
+                  <a:srgbClr val="48484C"/>
+                </a:solidFill>
+                <a:latin typeface="Courier New"/>
+                <a:ea typeface="Courier New"/>
+                <a:cs typeface="Courier New"/>
+                <a:sym typeface="Courier New"/>
+              </a:rPr>
+              <a:t> loop</a:t>
+            </a:r>
+            <a:r>
+              <a:rPr lang="en" sz="1100" b="1" dirty="0">
+                <a:solidFill>
+                  <a:srgbClr val="93A1A1"/>
+                </a:solidFill>
+                <a:latin typeface="Courier New"/>
+                <a:ea typeface="Courier New"/>
+                <a:cs typeface="Courier New"/>
+                <a:sym typeface="Courier New"/>
+              </a:rPr>
+              <a:t>() {</a:t>
+            </a:r>
+          </a:p>
+          <a:p>
+            <a:pPr marL="457200" lvl="0" indent="-304800">
+              <a:lnSpc>
+                <a:spcPct val="135000"/>
+              </a:lnSpc>
+              <a:buClr>
+                <a:srgbClr val="BEBEC5"/>
+              </a:buClr>
+              <a:buSzPct val="100000"/>
+              <a:buFont typeface="Courier New"/>
+              <a:buAutoNum type="arabicPeriod"/>
+            </a:pPr>
+            <a:r>
+              <a:rPr lang="en" sz="1100" b="1" dirty="0">
+                <a:solidFill>
+                  <a:srgbClr val="48484C"/>
+                </a:solidFill>
+                <a:latin typeface="Courier New"/>
+                <a:ea typeface="Courier New"/>
+                <a:cs typeface="Courier New"/>
+                <a:sym typeface="Courier New"/>
+              </a:rPr>
+              <a:t>    </a:t>
+            </a:r>
+            <a:r>
+              <a:rPr lang="en" sz="1100" b="1" dirty="0">
+                <a:solidFill>
+                  <a:srgbClr val="1E347B"/>
+                </a:solidFill>
+                <a:latin typeface="Courier New"/>
+                <a:ea typeface="Courier New"/>
+                <a:cs typeface="Courier New"/>
+                <a:sym typeface="Courier New"/>
+              </a:rPr>
+              <a:t>int</a:t>
+            </a:r>
+            <a:r>
+              <a:rPr lang="en" sz="1100" b="1" dirty="0">
+                <a:solidFill>
+                  <a:srgbClr val="48484C"/>
+                </a:solidFill>
+                <a:latin typeface="Courier New"/>
+                <a:ea typeface="Courier New"/>
+                <a:cs typeface="Courier New"/>
+                <a:sym typeface="Courier New"/>
+              </a:rPr>
+              <a:t> switchstate</a:t>
+            </a:r>
+            <a:r>
+              <a:rPr lang="en" sz="1100" b="1" dirty="0">
+                <a:solidFill>
+                  <a:srgbClr val="93A1A1"/>
+                </a:solidFill>
+                <a:latin typeface="Courier New"/>
+                <a:ea typeface="Courier New"/>
+                <a:cs typeface="Courier New"/>
+                <a:sym typeface="Courier New"/>
+              </a:rPr>
+              <a:t>;</a:t>
+            </a:r>
+          </a:p>
+          <a:p>
+            <a:pPr marL="457200" lvl="0" indent="-304800">
+              <a:lnSpc>
+                <a:spcPct val="135000"/>
+              </a:lnSpc>
+              <a:buClr>
+                <a:srgbClr val="BEBEC5"/>
+              </a:buClr>
+              <a:buSzPct val="100000"/>
+              <a:buFont typeface="Courier New"/>
+              <a:buAutoNum type="arabicPeriod"/>
+            </a:pPr>
+            <a:r>
+              <a:rPr lang="en" sz="1100" b="1" dirty="0">
+                <a:solidFill>
+                  <a:srgbClr val="48484C"/>
+                </a:solidFill>
+                <a:latin typeface="Courier New"/>
+                <a:ea typeface="Courier New"/>
+                <a:cs typeface="Courier New"/>
+                <a:sym typeface="Courier New"/>
+              </a:rPr>
+              <a:t>    reading </a:t>
+            </a:r>
+            <a:r>
+              <a:rPr lang="en" sz="1100" b="1" dirty="0">
+                <a:solidFill>
+                  <a:srgbClr val="93A1A1"/>
+                </a:solidFill>
+                <a:latin typeface="Courier New"/>
+                <a:ea typeface="Courier New"/>
+                <a:cs typeface="Courier New"/>
+                <a:sym typeface="Courier New"/>
+              </a:rPr>
+              <a:t>=</a:t>
+            </a:r>
+            <a:r>
+              <a:rPr lang="en" sz="1100" b="1" dirty="0">
+                <a:solidFill>
+                  <a:srgbClr val="48484C"/>
+                </a:solidFill>
+                <a:latin typeface="Courier New"/>
+                <a:ea typeface="Courier New"/>
+                <a:cs typeface="Courier New"/>
+                <a:sym typeface="Courier New"/>
+              </a:rPr>
+              <a:t> digitalRead</a:t>
+            </a:r>
+            <a:r>
+              <a:rPr lang="en" sz="1100" b="1" dirty="0">
+                <a:solidFill>
+                  <a:srgbClr val="93A1A1"/>
+                </a:solidFill>
+                <a:latin typeface="Courier New"/>
+                <a:ea typeface="Courier New"/>
+                <a:cs typeface="Courier New"/>
+                <a:sym typeface="Courier New"/>
+              </a:rPr>
+              <a:t>(</a:t>
+            </a:r>
+            <a:r>
+              <a:rPr lang="en" sz="1100" b="1" dirty="0">
+                <a:solidFill>
+                  <a:srgbClr val="48484C"/>
+                </a:solidFill>
+                <a:latin typeface="Courier New"/>
+                <a:ea typeface="Courier New"/>
+                <a:cs typeface="Courier New"/>
+                <a:sym typeface="Courier New"/>
+              </a:rPr>
+              <a:t>inPin</a:t>
+            </a:r>
+            <a:r>
+              <a:rPr lang="en" sz="1100" b="1" dirty="0" smtClean="0">
+                <a:solidFill>
+                  <a:srgbClr val="93A1A1"/>
+                </a:solidFill>
+                <a:latin typeface="Courier New"/>
+                <a:ea typeface="Courier New"/>
+                <a:cs typeface="Courier New"/>
+                <a:sym typeface="Courier New"/>
+              </a:rPr>
+              <a:t>);</a:t>
+            </a:r>
+            <a:endParaRPr lang="en" sz="1100" b="1" dirty="0">
+              <a:solidFill>
+                <a:srgbClr val="93A1A1"/>
+              </a:solidFill>
+              <a:latin typeface="Courier New"/>
+              <a:ea typeface="Courier New"/>
+              <a:cs typeface="Courier New"/>
+              <a:sym typeface="Courier New"/>
+            </a:endParaRPr>
+          </a:p>
+          <a:p>
+            <a:pPr marL="457200" lvl="0" indent="-304800">
+              <a:lnSpc>
+                <a:spcPct val="135000"/>
+              </a:lnSpc>
+              <a:buClr>
+                <a:srgbClr val="BEBEC5"/>
+              </a:buClr>
+              <a:buSzPct val="100000"/>
+              <a:buFont typeface="Courier New"/>
+              <a:buAutoNum type="arabicPeriod"/>
+            </a:pPr>
+            <a:r>
+              <a:rPr lang="en" sz="1100" b="1" dirty="0">
+                <a:solidFill>
+                  <a:srgbClr val="48484C"/>
+                </a:solidFill>
+                <a:latin typeface="Courier New"/>
+                <a:ea typeface="Courier New"/>
+                <a:cs typeface="Courier New"/>
+                <a:sym typeface="Courier New"/>
+              </a:rPr>
+              <a:t>    </a:t>
+            </a:r>
+            <a:r>
+              <a:rPr lang="en" sz="1100" b="1" dirty="0">
+                <a:solidFill>
+                  <a:srgbClr val="1E347B"/>
+                </a:solidFill>
+                <a:latin typeface="Courier New"/>
+                <a:ea typeface="Courier New"/>
+                <a:cs typeface="Courier New"/>
+                <a:sym typeface="Courier New"/>
+              </a:rPr>
+              <a:t>if</a:t>
+            </a:r>
+            <a:r>
+              <a:rPr lang="en" sz="1100" b="1" dirty="0">
+                <a:solidFill>
+                  <a:srgbClr val="48484C"/>
+                </a:solidFill>
+                <a:latin typeface="Courier New"/>
+                <a:ea typeface="Courier New"/>
+                <a:cs typeface="Courier New"/>
+                <a:sym typeface="Courier New"/>
+              </a:rPr>
+              <a:t> </a:t>
+            </a:r>
+            <a:r>
+              <a:rPr lang="en" sz="1100" b="1" dirty="0">
+                <a:solidFill>
+                  <a:srgbClr val="93A1A1"/>
+                </a:solidFill>
+                <a:latin typeface="Courier New"/>
+                <a:ea typeface="Courier New"/>
+                <a:cs typeface="Courier New"/>
+                <a:sym typeface="Courier New"/>
+              </a:rPr>
+              <a:t>(</a:t>
+            </a:r>
+            <a:r>
+              <a:rPr lang="en" sz="1100" b="1" dirty="0">
+                <a:solidFill>
+                  <a:srgbClr val="48484C"/>
+                </a:solidFill>
+                <a:latin typeface="Courier New"/>
+                <a:ea typeface="Courier New"/>
+                <a:cs typeface="Courier New"/>
+                <a:sym typeface="Courier New"/>
+              </a:rPr>
+              <a:t>reading </a:t>
+            </a:r>
+            <a:r>
+              <a:rPr lang="en" sz="1100" b="1" dirty="0">
+                <a:solidFill>
+                  <a:srgbClr val="93A1A1"/>
+                </a:solidFill>
+                <a:latin typeface="Courier New"/>
+                <a:ea typeface="Courier New"/>
+                <a:cs typeface="Courier New"/>
+                <a:sym typeface="Courier New"/>
+              </a:rPr>
+              <a:t>!=</a:t>
+            </a:r>
+            <a:r>
+              <a:rPr lang="en" sz="1100" b="1" dirty="0">
+                <a:solidFill>
+                  <a:srgbClr val="48484C"/>
+                </a:solidFill>
+                <a:latin typeface="Courier New"/>
+                <a:ea typeface="Courier New"/>
+                <a:cs typeface="Courier New"/>
+                <a:sym typeface="Courier New"/>
+              </a:rPr>
+              <a:t> previous</a:t>
+            </a:r>
+            <a:r>
+              <a:rPr lang="en" sz="1100" b="1" dirty="0">
+                <a:solidFill>
+                  <a:srgbClr val="93A1A1"/>
+                </a:solidFill>
+                <a:latin typeface="Courier New"/>
+                <a:ea typeface="Courier New"/>
+                <a:cs typeface="Courier New"/>
+                <a:sym typeface="Courier New"/>
+              </a:rPr>
+              <a:t>)</a:t>
+            </a:r>
+            <a:r>
+              <a:rPr lang="en" sz="1100" b="1" dirty="0">
+                <a:solidFill>
+                  <a:srgbClr val="48484C"/>
+                </a:solidFill>
+                <a:latin typeface="Courier New"/>
+                <a:ea typeface="Courier New"/>
+                <a:cs typeface="Courier New"/>
+                <a:sym typeface="Courier New"/>
+              </a:rPr>
+              <a:t> </a:t>
+            </a:r>
+            <a:r>
+              <a:rPr lang="en" sz="1100" b="1" dirty="0">
+                <a:solidFill>
+                  <a:srgbClr val="93A1A1"/>
+                </a:solidFill>
+                <a:latin typeface="Courier New"/>
+                <a:ea typeface="Courier New"/>
+                <a:cs typeface="Courier New"/>
+                <a:sym typeface="Courier New"/>
+              </a:rPr>
+              <a:t>{</a:t>
+            </a:r>
+          </a:p>
+          <a:p>
+            <a:pPr marL="457200" lvl="0" indent="-304800">
+              <a:lnSpc>
+                <a:spcPct val="135000"/>
+              </a:lnSpc>
+              <a:buClr>
+                <a:srgbClr val="BEBEC5"/>
+              </a:buClr>
+              <a:buSzPct val="100000"/>
+              <a:buFont typeface="Courier New"/>
+              <a:buAutoNum type="arabicPeriod"/>
+            </a:pPr>
+            <a:r>
+              <a:rPr lang="en" sz="1100" b="1" dirty="0">
+                <a:solidFill>
+                  <a:srgbClr val="48484C"/>
+                </a:solidFill>
+                <a:latin typeface="Courier New"/>
+                <a:ea typeface="Courier New"/>
+                <a:cs typeface="Courier New"/>
+                <a:sym typeface="Courier New"/>
+              </a:rPr>
+              <a:t>        time </a:t>
+            </a:r>
+            <a:r>
+              <a:rPr lang="en" sz="1100" b="1" dirty="0">
+                <a:solidFill>
+                  <a:srgbClr val="93A1A1"/>
+                </a:solidFill>
+                <a:latin typeface="Courier New"/>
+                <a:ea typeface="Courier New"/>
+                <a:cs typeface="Courier New"/>
+                <a:sym typeface="Courier New"/>
+              </a:rPr>
+              <a:t>=</a:t>
+            </a:r>
+            <a:r>
+              <a:rPr lang="en" sz="1100" b="1" dirty="0">
+                <a:solidFill>
+                  <a:srgbClr val="48484C"/>
+                </a:solidFill>
+                <a:latin typeface="Courier New"/>
+                <a:ea typeface="Courier New"/>
+                <a:cs typeface="Courier New"/>
+                <a:sym typeface="Courier New"/>
+              </a:rPr>
+              <a:t> millis</a:t>
+            </a:r>
+            <a:r>
+              <a:rPr lang="en" sz="1100" b="1" dirty="0">
+                <a:solidFill>
+                  <a:srgbClr val="93A1A1"/>
+                </a:solidFill>
+                <a:latin typeface="Courier New"/>
+                <a:ea typeface="Courier New"/>
+                <a:cs typeface="Courier New"/>
+                <a:sym typeface="Courier New"/>
+              </a:rPr>
+              <a:t>();</a:t>
+            </a:r>
+          </a:p>
+          <a:p>
+            <a:pPr marL="457200" lvl="0" indent="-304800">
+              <a:lnSpc>
+                <a:spcPct val="135000"/>
+              </a:lnSpc>
+              <a:buClr>
+                <a:srgbClr val="BEBEC5"/>
+              </a:buClr>
+              <a:buSzPct val="100000"/>
+              <a:buFont typeface="Courier New"/>
+              <a:buAutoNum type="arabicPeriod"/>
+            </a:pPr>
+            <a:r>
+              <a:rPr lang="en" sz="1100" b="1" dirty="0">
+                <a:solidFill>
+                  <a:srgbClr val="48484C"/>
+                </a:solidFill>
+                <a:latin typeface="Courier New"/>
+                <a:ea typeface="Courier New"/>
+                <a:cs typeface="Courier New"/>
+                <a:sym typeface="Courier New"/>
+              </a:rPr>
+              <a:t>    </a:t>
+            </a:r>
+            <a:r>
+              <a:rPr lang="en" sz="1100" b="1" dirty="0" smtClean="0">
+                <a:solidFill>
+                  <a:srgbClr val="93A1A1"/>
+                </a:solidFill>
+                <a:latin typeface="Courier New"/>
+                <a:ea typeface="Courier New"/>
+                <a:cs typeface="Courier New"/>
+                <a:sym typeface="Courier New"/>
+              </a:rPr>
+              <a:t>}</a:t>
+            </a:r>
+            <a:endParaRPr lang="en" sz="1100" b="1" dirty="0">
+              <a:solidFill>
+                <a:srgbClr val="93A1A1"/>
+              </a:solidFill>
+              <a:latin typeface="Courier New"/>
+              <a:ea typeface="Courier New"/>
+              <a:cs typeface="Courier New"/>
+              <a:sym typeface="Courier New"/>
+            </a:endParaRPr>
+          </a:p>
+          <a:p>
+            <a:pPr marL="457200" lvl="0" indent="-304800">
+              <a:lnSpc>
+                <a:spcPct val="135000"/>
+              </a:lnSpc>
+              <a:buClr>
+                <a:srgbClr val="BEBEC5"/>
+              </a:buClr>
+              <a:buSzPct val="100000"/>
+              <a:buFont typeface="Courier New"/>
+              <a:buAutoNum type="arabicPeriod"/>
+            </a:pPr>
+            <a:r>
+              <a:rPr lang="en" sz="1100" b="1" dirty="0">
+                <a:solidFill>
+                  <a:srgbClr val="48484C"/>
+                </a:solidFill>
+                <a:latin typeface="Courier New"/>
+                <a:ea typeface="Courier New"/>
+                <a:cs typeface="Courier New"/>
+                <a:sym typeface="Courier New"/>
+              </a:rPr>
+              <a:t>    </a:t>
+            </a:r>
+            <a:r>
+              <a:rPr lang="en" sz="1100" b="1" dirty="0">
+                <a:solidFill>
+                  <a:srgbClr val="1E347B"/>
+                </a:solidFill>
+                <a:latin typeface="Courier New"/>
+                <a:ea typeface="Courier New"/>
+                <a:cs typeface="Courier New"/>
+                <a:sym typeface="Courier New"/>
+              </a:rPr>
+              <a:t>if</a:t>
+            </a:r>
+            <a:r>
+              <a:rPr lang="en" sz="1100" b="1" dirty="0">
+                <a:solidFill>
+                  <a:srgbClr val="48484C"/>
+                </a:solidFill>
+                <a:latin typeface="Courier New"/>
+                <a:ea typeface="Courier New"/>
+                <a:cs typeface="Courier New"/>
+                <a:sym typeface="Courier New"/>
+              </a:rPr>
+              <a:t> </a:t>
+            </a:r>
+            <a:r>
+              <a:rPr lang="en" sz="1100" b="1" dirty="0">
+                <a:solidFill>
+                  <a:srgbClr val="93A1A1"/>
+                </a:solidFill>
+                <a:latin typeface="Courier New"/>
+                <a:ea typeface="Courier New"/>
+                <a:cs typeface="Courier New"/>
+                <a:sym typeface="Courier New"/>
+              </a:rPr>
+              <a:t>((</a:t>
+            </a:r>
+            <a:r>
+              <a:rPr lang="en" sz="1100" b="1" dirty="0">
+                <a:solidFill>
+                  <a:srgbClr val="48484C"/>
+                </a:solidFill>
+                <a:latin typeface="Courier New"/>
+                <a:ea typeface="Courier New"/>
+                <a:cs typeface="Courier New"/>
+                <a:sym typeface="Courier New"/>
+              </a:rPr>
+              <a:t>millis</a:t>
+            </a:r>
+            <a:r>
+              <a:rPr lang="en" sz="1100" b="1" dirty="0">
+                <a:solidFill>
+                  <a:srgbClr val="93A1A1"/>
+                </a:solidFill>
+                <a:latin typeface="Courier New"/>
+                <a:ea typeface="Courier New"/>
+                <a:cs typeface="Courier New"/>
+                <a:sym typeface="Courier New"/>
+              </a:rPr>
+              <a:t>()</a:t>
+            </a:r>
+            <a:r>
+              <a:rPr lang="en" sz="1100" b="1" dirty="0">
+                <a:solidFill>
+                  <a:srgbClr val="48484C"/>
+                </a:solidFill>
+                <a:latin typeface="Courier New"/>
+                <a:ea typeface="Courier New"/>
+                <a:cs typeface="Courier New"/>
+                <a:sym typeface="Courier New"/>
+              </a:rPr>
+              <a:t> </a:t>
+            </a:r>
+            <a:r>
+              <a:rPr lang="en" sz="1100" b="1" dirty="0">
+                <a:solidFill>
+                  <a:srgbClr val="93A1A1"/>
+                </a:solidFill>
+                <a:latin typeface="Courier New"/>
+                <a:ea typeface="Courier New"/>
+                <a:cs typeface="Courier New"/>
+                <a:sym typeface="Courier New"/>
+              </a:rPr>
+              <a:t>-</a:t>
+            </a:r>
+            <a:r>
+              <a:rPr lang="en" sz="1100" b="1" dirty="0">
+                <a:solidFill>
+                  <a:srgbClr val="48484C"/>
+                </a:solidFill>
+                <a:latin typeface="Courier New"/>
+                <a:ea typeface="Courier New"/>
+                <a:cs typeface="Courier New"/>
+                <a:sym typeface="Courier New"/>
+              </a:rPr>
+              <a:t> time</a:t>
+            </a:r>
+            <a:r>
+              <a:rPr lang="en" sz="1100" b="1" dirty="0">
+                <a:solidFill>
+                  <a:srgbClr val="93A1A1"/>
+                </a:solidFill>
+                <a:latin typeface="Courier New"/>
+                <a:ea typeface="Courier New"/>
+                <a:cs typeface="Courier New"/>
+                <a:sym typeface="Courier New"/>
+              </a:rPr>
+              <a:t>)</a:t>
+            </a:r>
+            <a:r>
+              <a:rPr lang="en" sz="1100" b="1" dirty="0">
+                <a:solidFill>
+                  <a:srgbClr val="48484C"/>
+                </a:solidFill>
+                <a:latin typeface="Courier New"/>
+                <a:ea typeface="Courier New"/>
+                <a:cs typeface="Courier New"/>
+                <a:sym typeface="Courier New"/>
+              </a:rPr>
+              <a:t> </a:t>
+            </a:r>
+            <a:r>
+              <a:rPr lang="en" sz="1100" b="1" dirty="0">
+                <a:solidFill>
+                  <a:srgbClr val="93A1A1"/>
+                </a:solidFill>
+                <a:latin typeface="Courier New"/>
+                <a:ea typeface="Courier New"/>
+                <a:cs typeface="Courier New"/>
+                <a:sym typeface="Courier New"/>
+              </a:rPr>
+              <a:t>&gt;</a:t>
+            </a:r>
+            <a:r>
+              <a:rPr lang="en" sz="1100" b="1" dirty="0">
+                <a:solidFill>
+                  <a:srgbClr val="48484C"/>
+                </a:solidFill>
+                <a:latin typeface="Courier New"/>
+                <a:ea typeface="Courier New"/>
+                <a:cs typeface="Courier New"/>
+                <a:sym typeface="Courier New"/>
+              </a:rPr>
+              <a:t> debounce</a:t>
+            </a:r>
+            <a:r>
+              <a:rPr lang="en" sz="1100" b="1" dirty="0">
+                <a:solidFill>
+                  <a:srgbClr val="93A1A1"/>
+                </a:solidFill>
+                <a:latin typeface="Courier New"/>
+                <a:ea typeface="Courier New"/>
+                <a:cs typeface="Courier New"/>
+                <a:sym typeface="Courier New"/>
+              </a:rPr>
+              <a:t>)</a:t>
+            </a:r>
+            <a:r>
+              <a:rPr lang="en" sz="1100" b="1" dirty="0">
+                <a:solidFill>
+                  <a:srgbClr val="48484C"/>
+                </a:solidFill>
+                <a:latin typeface="Courier New"/>
+                <a:ea typeface="Courier New"/>
+                <a:cs typeface="Courier New"/>
+                <a:sym typeface="Courier New"/>
+              </a:rPr>
+              <a:t> </a:t>
+            </a:r>
+            <a:r>
+              <a:rPr lang="en" sz="1100" b="1" dirty="0">
+                <a:solidFill>
+                  <a:srgbClr val="93A1A1"/>
+                </a:solidFill>
+                <a:latin typeface="Courier New"/>
+                <a:ea typeface="Courier New"/>
+                <a:cs typeface="Courier New"/>
+                <a:sym typeface="Courier New"/>
+              </a:rPr>
+              <a:t>{</a:t>
+            </a:r>
+          </a:p>
+          <a:p>
+            <a:pPr marL="457200" lvl="0" indent="-304800">
+              <a:lnSpc>
+                <a:spcPct val="135000"/>
+              </a:lnSpc>
+              <a:buClr>
+                <a:srgbClr val="BEBEC5"/>
+              </a:buClr>
+              <a:buSzPct val="100000"/>
+              <a:buFont typeface="Courier New"/>
+              <a:buAutoNum type="arabicPeriod"/>
+            </a:pPr>
+            <a:r>
+              <a:rPr lang="en" sz="1100" b="1" dirty="0">
+                <a:solidFill>
+                  <a:srgbClr val="48484C"/>
+                </a:solidFill>
+                <a:latin typeface="Courier New"/>
+                <a:ea typeface="Courier New"/>
+                <a:cs typeface="Courier New"/>
+                <a:sym typeface="Courier New"/>
+              </a:rPr>
+              <a:t>        switchstate </a:t>
+            </a:r>
+            <a:r>
+              <a:rPr lang="en" sz="1100" b="1" dirty="0">
+                <a:solidFill>
+                  <a:srgbClr val="93A1A1"/>
+                </a:solidFill>
+                <a:latin typeface="Courier New"/>
+                <a:ea typeface="Courier New"/>
+                <a:cs typeface="Courier New"/>
+                <a:sym typeface="Courier New"/>
+              </a:rPr>
+              <a:t>=</a:t>
+            </a:r>
+            <a:r>
+              <a:rPr lang="en" sz="1100" b="1" dirty="0">
+                <a:solidFill>
+                  <a:srgbClr val="48484C"/>
+                </a:solidFill>
+                <a:latin typeface="Courier New"/>
+                <a:ea typeface="Courier New"/>
+                <a:cs typeface="Courier New"/>
+                <a:sym typeface="Courier New"/>
+              </a:rPr>
+              <a:t> reading</a:t>
+            </a:r>
+            <a:r>
+              <a:rPr lang="en" sz="1100" b="1" dirty="0" smtClean="0">
+                <a:solidFill>
+                  <a:srgbClr val="93A1A1"/>
+                </a:solidFill>
+                <a:latin typeface="Courier New"/>
+                <a:ea typeface="Courier New"/>
+                <a:cs typeface="Courier New"/>
+                <a:sym typeface="Courier New"/>
+              </a:rPr>
+              <a:t>;</a:t>
+            </a:r>
+            <a:endParaRPr lang="en" sz="1100" b="1" dirty="0">
+              <a:solidFill>
+                <a:srgbClr val="93A1A1"/>
+              </a:solidFill>
+              <a:latin typeface="Courier New"/>
+              <a:ea typeface="Courier New"/>
+              <a:cs typeface="Courier New"/>
+              <a:sym typeface="Courier New"/>
+            </a:endParaRPr>
+          </a:p>
+          <a:p>
+            <a:pPr marL="457200" lvl="0" indent="-304800">
+              <a:lnSpc>
+                <a:spcPct val="135000"/>
+              </a:lnSpc>
+              <a:buClr>
+                <a:srgbClr val="BEBEC5"/>
+              </a:buClr>
+              <a:buSzPct val="100000"/>
+              <a:buFont typeface="Courier New"/>
+              <a:buAutoNum type="arabicPeriod"/>
+            </a:pPr>
+            <a:r>
+              <a:rPr lang="en" sz="1100" b="1" dirty="0">
+                <a:solidFill>
+                  <a:srgbClr val="48484C"/>
+                </a:solidFill>
+                <a:latin typeface="Courier New"/>
+                <a:ea typeface="Courier New"/>
+                <a:cs typeface="Courier New"/>
+                <a:sym typeface="Courier New"/>
+              </a:rPr>
+              <a:t>        </a:t>
+            </a:r>
+            <a:r>
+              <a:rPr lang="en" sz="1100" b="1" dirty="0">
+                <a:solidFill>
+                  <a:srgbClr val="1E347B"/>
+                </a:solidFill>
+                <a:latin typeface="Courier New"/>
+                <a:ea typeface="Courier New"/>
+                <a:cs typeface="Courier New"/>
+                <a:sym typeface="Courier New"/>
+              </a:rPr>
+              <a:t>if</a:t>
+            </a:r>
+            <a:r>
+              <a:rPr lang="en" sz="1100" b="1" dirty="0">
+                <a:solidFill>
+                  <a:srgbClr val="48484C"/>
+                </a:solidFill>
+                <a:latin typeface="Courier New"/>
+                <a:ea typeface="Courier New"/>
+                <a:cs typeface="Courier New"/>
+                <a:sym typeface="Courier New"/>
+              </a:rPr>
+              <a:t> </a:t>
+            </a:r>
+            <a:r>
+              <a:rPr lang="en" sz="1100" b="1" dirty="0">
+                <a:solidFill>
+                  <a:srgbClr val="93A1A1"/>
+                </a:solidFill>
+                <a:latin typeface="Courier New"/>
+                <a:ea typeface="Courier New"/>
+                <a:cs typeface="Courier New"/>
+                <a:sym typeface="Courier New"/>
+              </a:rPr>
+              <a:t>(</a:t>
+            </a:r>
+            <a:r>
+              <a:rPr lang="en" sz="1100" b="1" dirty="0">
+                <a:solidFill>
+                  <a:srgbClr val="48484C"/>
+                </a:solidFill>
+                <a:latin typeface="Courier New"/>
+                <a:ea typeface="Courier New"/>
+                <a:cs typeface="Courier New"/>
+                <a:sym typeface="Courier New"/>
+              </a:rPr>
+              <a:t>switchstate </a:t>
+            </a:r>
+            <a:r>
+              <a:rPr lang="en" sz="1100" b="1" dirty="0">
+                <a:solidFill>
+                  <a:srgbClr val="93A1A1"/>
+                </a:solidFill>
+                <a:latin typeface="Courier New"/>
+                <a:ea typeface="Courier New"/>
+                <a:cs typeface="Courier New"/>
+                <a:sym typeface="Courier New"/>
+              </a:rPr>
+              <a:t>==</a:t>
+            </a:r>
+            <a:r>
+              <a:rPr lang="en" sz="1100" b="1" dirty="0">
+                <a:solidFill>
+                  <a:srgbClr val="48484C"/>
+                </a:solidFill>
+                <a:latin typeface="Courier New"/>
+                <a:ea typeface="Courier New"/>
+                <a:cs typeface="Courier New"/>
+                <a:sym typeface="Courier New"/>
+              </a:rPr>
+              <a:t> HIGH</a:t>
+            </a:r>
+            <a:r>
+              <a:rPr lang="en" sz="1100" b="1" dirty="0">
+                <a:solidFill>
+                  <a:srgbClr val="93A1A1"/>
+                </a:solidFill>
+                <a:latin typeface="Courier New"/>
+                <a:ea typeface="Courier New"/>
+                <a:cs typeface="Courier New"/>
+                <a:sym typeface="Courier New"/>
+              </a:rPr>
+              <a:t>)</a:t>
+            </a:r>
+          </a:p>
+          <a:p>
+            <a:pPr marL="457200" lvl="0" indent="-304800">
+              <a:lnSpc>
+                <a:spcPct val="135000"/>
+              </a:lnSpc>
+              <a:buClr>
+                <a:srgbClr val="BEBEC5"/>
+              </a:buClr>
+              <a:buSzPct val="100000"/>
+              <a:buFont typeface="Courier New"/>
+              <a:buAutoNum type="arabicPeriod"/>
+            </a:pPr>
+            <a:r>
+              <a:rPr lang="en" sz="1100" b="1" dirty="0">
+                <a:solidFill>
+                  <a:srgbClr val="48484C"/>
+                </a:solidFill>
+                <a:latin typeface="Courier New"/>
+                <a:ea typeface="Courier New"/>
+                <a:cs typeface="Courier New"/>
+                <a:sym typeface="Courier New"/>
+              </a:rPr>
+              <a:t>            </a:t>
+            </a:r>
+            <a:r>
+              <a:rPr lang="en" sz="1100" b="1" dirty="0">
+                <a:solidFill>
+                  <a:srgbClr val="008080"/>
+                </a:solidFill>
+                <a:latin typeface="Courier New"/>
+                <a:ea typeface="Courier New"/>
+                <a:cs typeface="Courier New"/>
+                <a:sym typeface="Courier New"/>
+              </a:rPr>
+              <a:t>LEDstate</a:t>
+            </a:r>
+            <a:r>
+              <a:rPr lang="en" sz="1100" b="1" dirty="0">
+                <a:solidFill>
+                  <a:srgbClr val="48484C"/>
+                </a:solidFill>
+                <a:latin typeface="Courier New"/>
+                <a:ea typeface="Courier New"/>
+                <a:cs typeface="Courier New"/>
+                <a:sym typeface="Courier New"/>
+              </a:rPr>
+              <a:t> </a:t>
+            </a:r>
+            <a:r>
+              <a:rPr lang="en" sz="1100" b="1" dirty="0">
+                <a:solidFill>
+                  <a:srgbClr val="93A1A1"/>
+                </a:solidFill>
+                <a:latin typeface="Courier New"/>
+                <a:ea typeface="Courier New"/>
+                <a:cs typeface="Courier New"/>
+                <a:sym typeface="Courier New"/>
+              </a:rPr>
+              <a:t>=</a:t>
+            </a:r>
+            <a:r>
+              <a:rPr lang="en" sz="1100" b="1" dirty="0">
+                <a:solidFill>
+                  <a:srgbClr val="48484C"/>
+                </a:solidFill>
+                <a:latin typeface="Courier New"/>
+                <a:ea typeface="Courier New"/>
+                <a:cs typeface="Courier New"/>
+                <a:sym typeface="Courier New"/>
+              </a:rPr>
+              <a:t> LOW</a:t>
+            </a:r>
+            <a:r>
+              <a:rPr lang="en" sz="1100" b="1" dirty="0">
+                <a:solidFill>
+                  <a:srgbClr val="93A1A1"/>
+                </a:solidFill>
+                <a:latin typeface="Courier New"/>
+                <a:ea typeface="Courier New"/>
+                <a:cs typeface="Courier New"/>
+                <a:sym typeface="Courier New"/>
+              </a:rPr>
+              <a:t>;</a:t>
+            </a:r>
+          </a:p>
+          <a:p>
+            <a:pPr marL="457200" lvl="0" indent="-304800">
+              <a:lnSpc>
+                <a:spcPct val="135000"/>
+              </a:lnSpc>
+              <a:buClr>
+                <a:srgbClr val="BEBEC5"/>
+              </a:buClr>
+              <a:buSzPct val="100000"/>
+              <a:buFont typeface="Courier New"/>
+              <a:buAutoNum type="arabicPeriod"/>
+            </a:pPr>
+            <a:r>
+              <a:rPr lang="en" sz="1100" b="1" dirty="0">
+                <a:solidFill>
+                  <a:srgbClr val="48484C"/>
+                </a:solidFill>
+                <a:latin typeface="Courier New"/>
+                <a:ea typeface="Courier New"/>
+                <a:cs typeface="Courier New"/>
+                <a:sym typeface="Courier New"/>
+              </a:rPr>
+              <a:t>        </a:t>
+            </a:r>
+            <a:r>
+              <a:rPr lang="en" sz="1100" b="1" dirty="0">
+                <a:solidFill>
+                  <a:srgbClr val="1E347B"/>
+                </a:solidFill>
+                <a:latin typeface="Courier New"/>
+                <a:ea typeface="Courier New"/>
+                <a:cs typeface="Courier New"/>
+                <a:sym typeface="Courier New"/>
+              </a:rPr>
+              <a:t>else</a:t>
+            </a:r>
+          </a:p>
+          <a:p>
+            <a:pPr marL="457200" lvl="0" indent="-304800">
+              <a:lnSpc>
+                <a:spcPct val="135000"/>
+              </a:lnSpc>
+              <a:buClr>
+                <a:srgbClr val="BEBEC5"/>
+              </a:buClr>
+              <a:buSzPct val="100000"/>
+              <a:buFont typeface="Courier New"/>
+              <a:buAutoNum type="arabicPeriod"/>
+            </a:pPr>
+            <a:r>
+              <a:rPr lang="en" sz="1100" b="1" dirty="0">
+                <a:solidFill>
+                  <a:srgbClr val="48484C"/>
+                </a:solidFill>
+                <a:latin typeface="Courier New"/>
+                <a:ea typeface="Courier New"/>
+                <a:cs typeface="Courier New"/>
+                <a:sym typeface="Courier New"/>
+              </a:rPr>
+              <a:t>            </a:t>
+            </a:r>
+            <a:r>
+              <a:rPr lang="en" sz="1100" b="1" dirty="0">
+                <a:solidFill>
+                  <a:srgbClr val="008080"/>
+                </a:solidFill>
+                <a:latin typeface="Courier New"/>
+                <a:ea typeface="Courier New"/>
+                <a:cs typeface="Courier New"/>
+                <a:sym typeface="Courier New"/>
+              </a:rPr>
+              <a:t>LEDstate</a:t>
+            </a:r>
+            <a:r>
+              <a:rPr lang="en" sz="1100" b="1" dirty="0">
+                <a:solidFill>
+                  <a:srgbClr val="48484C"/>
+                </a:solidFill>
+                <a:latin typeface="Courier New"/>
+                <a:ea typeface="Courier New"/>
+                <a:cs typeface="Courier New"/>
+                <a:sym typeface="Courier New"/>
+              </a:rPr>
+              <a:t> </a:t>
+            </a:r>
+            <a:r>
+              <a:rPr lang="en" sz="1100" b="1" dirty="0">
+                <a:solidFill>
+                  <a:srgbClr val="93A1A1"/>
+                </a:solidFill>
+                <a:latin typeface="Courier New"/>
+                <a:ea typeface="Courier New"/>
+                <a:cs typeface="Courier New"/>
+                <a:sym typeface="Courier New"/>
+              </a:rPr>
+              <a:t>=</a:t>
+            </a:r>
+            <a:r>
+              <a:rPr lang="en" sz="1100" b="1" dirty="0">
+                <a:solidFill>
+                  <a:srgbClr val="48484C"/>
+                </a:solidFill>
+                <a:latin typeface="Courier New"/>
+                <a:ea typeface="Courier New"/>
+                <a:cs typeface="Courier New"/>
+                <a:sym typeface="Courier New"/>
+              </a:rPr>
+              <a:t> HIGH</a:t>
+            </a:r>
+            <a:r>
+              <a:rPr lang="en" sz="1100" b="1" dirty="0">
+                <a:solidFill>
+                  <a:srgbClr val="93A1A1"/>
+                </a:solidFill>
+                <a:latin typeface="Courier New"/>
+                <a:ea typeface="Courier New"/>
+                <a:cs typeface="Courier New"/>
+                <a:sym typeface="Courier New"/>
+              </a:rPr>
+              <a:t>;</a:t>
+            </a:r>
+          </a:p>
+          <a:p>
+            <a:pPr marL="457200" lvl="0" indent="-304800">
+              <a:lnSpc>
+                <a:spcPct val="135000"/>
+              </a:lnSpc>
+              <a:buClr>
+                <a:srgbClr val="BEBEC5"/>
+              </a:buClr>
+              <a:buSzPct val="100000"/>
+              <a:buFont typeface="Courier New"/>
+              <a:buAutoNum type="arabicPeriod"/>
+            </a:pPr>
+            <a:r>
+              <a:rPr lang="en" sz="1100" b="1" dirty="0">
+                <a:solidFill>
+                  <a:srgbClr val="48484C"/>
+                </a:solidFill>
+                <a:latin typeface="Courier New"/>
+                <a:ea typeface="Courier New"/>
+                <a:cs typeface="Courier New"/>
+                <a:sym typeface="Courier New"/>
+              </a:rPr>
+              <a:t>    </a:t>
+            </a:r>
+            <a:r>
+              <a:rPr lang="en" sz="1100" b="1" dirty="0" smtClean="0">
+                <a:solidFill>
+                  <a:srgbClr val="93A1A1"/>
+                </a:solidFill>
+                <a:latin typeface="Courier New"/>
+                <a:ea typeface="Courier New"/>
+                <a:cs typeface="Courier New"/>
+                <a:sym typeface="Courier New"/>
+              </a:rPr>
+              <a:t>}</a:t>
+            </a:r>
+            <a:endParaRPr lang="en" sz="1100" b="1" dirty="0">
+              <a:solidFill>
+                <a:srgbClr val="93A1A1"/>
+              </a:solidFill>
+              <a:latin typeface="Courier New"/>
+              <a:ea typeface="Courier New"/>
+              <a:cs typeface="Courier New"/>
+              <a:sym typeface="Courier New"/>
+            </a:endParaRPr>
+          </a:p>
+          <a:p>
+            <a:pPr marL="457200" lvl="0" indent="-304800">
+              <a:lnSpc>
+                <a:spcPct val="135000"/>
+              </a:lnSpc>
+              <a:buClr>
+                <a:srgbClr val="BEBEC5"/>
+              </a:buClr>
+              <a:buSzPct val="100000"/>
+              <a:buFont typeface="Courier New"/>
+              <a:buAutoNum type="arabicPeriod"/>
+            </a:pPr>
+            <a:r>
+              <a:rPr lang="en" sz="1100" b="1" dirty="0">
+                <a:solidFill>
+                  <a:srgbClr val="48484C"/>
+                </a:solidFill>
+                <a:latin typeface="Courier New"/>
+                <a:ea typeface="Courier New"/>
+                <a:cs typeface="Courier New"/>
+                <a:sym typeface="Courier New"/>
+              </a:rPr>
+              <a:t>    digitalWrite</a:t>
+            </a:r>
+            <a:r>
+              <a:rPr lang="en" sz="1100" b="1" dirty="0">
+                <a:solidFill>
+                  <a:srgbClr val="93A1A1"/>
+                </a:solidFill>
+                <a:latin typeface="Courier New"/>
+                <a:ea typeface="Courier New"/>
+                <a:cs typeface="Courier New"/>
+                <a:sym typeface="Courier New"/>
+              </a:rPr>
+              <a:t>(</a:t>
+            </a:r>
+            <a:r>
+              <a:rPr lang="en" sz="1100" b="1" dirty="0">
+                <a:solidFill>
+                  <a:srgbClr val="48484C"/>
+                </a:solidFill>
+                <a:latin typeface="Courier New"/>
+                <a:ea typeface="Courier New"/>
+                <a:cs typeface="Courier New"/>
+                <a:sym typeface="Courier New"/>
+              </a:rPr>
+              <a:t>outPin</a:t>
+            </a:r>
+            <a:r>
+              <a:rPr lang="en" sz="1100" b="1" dirty="0">
+                <a:solidFill>
+                  <a:srgbClr val="93A1A1"/>
+                </a:solidFill>
+                <a:latin typeface="Courier New"/>
+                <a:ea typeface="Courier New"/>
+                <a:cs typeface="Courier New"/>
+                <a:sym typeface="Courier New"/>
+              </a:rPr>
+              <a:t>,</a:t>
+            </a:r>
+            <a:r>
+              <a:rPr lang="en" sz="1100" b="1" dirty="0">
+                <a:solidFill>
+                  <a:srgbClr val="48484C"/>
+                </a:solidFill>
+                <a:latin typeface="Courier New"/>
+                <a:ea typeface="Courier New"/>
+                <a:cs typeface="Courier New"/>
+                <a:sym typeface="Courier New"/>
+              </a:rPr>
+              <a:t> </a:t>
+            </a:r>
+            <a:r>
+              <a:rPr lang="en" sz="1100" b="1" dirty="0">
+                <a:solidFill>
+                  <a:srgbClr val="008080"/>
+                </a:solidFill>
+                <a:latin typeface="Courier New"/>
+                <a:ea typeface="Courier New"/>
+                <a:cs typeface="Courier New"/>
+                <a:sym typeface="Courier New"/>
+              </a:rPr>
+              <a:t>LEDstate</a:t>
+            </a:r>
+            <a:r>
+              <a:rPr lang="en" sz="1100" b="1" dirty="0">
+                <a:solidFill>
+                  <a:srgbClr val="93A1A1"/>
+                </a:solidFill>
+                <a:latin typeface="Courier New"/>
+                <a:ea typeface="Courier New"/>
+                <a:cs typeface="Courier New"/>
+                <a:sym typeface="Courier New"/>
+              </a:rPr>
+              <a:t>);</a:t>
+            </a:r>
+          </a:p>
+          <a:p>
+            <a:pPr marL="457200" lvl="0" indent="-304800">
+              <a:lnSpc>
+                <a:spcPct val="135000"/>
+              </a:lnSpc>
+              <a:buClr>
+                <a:srgbClr val="BEBEC5"/>
+              </a:buClr>
+              <a:buSzPct val="100000"/>
+              <a:buFont typeface="Courier New"/>
+              <a:buAutoNum type="arabicPeriod"/>
+            </a:pPr>
+            <a:r>
+              <a:rPr lang="en" sz="1100" b="1" dirty="0">
+                <a:solidFill>
+                  <a:srgbClr val="48484C"/>
+                </a:solidFill>
+                <a:latin typeface="Courier New"/>
+                <a:ea typeface="Courier New"/>
+                <a:cs typeface="Courier New"/>
+                <a:sym typeface="Courier New"/>
+              </a:rPr>
+              <a:t>    previous </a:t>
+            </a:r>
+            <a:r>
+              <a:rPr lang="en" sz="1100" b="1" dirty="0">
+                <a:solidFill>
+                  <a:srgbClr val="93A1A1"/>
+                </a:solidFill>
+                <a:latin typeface="Courier New"/>
+                <a:ea typeface="Courier New"/>
+                <a:cs typeface="Courier New"/>
+                <a:sym typeface="Courier New"/>
+              </a:rPr>
+              <a:t>=</a:t>
+            </a:r>
+            <a:r>
+              <a:rPr lang="en" sz="1100" b="1" dirty="0">
+                <a:solidFill>
+                  <a:srgbClr val="48484C"/>
+                </a:solidFill>
+                <a:latin typeface="Courier New"/>
+                <a:ea typeface="Courier New"/>
+                <a:cs typeface="Courier New"/>
+                <a:sym typeface="Courier New"/>
+              </a:rPr>
+              <a:t> reading</a:t>
+            </a:r>
+            <a:r>
+              <a:rPr lang="en" sz="1100" b="1" dirty="0">
+                <a:solidFill>
+                  <a:srgbClr val="93A1A1"/>
+                </a:solidFill>
+                <a:latin typeface="Courier New"/>
+                <a:ea typeface="Courier New"/>
+                <a:cs typeface="Courier New"/>
+                <a:sym typeface="Courier New"/>
+              </a:rPr>
+              <a:t>;</a:t>
+            </a:r>
+          </a:p>
+          <a:p>
+            <a:pPr marL="457200" lvl="0" indent="-304800">
+              <a:lnSpc>
+                <a:spcPct val="135000"/>
+              </a:lnSpc>
+              <a:buClr>
+                <a:srgbClr val="BEBEC5"/>
+              </a:buClr>
+              <a:buSzPct val="100000"/>
+              <a:buFont typeface="Courier New"/>
+              <a:buAutoNum type="arabicPeriod"/>
+            </a:pPr>
+            <a:r>
+              <a:rPr lang="en" sz="1100" b="1" dirty="0">
+                <a:solidFill>
+                  <a:srgbClr val="93A1A1"/>
+                </a:solidFill>
+                <a:latin typeface="Courier New"/>
+                <a:ea typeface="Courier New"/>
+                <a:cs typeface="Courier New"/>
+                <a:sym typeface="Courier New"/>
+              </a:rPr>
+              <a:t>}</a:t>
+            </a:r>
+          </a:p>
+          <a:p>
+            <a:endParaRPr lang="en-US" sz="1100" dirty="0"/>
           </a:p>
         </p:txBody>
       </p:sp>
@@ -4762,6 +4781,99 @@
             <a:fld id="{B2ACCBA8-5022-9E46-8DEA-AF9CA5E1705D}" type="slidenum">
               <a:rPr lang="en-US" smtClean="0"/>
               <a:t>11</a:t>
+            </a:fld>
+            <a:endParaRPr lang="en-US"/>
+          </a:p>
+        </p:txBody>
+      </p:sp>
+    </p:spTree>
+    <p:extLst>
+      <p:ext uri="{BB962C8B-B14F-4D97-AF65-F5344CB8AC3E}">
+        <p14:creationId xmlns:p14="http://schemas.microsoft.com/office/powerpoint/2010/main" val="3371149037"/>
+      </p:ext>
+    </p:extLst>
+  </p:cSld>
+  <p:clrMapOvr>
+    <a:masterClrMapping/>
+  </p:clrMapOvr>
+  <p:timing>
+    <p:tnLst>
+      <p:par>
+        <p:cTn xmlns:p14="http://schemas.microsoft.com/office/powerpoint/2010/main" id="1" dur="indefinite" restart="never" nodeType="tmRoot"/>
+      </p:par>
+    </p:tnLst>
+  </p:timing>
+</p:sld>
+</file>
+
+<file path=ppt/slides/slide12.xml><?xml version="1.0" encoding="utf-8"?>
+<p:sld xmlns:a="http://schemas.openxmlformats.org/drawingml/2006/main" xmlns:r="http://schemas.openxmlformats.org/officeDocument/2006/relationships" xmlns:p="http://schemas.openxmlformats.org/presentationml/2006/main">
+  <p:cSld>
+    <p:spTree>
+      <p:nvGrpSpPr>
+        <p:cNvPr id="1" name=""/>
+        <p:cNvGrpSpPr/>
+        <p:nvPr/>
+      </p:nvGrpSpPr>
+      <p:grpSpPr>
+        <a:xfrm>
+          <a:off x="0" y="0"/>
+          <a:ext cx="0" cy="0"/>
+          <a:chOff x="0" y="0"/>
+          <a:chExt cx="0" cy="0"/>
+        </a:xfrm>
+      </p:grpSpPr>
+      <p:sp>
+        <p:nvSpPr>
+          <p:cNvPr id="2" name="Title 1"/>
+          <p:cNvSpPr>
+            <a:spLocks noGrp="1"/>
+          </p:cNvSpPr>
+          <p:nvPr>
+            <p:ph type="title"/>
+          </p:nvPr>
+        </p:nvSpPr>
+        <p:spPr/>
+        <p:txBody>
+          <a:bodyPr>
+            <a:normAutofit fontScale="90000"/>
+          </a:bodyPr>
+          <a:lstStyle/>
+          <a:p>
+            <a:r>
+              <a:rPr lang="en-US" dirty="0" smtClean="0"/>
+              <a:t>Pull-</a:t>
+            </a:r>
+            <a:r>
+              <a:rPr lang="en-US" dirty="0"/>
+              <a:t>u</a:t>
+            </a:r>
+            <a:r>
+              <a:rPr lang="en-US" dirty="0" smtClean="0"/>
+              <a:t>p Resistor</a:t>
+            </a:r>
+            <a:endParaRPr lang="en-US" dirty="0"/>
+          </a:p>
+        </p:txBody>
+      </p:sp>
+      <p:sp>
+        <p:nvSpPr>
+          <p:cNvPr id="4" name="Slide Number Placeholder 3"/>
+          <p:cNvSpPr>
+            <a:spLocks noGrp="1"/>
+          </p:cNvSpPr>
+          <p:nvPr>
+            <p:ph type="sldNum" sz="quarter" idx="12"/>
+          </p:nvPr>
+        </p:nvSpPr>
+        <p:spPr/>
+        <p:txBody>
+          <a:bodyPr/>
+          <a:lstStyle/>
+          <a:p>
+            <a:fld id="{B2ACCBA8-5022-9E46-8DEA-AF9CA5E1705D}" type="slidenum">
+              <a:rPr lang="en-US" smtClean="0"/>
+              <a:t>12</a:t>
             </a:fld>
             <a:endParaRPr lang="en-US"/>
           </a:p>
@@ -4817,89 +4929,6 @@
 </p:sld>
 </file>
 
-<file path=ppt/slides/slide12.xml><?xml version="1.0" encoding="utf-8"?>
-<p:sld xmlns:a="http://schemas.openxmlformats.org/drawingml/2006/main" xmlns:r="http://schemas.openxmlformats.org/officeDocument/2006/relationships" xmlns:p="http://schemas.openxmlformats.org/presentationml/2006/main">
-  <p:cSld>
-    <p:spTree>
-      <p:nvGrpSpPr>
-        <p:cNvPr id="1" name=""/>
-        <p:cNvGrpSpPr/>
-        <p:nvPr/>
-      </p:nvGrpSpPr>
-      <p:grpSpPr>
-        <a:xfrm>
-          <a:off x="0" y="0"/>
-          <a:ext cx="0" cy="0"/>
-          <a:chOff x="0" y="0"/>
-          <a:chExt cx="0" cy="0"/>
-        </a:xfrm>
-      </p:grpSpPr>
-      <p:sp>
-        <p:nvSpPr>
-          <p:cNvPr id="2" name="Title 1"/>
-          <p:cNvSpPr>
-            <a:spLocks noGrp="1"/>
-          </p:cNvSpPr>
-          <p:nvPr>
-            <p:ph type="ctrTitle"/>
-          </p:nvPr>
-        </p:nvSpPr>
-        <p:spPr/>
-        <p:txBody>
-          <a:bodyPr/>
-          <a:lstStyle/>
-          <a:p>
-            <a:r>
-              <a:rPr lang="en-US" dirty="0" smtClean="0"/>
-              <a:t>Fading Lights</a:t>
-            </a:r>
-            <a:endParaRPr lang="en-US" dirty="0"/>
-          </a:p>
-        </p:txBody>
-      </p:sp>
-      <p:sp>
-        <p:nvSpPr>
-          <p:cNvPr id="3" name="Subtitle 2"/>
-          <p:cNvSpPr>
-            <a:spLocks noGrp="1"/>
-          </p:cNvSpPr>
-          <p:nvPr>
-            <p:ph type="subTitle" idx="1"/>
-          </p:nvPr>
-        </p:nvSpPr>
-        <p:spPr/>
-        <p:txBody>
-          <a:bodyPr/>
-          <a:lstStyle/>
-          <a:p>
-            <a:r>
-              <a:rPr lang="en-US" dirty="0" smtClean="0"/>
-              <a:t>Changing the brightness of the LED</a:t>
-            </a:r>
-            <a:endParaRPr lang="en-US" dirty="0"/>
-          </a:p>
-        </p:txBody>
-      </p:sp>
-    </p:spTree>
-    <p:extLst>
-      <p:ext uri="{BB962C8B-B14F-4D97-AF65-F5344CB8AC3E}">
-        <p14:creationId xmlns:p14="http://schemas.microsoft.com/office/powerpoint/2010/main" val="1411645589"/>
-      </p:ext>
-    </p:extLst>
-  </p:cSld>
-  <p:clrMapOvr>
-    <a:masterClrMapping/>
-  </p:clrMapOvr>
-  <p:timing>
-    <p:tnLst>
-      <p:par>
-        <p:cTn xmlns:p14="http://schemas.microsoft.com/office/powerpoint/2010/main" id="1" dur="indefinite" restart="never" nodeType="tmRoot"/>
-      </p:par>
-    </p:tnLst>
-  </p:timing>
-</p:sld>
-</file>
-
 <file path=ppt/slides/slide13.xml><?xml version="1.0" encoding="utf-8"?>
 <p:sld xmlns:a="http://schemas.openxmlformats.org/drawingml/2006/main" xmlns:r="http://schemas.openxmlformats.org/officeDocument/2006/relationships" xmlns:p="http://schemas.openxmlformats.org/presentationml/2006/main">
   <p:cSld>
@@ -4924,123 +4953,7 @@
             <a:spLocks noGrp="1"/>
           </p:cNvSpPr>
           <p:nvPr>
-            <p:ph type="title"/>
-          </p:nvPr>
-        </p:nvSpPr>
-        <p:spPr/>
-        <p:txBody>
-          <a:bodyPr>
-            <a:normAutofit fontScale="90000"/>
-          </a:bodyPr>
-          <a:lstStyle/>
-          <a:p>
-            <a:r>
-              <a:rPr lang="en" dirty="0"/>
-              <a:t>Pulse-width Modulation</a:t>
-            </a:r>
-            <a:endParaRPr lang="en-US" dirty="0"/>
-          </a:p>
-        </p:txBody>
-      </p:sp>
-      <p:sp>
-        <p:nvSpPr>
-          <p:cNvPr id="3" name="Content Placeholder 2"/>
-          <p:cNvSpPr>
-            <a:spLocks noGrp="1"/>
-          </p:cNvSpPr>
-          <p:nvPr>
-            <p:ph idx="1"/>
-          </p:nvPr>
-        </p:nvSpPr>
-        <p:spPr>
-          <a:xfrm>
-            <a:off x="1793826" y="1360469"/>
-            <a:ext cx="12218518" cy="5715019"/>
-          </a:xfrm>
-        </p:spPr>
-        <p:txBody>
-          <a:bodyPr>
-            <a:normAutofit fontScale="92500" lnSpcReduction="20000"/>
-          </a:bodyPr>
-          <a:lstStyle/>
-          <a:p>
-            <a:pPr marL="457200" lvl="0" indent="-419100">
-              <a:buClr>
-                <a:schemeClr val="dk1"/>
-              </a:buClr>
-              <a:buSzPct val="166666"/>
-              <a:buFont typeface="Arial"/>
-              <a:buChar char="•"/>
-            </a:pPr>
-            <a:r>
-              <a:rPr lang="en" dirty="0"/>
-              <a:t>Microcontrollers can only output 0 or 1</a:t>
-            </a:r>
-          </a:p>
-          <a:p>
-            <a:endParaRPr lang="en" dirty="0"/>
-          </a:p>
-          <a:p>
-            <a:pPr marL="457200" lvl="0" indent="-419100">
-              <a:buClr>
-                <a:schemeClr val="dk1"/>
-              </a:buClr>
-              <a:buSzPct val="166666"/>
-              <a:buFont typeface="Arial"/>
-              <a:buChar char="•"/>
-            </a:pPr>
-            <a:r>
-              <a:rPr lang="en" dirty="0"/>
-              <a:t>By toggling the pin “on” 50% of the time, we can reduce the total power output to 50%</a:t>
-            </a:r>
-          </a:p>
-          <a:p>
-            <a:endParaRPr lang="en" dirty="0"/>
-          </a:p>
-          <a:p>
-            <a:pPr marL="457200" lvl="0" indent="-419100">
-              <a:buClr>
-                <a:schemeClr val="dk1"/>
-              </a:buClr>
-              <a:buSzPct val="166666"/>
-              <a:buFont typeface="Arial"/>
-              <a:buChar char="•"/>
-            </a:pPr>
-            <a:r>
-              <a:rPr lang="en" dirty="0"/>
-              <a:t>By varying the % of time the pin is on, we can simulate analog output</a:t>
-            </a:r>
-          </a:p>
-          <a:p>
-            <a:endParaRPr lang="en" dirty="0"/>
-          </a:p>
-          <a:p>
-            <a:pPr marL="457200" lvl="0" indent="-419100">
-              <a:buClr>
-                <a:schemeClr val="dk1"/>
-              </a:buClr>
-              <a:buSzPct val="166666"/>
-              <a:buFont typeface="Arial"/>
-              <a:buChar char="•"/>
-            </a:pPr>
-            <a:r>
-              <a:rPr lang="en" dirty="0"/>
-              <a:t>For a cleaner signal, the PWM output can be passed thru a RC filter circuit</a:t>
-            </a:r>
-          </a:p>
-          <a:p>
-            <a:endParaRPr lang="en-US" dirty="0"/>
-          </a:p>
-        </p:txBody>
-      </p:sp>
-      <p:sp>
-        <p:nvSpPr>
-          <p:cNvPr id="4" name="Slide Number Placeholder 3"/>
-          <p:cNvSpPr>
-            <a:spLocks noGrp="1"/>
-          </p:cNvSpPr>
-          <p:nvPr>
-            <p:ph type="sldNum" sz="quarter" idx="12"/>
+            <p:ph type="ctrTitle"/>
           </p:nvPr>
         </p:nvSpPr>
         <p:spPr/>
@@ -5048,18 +4961,41 @@
           <a:bodyPr/>
           <a:lstStyle/>
           <a:p>
-            <a:fld id="{B2ACCBA8-5022-9E46-8DEA-AF9CA5E1705D}" type="slidenum">
-              <a:rPr lang="en-US" smtClean="0"/>
-              <a:t>13</a:t>
-            </a:fld>
-            <a:endParaRPr lang="en-US"/>
+            <a:r>
+              <a:rPr lang="en-US" dirty="0" smtClean="0"/>
+              <a:t>Fading Lights</a:t>
+            </a:r>
+            <a:endParaRPr lang="en-US" dirty="0"/>
+          </a:p>
+        </p:txBody>
+      </p:sp>
+      <p:sp>
+        <p:nvSpPr>
+          <p:cNvPr id="3" name="Subtitle 2"/>
+          <p:cNvSpPr>
+            <a:spLocks noGrp="1"/>
+          </p:cNvSpPr>
+          <p:nvPr>
+            <p:ph type="subTitle" idx="1"/>
+          </p:nvPr>
+        </p:nvSpPr>
+        <p:spPr/>
+        <p:txBody>
+          <a:bodyPr/>
+          <a:lstStyle/>
+          <a:p>
+            <a:r>
+              <a:rPr lang="en-US" dirty="0" smtClean="0"/>
+              <a:t>Changing the brightness of the LED</a:t>
+            </a:r>
+            <a:endParaRPr lang="en-US" dirty="0"/>
           </a:p>
         </p:txBody>
       </p:sp>
     </p:spTree>
     <p:extLst>
       <p:ext uri="{BB962C8B-B14F-4D97-AF65-F5344CB8AC3E}">
-        <p14:creationId xmlns:p14="http://schemas.microsoft.com/office/powerpoint/2010/main" val="2949335602"/>
+        <p14:creationId xmlns:p14="http://schemas.microsoft.com/office/powerpoint/2010/main" val="1411645589"/>
       </p:ext>
     </p:extLst>
   </p:cSld>
@@ -5120,6 +5056,97 @@
       </p:sp>
       <p:sp>
         <p:nvSpPr>
+          <p:cNvPr id="3" name="Content Placeholder 2"/>
+          <p:cNvSpPr>
+            <a:spLocks noGrp="1"/>
+          </p:cNvSpPr>
+          <p:nvPr>
+            <p:ph idx="1"/>
+          </p:nvPr>
+        </p:nvSpPr>
+        <p:spPr>
+          <a:xfrm>
+            <a:off x="1793826" y="1360469"/>
+            <a:ext cx="12218518" cy="5715019"/>
+          </a:xfrm>
+        </p:spPr>
+        <p:txBody>
+          <a:bodyPr>
+            <a:normAutofit fontScale="92500" lnSpcReduction="20000"/>
+          </a:bodyPr>
+          <a:lstStyle/>
+          <a:p>
+            <a:pPr marL="457200" lvl="0" indent="-419100">
+              <a:buClr>
+                <a:schemeClr val="dk1"/>
+              </a:buClr>
+              <a:buSzPct val="166666"/>
+              <a:buFont typeface="Arial"/>
+              <a:buChar char="•"/>
+            </a:pPr>
+            <a:r>
+              <a:rPr lang="en" dirty="0"/>
+              <a:t>Microcontrollers can only output 0 or 1</a:t>
+            </a:r>
+          </a:p>
+          <a:p>
+            <a:endParaRPr lang="en" dirty="0"/>
+          </a:p>
+          <a:p>
+            <a:pPr marL="457200" lvl="0" indent="-419100">
+              <a:buClr>
+                <a:schemeClr val="dk1"/>
+              </a:buClr>
+              <a:buSzPct val="166666"/>
+              <a:buFont typeface="Arial"/>
+              <a:buChar char="•"/>
+            </a:pPr>
+            <a:r>
+              <a:rPr lang="en" dirty="0"/>
+              <a:t>By toggling the pin “on” 50% of the time, we can reduce the total power output to 50%</a:t>
+            </a:r>
+          </a:p>
+          <a:p>
+            <a:endParaRPr lang="en" dirty="0"/>
+          </a:p>
+          <a:p>
+            <a:pPr marL="457200" lvl="0" indent="-419100">
+              <a:buClr>
+                <a:schemeClr val="dk1"/>
+              </a:buClr>
+              <a:buSzPct val="166666"/>
+              <a:buFont typeface="Arial"/>
+              <a:buChar char="•"/>
+            </a:pPr>
+            <a:r>
+              <a:rPr lang="en" dirty="0"/>
+              <a:t>By varying the % of time the pin is on, we can simulate analog output</a:t>
+            </a:r>
+          </a:p>
+          <a:p>
+            <a:endParaRPr lang="en" dirty="0"/>
+          </a:p>
+          <a:p>
+            <a:pPr marL="457200" lvl="0" indent="-419100">
+              <a:buClr>
+                <a:schemeClr val="dk1"/>
+              </a:buClr>
+              <a:buSzPct val="166666"/>
+              <a:buFont typeface="Arial"/>
+              <a:buChar char="•"/>
+            </a:pPr>
+            <a:r>
+              <a:rPr lang="en" dirty="0"/>
+              <a:t>For a cleaner signal, the PWM output can be passed thru a RC filter circuit</a:t>
+            </a:r>
+          </a:p>
+          <a:p>
+            <a:endParaRPr lang="en-US" dirty="0"/>
+          </a:p>
+        </p:txBody>
+      </p:sp>
+      <p:sp>
+        <p:nvSpPr>
           <p:cNvPr id="4" name="Slide Number Placeholder 3"/>
           <p:cNvSpPr>
             <a:spLocks noGrp="1"/>
@@ -5136,6 +5163,91 @@
             <a:fld id="{B2ACCBA8-5022-9E46-8DEA-AF9CA5E1705D}" type="slidenum">
               <a:rPr lang="en-US" smtClean="0"/>
               <a:t>14</a:t>
+            </a:fld>
+            <a:endParaRPr lang="en-US"/>
+          </a:p>
+        </p:txBody>
+      </p:sp>
+    </p:spTree>
+    <p:extLst>
+      <p:ext uri="{BB962C8B-B14F-4D97-AF65-F5344CB8AC3E}">
+        <p14:creationId xmlns:p14="http://schemas.microsoft.com/office/powerpoint/2010/main" val="2949335602"/>
+      </p:ext>
+    </p:extLst>
+  </p:cSld>
+  <p:clrMapOvr>
+    <a:masterClrMapping/>
+  </p:clrMapOvr>
+  <p:timing>
+    <p:tnLst>
+      <p:par>
+        <p:cTn xmlns:p14="http://schemas.microsoft.com/office/powerpoint/2010/main" id="1" dur="indefinite" restart="never" nodeType="tmRoot"/>
+      </p:par>
+    </p:tnLst>
+  </p:timing>
+</p:sld>
+</file>
+
+<file path=ppt/slides/slide15.xml><?xml version="1.0" encoding="utf-8"?>
+<p:sld xmlns:a="http://schemas.openxmlformats.org/drawingml/2006/main" xmlns:r="http://schemas.openxmlformats.org/officeDocument/2006/relationships" xmlns:p="http://schemas.openxmlformats.org/presentationml/2006/main">
+  <p:cSld>
+    <p:spTree>
+      <p:nvGrpSpPr>
+        <p:cNvPr id="1" name=""/>
+        <p:cNvGrpSpPr/>
+        <p:nvPr/>
+      </p:nvGrpSpPr>
+      <p:grpSpPr>
+        <a:xfrm>
+          <a:off x="0" y="0"/>
+          <a:ext cx="0" cy="0"/>
+          <a:chOff x="0" y="0"/>
+          <a:chExt cx="0" cy="0"/>
+        </a:xfrm>
+      </p:grpSpPr>
+      <p:sp>
+        <p:nvSpPr>
+          <p:cNvPr id="2" name="Title 1"/>
+          <p:cNvSpPr>
+            <a:spLocks noGrp="1"/>
+          </p:cNvSpPr>
+          <p:nvPr>
+            <p:ph type="title"/>
+          </p:nvPr>
+        </p:nvSpPr>
+        <p:spPr/>
+        <p:txBody>
+          <a:bodyPr>
+            <a:normAutofit fontScale="90000"/>
+          </a:bodyPr>
+          <a:lstStyle/>
+          <a:p>
+            <a:r>
+              <a:rPr lang="en" dirty="0"/>
+              <a:t>Pulse-width Modulation</a:t>
+            </a:r>
+            <a:endParaRPr lang="en-US" dirty="0"/>
+          </a:p>
+        </p:txBody>
+      </p:sp>
+      <p:sp>
+        <p:nvSpPr>
+          <p:cNvPr id="4" name="Slide Number Placeholder 3"/>
+          <p:cNvSpPr>
+            <a:spLocks noGrp="1"/>
+          </p:cNvSpPr>
+          <p:nvPr>
+            <p:ph type="sldNum" sz="quarter" idx="12"/>
+          </p:nvPr>
+        </p:nvSpPr>
+        <p:spPr/>
+        <p:txBody>
+          <a:bodyPr/>
+          <a:lstStyle/>
+          <a:p>
+            <a:fld id="{B2ACCBA8-5022-9E46-8DEA-AF9CA5E1705D}" type="slidenum">
+              <a:rPr lang="en-US" smtClean="0"/>
+              <a:t>15</a:t>
             </a:fld>
             <a:endParaRPr lang="en-US"/>
           </a:p>
@@ -5186,7 +5298,7 @@
 </p:sld>
 </file>
 
-<file path=ppt/slides/slide15.xml><?xml version="1.0" encoding="utf-8"?>
+<file path=ppt/slides/slide16.xml><?xml version="1.0" encoding="utf-8"?>
 <p:sld xmlns:a="http://schemas.openxmlformats.org/drawingml/2006/main" xmlns:r="http://schemas.openxmlformats.org/officeDocument/2006/relationships" xmlns:p="http://schemas.openxmlformats.org/presentationml/2006/main">
   <p:cSld>
     <p:spTree>
@@ -5299,7 +5411,7 @@
 </p:sld>
 </file>
 
-<file path=ppt/slides/slide16.xml><?xml version="1.0" encoding="utf-8"?>
+<file path=ppt/slides/slide17.xml><?xml version="1.0" encoding="utf-8"?>
 <p:sld xmlns:a="http://schemas.openxmlformats.org/drawingml/2006/main" xmlns:r="http://schemas.openxmlformats.org/officeDocument/2006/relationships" xmlns:p="http://schemas.openxmlformats.org/presentationml/2006/main">
   <p:cSld>
     <p:spTree>
@@ -5391,138 +5503,6 @@
     <p:extLst>
       <p:ext uri="{BB962C8B-B14F-4D97-AF65-F5344CB8AC3E}">
         <p14:creationId xmlns:p14="http://schemas.microsoft.com/office/powerpoint/2010/main" val="1454269794"/>
-      </p:ext>
-    </p:extLst>
-  </p:cSld>
-  <p:clrMapOvr>
-    <a:masterClrMapping/>
-  </p:clrMapOvr>
-  <p:timing>
-    <p:tnLst>
-      <p:par>
-        <p:cTn xmlns:p14="http://schemas.microsoft.com/office/powerpoint/2010/main" id="1" dur="indefinite" restart="never" nodeType="tmRoot"/>
-      </p:par>
-    </p:tnLst>
-  </p:timing>
-</p:sld>
-</file>
-
-<file path=ppt/slides/slide17.xml><?xml version="1.0" encoding="utf-8"?>
-<p:sld xmlns:a="http://schemas.openxmlformats.org/drawingml/2006/main" xmlns:r="http://schemas.openxmlformats.org/officeDocument/2006/relationships" xmlns:p="http://schemas.openxmlformats.org/presentationml/2006/main">
-  <p:cSld>
-    <p:spTree>
-      <p:nvGrpSpPr>
-        <p:cNvPr id="1" name=""/>
-        <p:cNvGrpSpPr/>
-        <p:nvPr/>
-      </p:nvGrpSpPr>
-      <p:grpSpPr>
-        <a:xfrm>
-          <a:off x="0" y="0"/>
-          <a:ext cx="0" cy="0"/>
-          <a:chOff x="0" y="0"/>
-          <a:chExt cx="0" cy="0"/>
-        </a:xfrm>
-      </p:grpSpPr>
-      <p:sp>
-        <p:nvSpPr>
-          <p:cNvPr id="2" name="Title 1"/>
-          <p:cNvSpPr>
-            <a:spLocks noGrp="1"/>
-          </p:cNvSpPr>
-          <p:nvPr>
-            <p:ph type="title"/>
-          </p:nvPr>
-        </p:nvSpPr>
-        <p:spPr/>
-        <p:txBody>
-          <a:bodyPr>
-            <a:normAutofit fontScale="90000"/>
-          </a:bodyPr>
-          <a:lstStyle/>
-          <a:p>
-            <a:r>
-              <a:rPr lang="en-US" dirty="0" smtClean="0"/>
-              <a:t>More…</a:t>
-            </a:r>
-            <a:endParaRPr lang="en-US" dirty="0"/>
-          </a:p>
-        </p:txBody>
-      </p:sp>
-      <p:sp>
-        <p:nvSpPr>
-          <p:cNvPr id="3" name="Content Placeholder 2"/>
-          <p:cNvSpPr>
-            <a:spLocks noGrp="1"/>
-          </p:cNvSpPr>
-          <p:nvPr>
-            <p:ph idx="1"/>
-          </p:nvPr>
-        </p:nvSpPr>
-        <p:spPr/>
-        <p:txBody>
-          <a:bodyPr/>
-          <a:lstStyle/>
-          <a:p>
-            <a:pPr marL="571500" indent="-571500">
-              <a:buFont typeface="Arial"/>
-              <a:buChar char="•"/>
-            </a:pPr>
-            <a:r>
-              <a:rPr lang="en-US" dirty="0" smtClean="0"/>
-              <a:t>Slide Switch (Pin D2)</a:t>
-            </a:r>
-          </a:p>
-          <a:p>
-            <a:pPr marL="571500" indent="-571500">
-              <a:buFont typeface="Arial"/>
-              <a:buChar char="•"/>
-            </a:pPr>
-            <a:r>
-              <a:rPr lang="en-US" dirty="0" smtClean="0"/>
-              <a:t>Temperature sensor (Pin A1)</a:t>
-            </a:r>
-          </a:p>
-          <a:p>
-            <a:pPr marL="571500" indent="-571500">
-              <a:buFont typeface="Arial"/>
-              <a:buChar char="•"/>
-            </a:pPr>
-            <a:r>
-              <a:rPr lang="en-US" dirty="0" smtClean="0"/>
-              <a:t>Vibe Board (Pin 3)</a:t>
-            </a:r>
-            <a:endParaRPr lang="en-US" dirty="0"/>
-          </a:p>
-        </p:txBody>
-      </p:sp>
-      <p:sp>
-        <p:nvSpPr>
-          <p:cNvPr id="4" name="Slide Number Placeholder 3"/>
-          <p:cNvSpPr>
-            <a:spLocks noGrp="1"/>
-          </p:cNvSpPr>
-          <p:nvPr>
-            <p:ph type="sldNum" sz="quarter" idx="12"/>
-          </p:nvPr>
-        </p:nvSpPr>
-        <p:spPr/>
-        <p:txBody>
-          <a:bodyPr/>
-          <a:lstStyle/>
-          <a:p>
-            <a:fld id="{B2ACCBA8-5022-9E46-8DEA-AF9CA5E1705D}" type="slidenum">
-              <a:rPr lang="en-US" smtClean="0"/>
-              <a:t>17</a:t>
-            </a:fld>
-            <a:endParaRPr lang="en-US"/>
-          </a:p>
-        </p:txBody>
-      </p:sp>
-    </p:spTree>
-    <p:extLst>
-      <p:ext uri="{BB962C8B-B14F-4D97-AF65-F5344CB8AC3E}">
-        <p14:creationId xmlns:p14="http://schemas.microsoft.com/office/powerpoint/2010/main" val="1177392317"/>
       </p:ext>
     </p:extLst>
   </p:cSld>
@@ -5575,7 +5555,7 @@
           <a:p>
             <a:r>
               <a:rPr lang="en-US" dirty="0" smtClean="0"/>
-              <a:t>Resources</a:t>
+              <a:t>More…</a:t>
             </a:r>
             <a:endParaRPr lang="en-US" dirty="0"/>
           </a:p>
@@ -5591,349 +5571,40 @@
             <p:ph idx="1"/>
           </p:nvPr>
         </p:nvSpPr>
-        <p:spPr>
-          <a:xfrm>
-            <a:off x="1345961" y="1360469"/>
-            <a:ext cx="9379669" cy="5715019"/>
-          </a:xfrm>
-        </p:spPr>
-        <p:txBody>
-          <a:bodyPr>
-            <a:normAutofit/>
-          </a:bodyPr>
+        <p:spPr/>
+        <p:txBody>
+          <a:bodyPr/>
           <a:lstStyle/>
           <a:p>
-            <a:r>
-              <a:rPr lang="en-US" sz="1400" b="1" dirty="0" err="1" smtClean="0"/>
-              <a:t>Arduino</a:t>
-            </a:r>
-            <a:r>
-              <a:rPr lang="en-US" sz="1400" b="1" dirty="0" smtClean="0"/>
-              <a:t> Documentation</a:t>
-            </a:r>
-          </a:p>
-          <a:p>
-            <a:pPr marL="171450" indent="-171450">
+            <a:pPr marL="571500" indent="-571500">
               <a:buFont typeface="Arial"/>
               <a:buChar char="•"/>
             </a:pPr>
             <a:r>
-              <a:rPr lang="en-US" sz="1400" dirty="0" smtClean="0">
-                <a:hlinkClick r:id="rId2"/>
-              </a:rPr>
-              <a:t>http</a:t>
-            </a:r>
-            <a:r>
-              <a:rPr lang="en-US" sz="1400" dirty="0">
-                <a:hlinkClick r:id="rId2"/>
-              </a:rPr>
-              <a:t>://arduino.cc/en/Reference/</a:t>
-            </a:r>
-            <a:r>
-              <a:rPr lang="en-US" sz="1400" dirty="0" smtClean="0">
-                <a:hlinkClick r:id="rId2"/>
-              </a:rPr>
-              <a:t>HomePage</a:t>
-            </a:r>
-            <a:endParaRPr lang="en-US" sz="1400" dirty="0" smtClean="0"/>
-          </a:p>
-          <a:p>
-            <a:r>
-              <a:rPr lang="en-US" sz="1400" b="1" dirty="0" err="1" smtClean="0"/>
-              <a:t>Lilypad</a:t>
-            </a:r>
-            <a:r>
-              <a:rPr lang="en-US" sz="1400" b="1" dirty="0" smtClean="0"/>
-              <a:t> </a:t>
-            </a:r>
-            <a:r>
-              <a:rPr lang="en-US" sz="1400" b="1" dirty="0" err="1" smtClean="0"/>
-              <a:t>Arduino</a:t>
-            </a:r>
-            <a:r>
-              <a:rPr lang="en-US" sz="1400" b="1" dirty="0"/>
-              <a:t> </a:t>
-            </a:r>
-            <a:r>
-              <a:rPr lang="en-US" sz="1400" b="1" dirty="0" smtClean="0"/>
-              <a:t>Reference</a:t>
-            </a:r>
-          </a:p>
-          <a:p>
-            <a:pPr marL="171450" indent="-171450">
+              <a:rPr lang="en-US" dirty="0" smtClean="0"/>
+              <a:t>Slide Switch (Pin D2)</a:t>
+            </a:r>
+          </a:p>
+          <a:p>
+            <a:pPr marL="571500" indent="-571500">
               <a:buFont typeface="Arial"/>
               <a:buChar char="•"/>
             </a:pPr>
             <a:r>
-              <a:rPr lang="en-US" sz="1400" dirty="0" smtClean="0">
-                <a:hlinkClick r:id="rId3"/>
-              </a:rPr>
-              <a:t>http</a:t>
-            </a:r>
-            <a:r>
-              <a:rPr lang="en-US" sz="1400" dirty="0">
-                <a:hlinkClick r:id="rId3"/>
-              </a:rPr>
-              <a:t>://lilypadarduino.org</a:t>
-            </a:r>
-            <a:r>
-              <a:rPr lang="en-US" sz="1400" dirty="0" smtClean="0">
-                <a:hlinkClick r:id="rId3"/>
-              </a:rPr>
-              <a:t>/</a:t>
-            </a:r>
-            <a:endParaRPr lang="en-US" sz="1400" dirty="0" smtClean="0"/>
-          </a:p>
-          <a:p>
-            <a:r>
-              <a:rPr lang="en-US" sz="1400" b="1" dirty="0" err="1" smtClean="0"/>
-              <a:t>Lilypad</a:t>
-            </a:r>
-            <a:r>
-              <a:rPr lang="en-US" sz="1400" b="1" dirty="0" smtClean="0"/>
-              <a:t> </a:t>
-            </a:r>
-            <a:r>
-              <a:rPr lang="en-US" sz="1400" b="1" dirty="0" err="1" smtClean="0"/>
-              <a:t>ProtoSnap</a:t>
-            </a:r>
-            <a:r>
-              <a:rPr lang="en-US" sz="1400" b="1" dirty="0" smtClean="0"/>
-              <a:t> Schematics</a:t>
-            </a:r>
-          </a:p>
-          <a:p>
-            <a:pPr marL="171450" indent="-171450">
+              <a:rPr lang="en-US" dirty="0" smtClean="0"/>
+              <a:t>Temperature sensor (Pin A1)</a:t>
+            </a:r>
+          </a:p>
+          <a:p>
+            <a:pPr marL="571500" indent="-571500">
               <a:buFont typeface="Arial"/>
               <a:buChar char="•"/>
             </a:pPr>
             <a:r>
-              <a:rPr lang="en-US" sz="1400" dirty="0" smtClean="0">
-                <a:hlinkClick r:id="rId4"/>
-              </a:rPr>
-              <a:t>http://dlnmh9ip6v2uc.cloudfront.net/datasheets/E-Textiles/Lilypad/LilyPad-Dev-v34b.pdf</a:t>
-            </a:r>
-            <a:endParaRPr lang="en-US" sz="1400" dirty="0" smtClean="0"/>
-          </a:p>
-          <a:p>
-            <a:pPr lvl="0"/>
-            <a:r>
-              <a:rPr lang="en" sz="1400" b="1" dirty="0" smtClean="0"/>
-              <a:t>Debouncing</a:t>
-            </a:r>
-            <a:endParaRPr lang="en-US" sz="1400" b="1" dirty="0" smtClean="0"/>
-          </a:p>
-          <a:p>
-            <a:pPr marL="171450" lvl="0" indent="-171450">
-              <a:buFont typeface="Arial"/>
-              <a:buChar char="•"/>
-            </a:pPr>
-            <a:r>
-              <a:rPr lang="en" sz="1400" u="sng" dirty="0" smtClean="0">
-                <a:solidFill>
-                  <a:schemeClr val="hlink"/>
-                </a:solidFill>
-                <a:hlinkClick r:id="rId5"/>
-              </a:rPr>
-              <a:t>http</a:t>
-            </a:r>
-            <a:r>
-              <a:rPr lang="en" sz="1400" u="sng" dirty="0">
-                <a:solidFill>
-                  <a:schemeClr val="hlink"/>
-                </a:solidFill>
-                <a:hlinkClick r:id="rId5"/>
-              </a:rPr>
-              <a:t>://</a:t>
-            </a:r>
-            <a:r>
-              <a:rPr lang="en" sz="1400" u="sng" dirty="0" smtClean="0">
-                <a:solidFill>
-                  <a:schemeClr val="hlink"/>
-                </a:solidFill>
-                <a:hlinkClick r:id="rId5"/>
-              </a:rPr>
-              <a:t>arduino.cc/en/Tutorial/Debounce</a:t>
-            </a:r>
-            <a:endParaRPr lang="en-US" sz="1400" u="sng" dirty="0" smtClean="0">
-              <a:solidFill>
-                <a:schemeClr val="hlink"/>
-              </a:solidFill>
-            </a:endParaRPr>
-          </a:p>
-          <a:p>
-            <a:pPr marL="171450" lvl="0" indent="-171450">
-              <a:buFont typeface="Arial"/>
-              <a:buChar char="•"/>
-            </a:pPr>
-            <a:r>
-              <a:rPr lang="en" sz="1400" u="sng" dirty="0" smtClean="0">
-                <a:solidFill>
-                  <a:schemeClr val="hlink"/>
-                </a:solidFill>
-                <a:hlinkClick r:id="rId6"/>
-              </a:rPr>
-              <a:t>http</a:t>
-            </a:r>
-            <a:r>
-              <a:rPr lang="en" sz="1400" u="sng" dirty="0">
-                <a:solidFill>
-                  <a:schemeClr val="hlink"/>
-                </a:solidFill>
-                <a:hlinkClick r:id="rId6"/>
-              </a:rPr>
-              <a:t>://</a:t>
-            </a:r>
-            <a:r>
-              <a:rPr lang="en" sz="1400" u="sng" dirty="0" smtClean="0">
-                <a:solidFill>
-                  <a:schemeClr val="hlink"/>
-                </a:solidFill>
-                <a:hlinkClick r:id="rId6"/>
-              </a:rPr>
-              <a:t>www.engscope.com/pic-example-codes/basic-io-button-debounce/</a:t>
-            </a:r>
-            <a:endParaRPr lang="en-US" sz="1400" u="sng" dirty="0" smtClean="0">
-              <a:solidFill>
-                <a:schemeClr val="hlink"/>
-              </a:solidFill>
-            </a:endParaRPr>
-          </a:p>
-          <a:p>
-            <a:pPr marL="171450" lvl="0" indent="-171450">
-              <a:buFont typeface="Arial"/>
-              <a:buChar char="•"/>
-            </a:pPr>
-            <a:r>
-              <a:rPr lang="en" sz="1400" u="sng" dirty="0" smtClean="0">
-                <a:solidFill>
-                  <a:schemeClr val="hlink"/>
-                </a:solidFill>
-                <a:hlinkClick r:id="rId7"/>
-              </a:rPr>
-              <a:t>http</a:t>
-            </a:r>
-            <a:r>
-              <a:rPr lang="en" sz="1400" u="sng" dirty="0">
-                <a:solidFill>
-                  <a:schemeClr val="hlink"/>
-                </a:solidFill>
-                <a:hlinkClick r:id="rId7"/>
-              </a:rPr>
-              <a:t>://</a:t>
-            </a:r>
-            <a:r>
-              <a:rPr lang="en" sz="1400" u="sng" dirty="0" smtClean="0">
-                <a:solidFill>
-                  <a:schemeClr val="hlink"/>
-                </a:solidFill>
-                <a:hlinkClick r:id="rId7"/>
-              </a:rPr>
-              <a:t>learn.adafruit.com/tilt-sensor/using-a-tilt-sensor</a:t>
-            </a:r>
-            <a:endParaRPr lang="en-US" sz="1400" dirty="0" smtClean="0"/>
-          </a:p>
-          <a:p>
-            <a:pPr lvl="0"/>
-            <a:r>
-              <a:rPr lang="en" sz="1400" b="1" dirty="0" smtClean="0"/>
-              <a:t>Pulse-width modulation</a:t>
-            </a:r>
-            <a:endParaRPr lang="en-US" sz="1400" b="1" dirty="0" smtClean="0"/>
-          </a:p>
-          <a:p>
-            <a:pPr marL="171450" lvl="0" indent="-171450">
-              <a:buFont typeface="Arial"/>
-              <a:buChar char="•"/>
-            </a:pPr>
-            <a:r>
-              <a:rPr lang="en" sz="1400" u="sng" dirty="0" smtClean="0">
-                <a:solidFill>
-                  <a:schemeClr val="hlink"/>
-                </a:solidFill>
-                <a:hlinkClick r:id="rId8"/>
-              </a:rPr>
-              <a:t>http://arduino.cc/en/Tutorial/PWM</a:t>
-            </a:r>
-            <a:endParaRPr lang="en-US" sz="1400" u="sng" dirty="0" smtClean="0">
-              <a:solidFill>
-                <a:schemeClr val="hlink"/>
-              </a:solidFill>
-            </a:endParaRPr>
-          </a:p>
-          <a:p>
-            <a:pPr marL="171450" lvl="0" indent="-171450">
-              <a:buFont typeface="Arial"/>
-              <a:buChar char="•"/>
-            </a:pPr>
-            <a:r>
-              <a:rPr lang="en" sz="1400" u="sng" dirty="0" smtClean="0">
-                <a:solidFill>
-                  <a:schemeClr val="hlink"/>
-                </a:solidFill>
-              </a:rPr>
-              <a:t>http</a:t>
-            </a:r>
-            <a:r>
-              <a:rPr lang="en" sz="1400" u="sng" dirty="0">
-                <a:solidFill>
-                  <a:schemeClr val="hlink"/>
-                </a:solidFill>
-              </a:rPr>
-              <a:t>://www.protostack.com/blog/2011/06/atmega168a-pulse-width-modulation-pwm</a:t>
-            </a:r>
-            <a:r>
-              <a:rPr lang="en" sz="1400" u="sng" dirty="0" smtClean="0">
-                <a:solidFill>
-                  <a:schemeClr val="hlink"/>
-                </a:solidFill>
-              </a:rPr>
-              <a:t>/</a:t>
-            </a:r>
-            <a:endParaRPr lang="en-US" sz="1400" u="sng" dirty="0" smtClean="0">
-              <a:solidFill>
-                <a:schemeClr val="hlink"/>
-              </a:solidFill>
-            </a:endParaRPr>
-          </a:p>
-          <a:p>
-            <a:r>
-              <a:rPr lang="en-US" sz="1400" b="1" dirty="0" smtClean="0"/>
-              <a:t>Pull-up and pull-down resistors</a:t>
-            </a:r>
-            <a:endParaRPr lang="en" sz="1400" u="sng" dirty="0">
-              <a:solidFill>
-                <a:schemeClr val="hlink"/>
-              </a:solidFill>
-              <a:hlinkClick r:id="rId9"/>
-            </a:endParaRPr>
-          </a:p>
-          <a:p>
-            <a:pPr marL="285750" lvl="0" indent="-285750">
-              <a:buFont typeface="Arial"/>
-              <a:buChar char="•"/>
-            </a:pPr>
-            <a:r>
-              <a:rPr lang="en" sz="1400" u="sng" dirty="0">
-                <a:solidFill>
-                  <a:schemeClr val="hlink"/>
-                </a:solidFill>
-              </a:rPr>
-              <a:t>https://learn.sparkfun.com/tutorials/pull-up-resistors</a:t>
-            </a:r>
-            <a:endParaRPr lang="en" sz="1400" u="sng" dirty="0">
-              <a:solidFill>
-                <a:schemeClr val="hlink"/>
-              </a:solidFill>
-              <a:hlinkClick r:id="rId9"/>
-            </a:endParaRPr>
-          </a:p>
-          <a:p>
-            <a:pPr lvl="1"/>
-            <a:endParaRPr lang="en-US" sz="1400" dirty="0" smtClean="0"/>
-          </a:p>
-          <a:p>
-            <a:endParaRPr lang="en-US" sz="1400" dirty="0"/>
+              <a:rPr lang="en-US" dirty="0" smtClean="0"/>
+              <a:t>Vibe Board (Pin 3)</a:t>
+            </a:r>
+            <a:endParaRPr lang="en-US" dirty="0"/>
           </a:p>
         </p:txBody>
       </p:sp>
@@ -5963,7 +5634,7 @@
     </p:spTree>
     <p:extLst>
       <p:ext uri="{BB962C8B-B14F-4D97-AF65-F5344CB8AC3E}">
-        <p14:creationId xmlns:p14="http://schemas.microsoft.com/office/powerpoint/2010/main" val="3739796446"/>
+        <p14:creationId xmlns:p14="http://schemas.microsoft.com/office/powerpoint/2010/main" val="1177392317"/>
       </p:ext>
     </p:extLst>
   </p:cSld>
@@ -5977,6 +5648,225 @@
       </p:par>
     </p:tnLst>
   </p:timing>
+</p:sld>
+</file>
+
+<file path=ppt/slides/slide19.xml><?xml version="1.0" encoding="utf-8"?>
+<p:sld xmlns:a="http://schemas.openxmlformats.org/drawingml/2006/main" xmlns:r="http://schemas.openxmlformats.org/officeDocument/2006/relationships" xmlns:p="http://schemas.openxmlformats.org/presentationml/2006/main">
+  <p:cSld>
+    <p:spTree>
+      <p:nvGrpSpPr>
+        <p:cNvPr id="1" name=""/>
+        <p:cNvGrpSpPr/>
+        <p:nvPr/>
+      </p:nvGrpSpPr>
+      <p:grpSpPr>
+        <a:xfrm>
+          <a:off x="0" y="0"/>
+          <a:ext cx="0" cy="0"/>
+          <a:chOff x="0" y="0"/>
+          <a:chExt cx="0" cy="0"/>
+        </a:xfrm>
+      </p:grpSpPr>
+      <p:sp>
+        <p:nvSpPr>
+          <p:cNvPr id="2" name="Title 1"/>
+          <p:cNvSpPr>
+            <a:spLocks noGrp="1"/>
+          </p:cNvSpPr>
+          <p:nvPr>
+            <p:ph type="title"/>
+          </p:nvPr>
+        </p:nvSpPr>
+        <p:spPr/>
+        <p:txBody>
+          <a:bodyPr>
+            <a:normAutofit fontScale="90000"/>
+          </a:bodyPr>
+          <a:lstStyle/>
+          <a:p>
+            <a:r>
+              <a:rPr lang="en-US" dirty="0" smtClean="0"/>
+              <a:t>Resources</a:t>
+            </a:r>
+            <a:endParaRPr lang="en-US" dirty="0"/>
+          </a:p>
+        </p:txBody>
+      </p:sp>
+      <p:sp>
+        <p:nvSpPr>
+          <p:cNvPr id="3" name="Content Placeholder 2"/>
+          <p:cNvSpPr>
+            <a:spLocks noGrp="1"/>
+          </p:cNvSpPr>
+          <p:nvPr>
+            <p:ph idx="1"/>
+          </p:nvPr>
+        </p:nvSpPr>
+        <p:spPr>
+          <a:xfrm>
+            <a:off x="1739290" y="1360469"/>
+            <a:ext cx="12273054" cy="5715019"/>
+          </a:xfrm>
+        </p:spPr>
+        <p:txBody>
+          <a:bodyPr>
+            <a:normAutofit/>
+          </a:bodyPr>
+          <a:lstStyle/>
+          <a:p>
+            <a:r>
+              <a:rPr lang="en-US" sz="3100" b="1" dirty="0" err="1"/>
+              <a:t>Github</a:t>
+            </a:r>
+            <a:r>
+              <a:rPr lang="en-US" sz="3100" b="1" dirty="0"/>
+              <a:t> link with code and slides</a:t>
+            </a:r>
+          </a:p>
+          <a:p>
+            <a:pPr marL="571500" indent="-571500">
+              <a:buFont typeface="Arial"/>
+              <a:buChar char="•"/>
+            </a:pPr>
+            <a:r>
+              <a:rPr lang="en-US" sz="3100" dirty="0">
+                <a:hlinkClick r:id="rId2"/>
+              </a:rPr>
+              <a:t>https://github.com/outofjungle/YahooOpenHack2013</a:t>
+            </a:r>
+            <a:endParaRPr lang="en-US" sz="3100" dirty="0"/>
+          </a:p>
+          <a:p>
+            <a:r>
+              <a:rPr lang="en-US" sz="3100" b="1" dirty="0" err="1"/>
+              <a:t>Arduino</a:t>
+            </a:r>
+            <a:r>
+              <a:rPr lang="en-US" sz="3100" b="1" dirty="0"/>
+              <a:t> Documentation</a:t>
+            </a:r>
+          </a:p>
+          <a:p>
+            <a:pPr marL="571500" indent="-571500">
+              <a:buFont typeface="Arial"/>
+              <a:buChar char="•"/>
+            </a:pPr>
+            <a:r>
+              <a:rPr lang="en-US" sz="3100" dirty="0">
+                <a:hlinkClick r:id="rId3"/>
+              </a:rPr>
+              <a:t>http://arduino.cc/en/Reference/HomePage</a:t>
+            </a:r>
+            <a:endParaRPr lang="en-US" sz="3100" dirty="0"/>
+          </a:p>
+          <a:p>
+            <a:r>
+              <a:rPr lang="en-US" sz="3100" b="1" dirty="0" err="1"/>
+              <a:t>Lilypad</a:t>
+            </a:r>
+            <a:r>
+              <a:rPr lang="en-US" sz="3100" b="1" dirty="0"/>
+              <a:t> </a:t>
+            </a:r>
+            <a:r>
+              <a:rPr lang="en-US" sz="3100" b="1" dirty="0" err="1"/>
+              <a:t>Arduino</a:t>
+            </a:r>
+            <a:r>
+              <a:rPr lang="en-US" sz="3100" b="1" dirty="0"/>
+              <a:t> Reference</a:t>
+            </a:r>
+          </a:p>
+          <a:p>
+            <a:pPr marL="571500" indent="-571500">
+              <a:buFont typeface="Arial"/>
+              <a:buChar char="•"/>
+            </a:pPr>
+            <a:r>
+              <a:rPr lang="en-US" sz="3100" dirty="0">
+                <a:hlinkClick r:id="rId4"/>
+              </a:rPr>
+              <a:t>http://lilypadarduino.org/</a:t>
+            </a:r>
+            <a:endParaRPr lang="en-US" sz="3100" dirty="0"/>
+          </a:p>
+          <a:p>
+            <a:r>
+              <a:rPr lang="en-US" sz="3100" b="1" dirty="0" err="1"/>
+              <a:t>Lilypad</a:t>
+            </a:r>
+            <a:r>
+              <a:rPr lang="en-US" sz="3100" b="1" dirty="0"/>
+              <a:t> </a:t>
+            </a:r>
+            <a:r>
+              <a:rPr lang="en-US" sz="3100" b="1" dirty="0" err="1"/>
+              <a:t>ProtoSnap</a:t>
+            </a:r>
+            <a:r>
+              <a:rPr lang="en-US" sz="3100" b="1" dirty="0"/>
+              <a:t> Schematics</a:t>
+            </a:r>
+          </a:p>
+          <a:p>
+            <a:pPr marL="571500" indent="-571500">
+              <a:buFont typeface="Arial"/>
+              <a:buChar char="•"/>
+            </a:pPr>
+            <a:r>
+              <a:rPr lang="en-US" sz="3100" dirty="0">
+                <a:hlinkClick r:id="rId5"/>
+              </a:rPr>
+              <a:t>http://dlnmh9ip6v2uc.cloudfront.net/datasheets/E-Textiles/Lilypad/LilyPad-Dev-v34b.pdf</a:t>
+            </a:r>
+            <a:endParaRPr lang="en-US" sz="3100" u="sng" dirty="0">
+              <a:solidFill>
+                <a:schemeClr val="hlink"/>
+              </a:solidFill>
+            </a:endParaRPr>
+          </a:p>
+          <a:p>
+            <a:endParaRPr lang="en-US" sz="3100" dirty="0"/>
+          </a:p>
+          <a:p>
+            <a:endParaRPr lang="en-US" sz="3100" dirty="0"/>
+          </a:p>
+        </p:txBody>
+      </p:sp>
+      <p:sp>
+        <p:nvSpPr>
+          <p:cNvPr id="4" name="Slide Number Placeholder 3"/>
+          <p:cNvSpPr>
+            <a:spLocks noGrp="1"/>
+          </p:cNvSpPr>
+          <p:nvPr>
+            <p:ph type="sldNum" sz="quarter" idx="12"/>
+          </p:nvPr>
+        </p:nvSpPr>
+        <p:spPr/>
+        <p:txBody>
+          <a:bodyPr/>
+          <a:lstStyle/>
+          <a:p>
+            <a:fld id="{B2ACCBA8-5022-9E46-8DEA-AF9CA5E1705D}" type="slidenum">
+              <a:rPr lang="en-US" smtClean="0"/>
+              <a:t>19</a:t>
+            </a:fld>
+            <a:endParaRPr lang="en-US"/>
+          </a:p>
+        </p:txBody>
+      </p:sp>
+    </p:spTree>
+    <p:extLst>
+      <p:ext uri="{BB962C8B-B14F-4D97-AF65-F5344CB8AC3E}">
+        <p14:creationId xmlns:p14="http://schemas.microsoft.com/office/powerpoint/2010/main" val="3913090316"/>
+      </p:ext>
+    </p:extLst>
+  </p:cSld>
+  <p:clrMapOvr>
+    <a:masterClrMapping/>
+  </p:clrMapOvr>
 </p:sld>
 </file>
 
@@ -6009,6 +5899,266 @@
       </p:par>
     </p:tnLst>
   </p:timing>
+</p:sld>
+</file>
+
+<file path=ppt/slides/slide20.xml><?xml version="1.0" encoding="utf-8"?>
+<p:sld xmlns:a="http://schemas.openxmlformats.org/drawingml/2006/main" xmlns:r="http://schemas.openxmlformats.org/officeDocument/2006/relationships" xmlns:p="http://schemas.openxmlformats.org/presentationml/2006/main">
+  <p:cSld>
+    <p:spTree>
+      <p:nvGrpSpPr>
+        <p:cNvPr id="1" name=""/>
+        <p:cNvGrpSpPr/>
+        <p:nvPr/>
+      </p:nvGrpSpPr>
+      <p:grpSpPr>
+        <a:xfrm>
+          <a:off x="0" y="0"/>
+          <a:ext cx="0" cy="0"/>
+          <a:chOff x="0" y="0"/>
+          <a:chExt cx="0" cy="0"/>
+        </a:xfrm>
+      </p:grpSpPr>
+      <p:sp>
+        <p:nvSpPr>
+          <p:cNvPr id="2" name="Title 1"/>
+          <p:cNvSpPr>
+            <a:spLocks noGrp="1"/>
+          </p:cNvSpPr>
+          <p:nvPr>
+            <p:ph type="title"/>
+          </p:nvPr>
+        </p:nvSpPr>
+        <p:spPr/>
+        <p:txBody>
+          <a:bodyPr>
+            <a:normAutofit fontScale="90000"/>
+          </a:bodyPr>
+          <a:lstStyle/>
+          <a:p>
+            <a:r>
+              <a:rPr lang="en-US" dirty="0" smtClean="0"/>
+              <a:t>Resources (cont.)</a:t>
+            </a:r>
+            <a:endParaRPr lang="en-US" dirty="0"/>
+          </a:p>
+        </p:txBody>
+      </p:sp>
+      <p:sp>
+        <p:nvSpPr>
+          <p:cNvPr id="3" name="Content Placeholder 2"/>
+          <p:cNvSpPr>
+            <a:spLocks noGrp="1"/>
+          </p:cNvSpPr>
+          <p:nvPr>
+            <p:ph idx="1"/>
+          </p:nvPr>
+        </p:nvSpPr>
+        <p:spPr>
+          <a:xfrm>
+            <a:off x="1753094" y="1360469"/>
+            <a:ext cx="12259250" cy="5715019"/>
+          </a:xfrm>
+        </p:spPr>
+        <p:txBody>
+          <a:bodyPr>
+            <a:normAutofit fontScale="77500" lnSpcReduction="20000"/>
+          </a:bodyPr>
+          <a:lstStyle/>
+          <a:p>
+            <a:pPr lvl="0"/>
+            <a:r>
+              <a:rPr lang="en" b="1" dirty="0" smtClean="0"/>
+              <a:t>Debouncing</a:t>
+            </a:r>
+            <a:endParaRPr lang="en-US" b="1" dirty="0"/>
+          </a:p>
+          <a:p>
+            <a:pPr marL="571500" lvl="0" indent="-571500">
+              <a:buFont typeface="Arial"/>
+              <a:buChar char="•"/>
+            </a:pPr>
+            <a:r>
+              <a:rPr lang="en" u="sng" dirty="0" smtClean="0">
+                <a:solidFill>
+                  <a:schemeClr val="hlink"/>
+                </a:solidFill>
+                <a:hlinkClick r:id="rId2"/>
+              </a:rPr>
+              <a:t>http://arduino.cc/en/Tutorial/Debounce</a:t>
+            </a:r>
+            <a:endParaRPr lang="en-US" u="sng" dirty="0" smtClean="0">
+              <a:solidFill>
+                <a:schemeClr val="hlink"/>
+              </a:solidFill>
+            </a:endParaRPr>
+          </a:p>
+          <a:p>
+            <a:pPr marL="571500" lvl="0" indent="-571500">
+              <a:buFont typeface="Arial"/>
+              <a:buChar char="•"/>
+            </a:pPr>
+            <a:r>
+              <a:rPr lang="en" u="sng" dirty="0" smtClean="0">
+                <a:solidFill>
+                  <a:schemeClr val="hlink"/>
+                </a:solidFill>
+                <a:hlinkClick r:id="rId3"/>
+              </a:rPr>
+              <a:t>http</a:t>
+            </a:r>
+            <a:r>
+              <a:rPr lang="en" u="sng" dirty="0">
+                <a:solidFill>
+                  <a:schemeClr val="hlink"/>
+                </a:solidFill>
+                <a:hlinkClick r:id="rId3"/>
+              </a:rPr>
+              <a:t>://www.engscope.com/pic-example-codes/basic-io-button-debounce/</a:t>
+            </a:r>
+            <a:endParaRPr lang="en-US" u="sng" dirty="0">
+              <a:solidFill>
+                <a:schemeClr val="hlink"/>
+              </a:solidFill>
+            </a:endParaRPr>
+          </a:p>
+          <a:p>
+            <a:pPr marL="571500" lvl="0" indent="-571500">
+              <a:buFont typeface="Arial"/>
+              <a:buChar char="•"/>
+            </a:pPr>
+            <a:r>
+              <a:rPr lang="en" u="sng" dirty="0" smtClean="0">
+                <a:solidFill>
+                  <a:schemeClr val="hlink"/>
+                </a:solidFill>
+                <a:hlinkClick r:id="rId4"/>
+              </a:rPr>
+              <a:t>http://learn.adafruit.com/tilt-sensor/using-a-tilt-sensor</a:t>
+            </a:r>
+            <a:endParaRPr lang="en-US" dirty="0" smtClean="0"/>
+          </a:p>
+          <a:p>
+            <a:pPr lvl="0"/>
+            <a:r>
+              <a:rPr lang="en" b="1" dirty="0" smtClean="0"/>
+              <a:t>Pulse-width </a:t>
+            </a:r>
+            <a:r>
+              <a:rPr lang="en" b="1" dirty="0"/>
+              <a:t>modulation</a:t>
+            </a:r>
+            <a:endParaRPr lang="en-US" b="1" dirty="0"/>
+          </a:p>
+          <a:p>
+            <a:pPr marL="571500" lvl="0" indent="-571500">
+              <a:buFont typeface="Arial"/>
+              <a:buChar char="•"/>
+            </a:pPr>
+            <a:r>
+              <a:rPr lang="en" u="sng" dirty="0">
+                <a:solidFill>
+                  <a:schemeClr val="hlink"/>
+                </a:solidFill>
+                <a:hlinkClick r:id="rId5"/>
+              </a:rPr>
+              <a:t>http://arduino.cc/en/Tutorial/PWM</a:t>
+            </a:r>
+            <a:endParaRPr lang="en-US" u="sng" dirty="0">
+              <a:solidFill>
+                <a:schemeClr val="hlink"/>
+              </a:solidFill>
+            </a:endParaRPr>
+          </a:p>
+          <a:p>
+            <a:pPr marL="571500" lvl="0" indent="-571500">
+              <a:buFont typeface="Arial"/>
+              <a:buChar char="•"/>
+            </a:pPr>
+            <a:r>
+              <a:rPr lang="en" u="sng" dirty="0">
+                <a:solidFill>
+                  <a:schemeClr val="hlink"/>
+                </a:solidFill>
+              </a:rPr>
+              <a:t>http://www.protostack.com/blog/2011/06/atmega168a-pulse-width-modulation-pwm/</a:t>
+            </a:r>
+            <a:endParaRPr lang="en-US" u="sng" dirty="0">
+              <a:solidFill>
+                <a:schemeClr val="hlink"/>
+              </a:solidFill>
+            </a:endParaRPr>
+          </a:p>
+          <a:p>
+            <a:r>
+              <a:rPr lang="en-US" b="1" dirty="0"/>
+              <a:t>Pull-up and pull-down resistors</a:t>
+            </a:r>
+            <a:endParaRPr lang="en" u="sng" dirty="0">
+              <a:solidFill>
+                <a:schemeClr val="hlink"/>
+              </a:solidFill>
+              <a:hlinkClick r:id="rId6"/>
+            </a:endParaRPr>
+          </a:p>
+          <a:p>
+            <a:pPr marL="571500" lvl="0" indent="-571500">
+              <a:buFont typeface="Arial"/>
+              <a:buChar char="•"/>
+            </a:pPr>
+            <a:r>
+              <a:rPr lang="en" u="sng" dirty="0">
+                <a:solidFill>
+                  <a:schemeClr val="hlink"/>
+                </a:solidFill>
+                <a:hlinkClick r:id="rId7"/>
+              </a:rPr>
+              <a:t>https://learn.sparkfun.com/tutorials/pull-up-resistors</a:t>
+            </a:r>
+            <a:endParaRPr lang="en-US" u="sng" dirty="0">
+              <a:solidFill>
+                <a:schemeClr val="hlink"/>
+              </a:solidFill>
+            </a:endParaRPr>
+          </a:p>
+          <a:p>
+            <a:endParaRPr lang="en-US" dirty="0"/>
+          </a:p>
+        </p:txBody>
+      </p:sp>
+      <p:sp>
+        <p:nvSpPr>
+          <p:cNvPr id="4" name="Slide Number Placeholder 3"/>
+          <p:cNvSpPr>
+            <a:spLocks noGrp="1"/>
+          </p:cNvSpPr>
+          <p:nvPr>
+            <p:ph type="sldNum" sz="quarter" idx="12"/>
+          </p:nvPr>
+        </p:nvSpPr>
+        <p:spPr/>
+        <p:txBody>
+          <a:bodyPr/>
+          <a:lstStyle/>
+          <a:p>
+            <a:fld id="{B2ACCBA8-5022-9E46-8DEA-AF9CA5E1705D}" type="slidenum">
+              <a:rPr lang="en-US" smtClean="0"/>
+              <a:t>20</a:t>
+            </a:fld>
+            <a:endParaRPr lang="en-US"/>
+          </a:p>
+        </p:txBody>
+      </p:sp>
+    </p:spTree>
+    <p:extLst>
+      <p:ext uri="{BB962C8B-B14F-4D97-AF65-F5344CB8AC3E}">
+        <p14:creationId xmlns:p14="http://schemas.microsoft.com/office/powerpoint/2010/main" val="2565797595"/>
+      </p:ext>
+    </p:extLst>
+  </p:cSld>
+  <p:clrMapOvr>
+    <a:masterClrMapping/>
+  </p:clrMapOvr>
 </p:sld>
 </file>
 
@@ -6149,6 +6299,180 @@
       </p:grpSpPr>
       <p:sp>
         <p:nvSpPr>
+          <p:cNvPr id="2" name="Title 1"/>
+          <p:cNvSpPr>
+            <a:spLocks noGrp="1"/>
+          </p:cNvSpPr>
+          <p:nvPr>
+            <p:ph type="title"/>
+          </p:nvPr>
+        </p:nvSpPr>
+        <p:spPr/>
+        <p:txBody>
+          <a:bodyPr>
+            <a:normAutofit fontScale="90000"/>
+          </a:bodyPr>
+          <a:lstStyle/>
+          <a:p>
+            <a:r>
+              <a:rPr lang="en-US" dirty="0" smtClean="0"/>
+              <a:t>Setup</a:t>
+            </a:r>
+            <a:endParaRPr lang="en-US" dirty="0"/>
+          </a:p>
+        </p:txBody>
+      </p:sp>
+      <p:sp>
+        <p:nvSpPr>
+          <p:cNvPr id="3" name="Content Placeholder 2"/>
+          <p:cNvSpPr>
+            <a:spLocks noGrp="1"/>
+          </p:cNvSpPr>
+          <p:nvPr>
+            <p:ph idx="1"/>
+          </p:nvPr>
+        </p:nvSpPr>
+        <p:spPr/>
+        <p:txBody>
+          <a:bodyPr/>
+          <a:lstStyle/>
+          <a:p>
+            <a:pPr marL="571500" indent="-571500">
+              <a:buFont typeface="Arial"/>
+              <a:buChar char="•"/>
+            </a:pPr>
+            <a:r>
+              <a:rPr lang="en-US" dirty="0" smtClean="0"/>
+              <a:t>Install </a:t>
+            </a:r>
+            <a:r>
+              <a:rPr lang="en-US" dirty="0" err="1" smtClean="0"/>
+              <a:t>Arduino</a:t>
+            </a:r>
+            <a:r>
+              <a:rPr lang="en-US" dirty="0" smtClean="0"/>
+              <a:t> IDE </a:t>
+            </a:r>
+            <a:r>
+              <a:rPr lang="en-US" dirty="0"/>
+              <a:t>from </a:t>
+            </a:r>
+            <a:r>
+              <a:rPr lang="en-US" dirty="0">
+                <a:hlinkClick r:id="rId2"/>
+              </a:rPr>
+              <a:t>http://arduino.cc/en/Main/</a:t>
+            </a:r>
+            <a:r>
+              <a:rPr lang="en-US" dirty="0" smtClean="0">
+                <a:hlinkClick r:id="rId2"/>
+              </a:rPr>
+              <a:t>Software</a:t>
+            </a:r>
+            <a:endParaRPr lang="en-US" dirty="0" smtClean="0"/>
+          </a:p>
+          <a:p>
+            <a:pPr marL="571500" indent="-571500">
+              <a:buFont typeface="Arial"/>
+              <a:buChar char="•"/>
+            </a:pPr>
+            <a:r>
+              <a:rPr lang="en-US" dirty="0" smtClean="0"/>
+              <a:t>Install FTDI drivers </a:t>
+            </a:r>
+            <a:r>
+              <a:rPr lang="en-US" dirty="0"/>
+              <a:t>from </a:t>
+            </a:r>
+            <a:r>
+              <a:rPr lang="en-US" dirty="0">
+                <a:hlinkClick r:id="rId3"/>
+              </a:rPr>
+              <a:t>http://www.ftdichip.com/Drivers/</a:t>
+            </a:r>
+            <a:r>
+              <a:rPr lang="en-US" dirty="0" smtClean="0">
+                <a:hlinkClick r:id="rId3"/>
+              </a:rPr>
+              <a:t>VCP.htm</a:t>
+            </a:r>
+            <a:endParaRPr lang="en-US" dirty="0" smtClean="0"/>
+          </a:p>
+          <a:p>
+            <a:pPr marL="571500" indent="-571500">
+              <a:buFont typeface="Arial"/>
+              <a:buChar char="•"/>
+            </a:pPr>
+            <a:r>
+              <a:rPr lang="en-US" dirty="0" smtClean="0"/>
+              <a:t>Program </a:t>
+            </a:r>
+            <a:r>
+              <a:rPr lang="en-US" dirty="0" err="1" smtClean="0"/>
+              <a:t>Arduino</a:t>
+            </a:r>
+            <a:r>
+              <a:rPr lang="en-US" dirty="0" smtClean="0"/>
+              <a:t> with example blink sketch</a:t>
+            </a:r>
+          </a:p>
+        </p:txBody>
+      </p:sp>
+      <p:sp>
+        <p:nvSpPr>
+          <p:cNvPr id="4" name="Slide Number Placeholder 3"/>
+          <p:cNvSpPr>
+            <a:spLocks noGrp="1"/>
+          </p:cNvSpPr>
+          <p:nvPr>
+            <p:ph type="sldNum" sz="quarter" idx="12"/>
+          </p:nvPr>
+        </p:nvSpPr>
+        <p:spPr/>
+        <p:txBody>
+          <a:bodyPr/>
+          <a:lstStyle/>
+          <a:p>
+            <a:fld id="{B2ACCBA8-5022-9E46-8DEA-AF9CA5E1705D}" type="slidenum">
+              <a:rPr lang="en-US" smtClean="0"/>
+              <a:t>4</a:t>
+            </a:fld>
+            <a:endParaRPr lang="en-US"/>
+          </a:p>
+        </p:txBody>
+      </p:sp>
+    </p:spTree>
+    <p:extLst>
+      <p:ext uri="{BB962C8B-B14F-4D97-AF65-F5344CB8AC3E}">
+        <p14:creationId xmlns:p14="http://schemas.microsoft.com/office/powerpoint/2010/main" val="1079964077"/>
+      </p:ext>
+    </p:extLst>
+  </p:cSld>
+  <p:clrMapOvr>
+    <a:masterClrMapping/>
+  </p:clrMapOvr>
+</p:sld>
+</file>
+
+<file path=ppt/slides/slide5.xml><?xml version="1.0" encoding="utf-8"?>
+<p:sld xmlns:a="http://schemas.openxmlformats.org/drawingml/2006/main" xmlns:r="http://schemas.openxmlformats.org/officeDocument/2006/relationships" xmlns:p="http://schemas.openxmlformats.org/presentationml/2006/main">
+  <p:cSld>
+    <p:spTree>
+      <p:nvGrpSpPr>
+        <p:cNvPr id="1" name=""/>
+        <p:cNvGrpSpPr/>
+        <p:nvPr/>
+      </p:nvGrpSpPr>
+      <p:grpSpPr>
+        <a:xfrm>
+          <a:off x="0" y="0"/>
+          <a:ext cx="0" cy="0"/>
+          <a:chOff x="0" y="0"/>
+          <a:chExt cx="0" cy="0"/>
+        </a:xfrm>
+      </p:grpSpPr>
+      <p:sp>
+        <p:nvSpPr>
           <p:cNvPr id="8" name="Title 7"/>
           <p:cNvSpPr>
             <a:spLocks noGrp="1"/>
@@ -6215,7 +6539,7 @@
           <a:p>
             <a:fld id="{B2ACCBA8-5022-9E46-8DEA-AF9CA5E1705D}" type="slidenum">
               <a:rPr lang="en-US" smtClean="0"/>
-              <a:t>4</a:t>
+              <a:t>5</a:t>
             </a:fld>
             <a:endParaRPr lang="en-US"/>
           </a:p>
@@ -6271,7 +6595,7 @@
 </p:sld>
 </file>
 
-<file path=ppt/slides/slide5.xml><?xml version="1.0" encoding="utf-8"?>
+<file path=ppt/slides/slide6.xml><?xml version="1.0" encoding="utf-8"?>
 <p:sld xmlns:a="http://schemas.openxmlformats.org/drawingml/2006/main" xmlns:r="http://schemas.openxmlformats.org/officeDocument/2006/relationships" xmlns:p="http://schemas.openxmlformats.org/presentationml/2006/main">
   <p:cSld>
     <p:spTree>
@@ -6306,11 +6630,11 @@
           <a:lstStyle/>
           <a:p>
             <a:r>
-              <a:rPr lang="en-US" smtClean="0"/>
+              <a:rPr lang="en-US" dirty="0" smtClean="0"/>
               <a:t>Wiring </a:t>
             </a:r>
             <a:r>
-              <a:rPr lang="en-US" smtClean="0"/>
+              <a:rPr lang="en-US" dirty="0" smtClean="0"/>
               <a:t>an </a:t>
             </a:r>
             <a:r>
@@ -6338,7 +6662,7 @@
           <a:p>
             <a:fld id="{B2ACCBA8-5022-9E46-8DEA-AF9CA5E1705D}" type="slidenum">
               <a:rPr lang="en-US" smtClean="0"/>
-              <a:t>5</a:t>
+              <a:t>6</a:t>
             </a:fld>
             <a:endParaRPr lang="en-US"/>
           </a:p>
@@ -6394,7 +6718,7 @@
 </p:sld>
 </file>
 
-<file path=ppt/slides/slide6.xml><?xml version="1.0" encoding="utf-8"?>
+<file path=ppt/slides/slide7.xml><?xml version="1.0" encoding="utf-8"?>
 <p:sld xmlns:a="http://schemas.openxmlformats.org/drawingml/2006/main" xmlns:r="http://schemas.openxmlformats.org/officeDocument/2006/relationships" xmlns:p="http://schemas.openxmlformats.org/presentationml/2006/main">
   <p:cSld>
     <p:spTree>
@@ -6507,7 +6831,7 @@
 </p:sld>
 </file>
 
-<file path=ppt/slides/slide7.xml><?xml version="1.0" encoding="utf-8"?>
+<file path=ppt/slides/slide8.xml><?xml version="1.0" encoding="utf-8"?>
 <p:sld xmlns:a="http://schemas.openxmlformats.org/drawingml/2006/main" xmlns:r="http://schemas.openxmlformats.org/officeDocument/2006/relationships" xmlns:p="http://schemas.openxmlformats.org/presentationml/2006/main">
   <p:cSld>
     <p:spTree>
@@ -6599,150 +6923,6 @@
     <p:extLst>
       <p:ext uri="{BB962C8B-B14F-4D97-AF65-F5344CB8AC3E}">
         <p14:creationId xmlns:p14="http://schemas.microsoft.com/office/powerpoint/2010/main" val="4258351197"/>
-      </p:ext>
-    </p:extLst>
-  </p:cSld>
-  <p:clrMapOvr>
-    <a:masterClrMapping/>
-  </p:clrMapOvr>
-  <p:timing>
-    <p:tnLst>
-      <p:par>
-        <p:cTn xmlns:p14="http://schemas.microsoft.com/office/powerpoint/2010/main" id="1" dur="indefinite" restart="never" nodeType="tmRoot"/>
-      </p:par>
-    </p:tnLst>
-  </p:timing>
-</p:sld>
-</file>
-
-<file path=ppt/slides/slide8.xml><?xml version="1.0" encoding="utf-8"?>
-<p:sld xmlns:a="http://schemas.openxmlformats.org/drawingml/2006/main" xmlns:r="http://schemas.openxmlformats.org/officeDocument/2006/relationships" xmlns:p="http://schemas.openxmlformats.org/presentationml/2006/main">
-  <p:cSld>
-    <p:spTree>
-      <p:nvGrpSpPr>
-        <p:cNvPr id="1" name=""/>
-        <p:cNvGrpSpPr/>
-        <p:nvPr/>
-      </p:nvGrpSpPr>
-      <p:grpSpPr>
-        <a:xfrm>
-          <a:off x="0" y="0"/>
-          <a:ext cx="0" cy="0"/>
-          <a:chOff x="0" y="0"/>
-          <a:chExt cx="0" cy="0"/>
-        </a:xfrm>
-      </p:grpSpPr>
-      <p:sp>
-        <p:nvSpPr>
-          <p:cNvPr id="2" name="Title 1"/>
-          <p:cNvSpPr>
-            <a:spLocks noGrp="1"/>
-          </p:cNvSpPr>
-          <p:nvPr>
-            <p:ph type="title"/>
-          </p:nvPr>
-        </p:nvSpPr>
-        <p:spPr/>
-        <p:txBody>
-          <a:bodyPr>
-            <a:normAutofit fontScale="90000"/>
-          </a:bodyPr>
-          <a:lstStyle/>
-          <a:p>
-            <a:r>
-              <a:rPr lang="en" dirty="0"/>
-              <a:t>Why Debounce?</a:t>
-            </a:r>
-            <a:endParaRPr lang="en-US" dirty="0"/>
-          </a:p>
-        </p:txBody>
-      </p:sp>
-      <p:sp>
-        <p:nvSpPr>
-          <p:cNvPr id="3" name="Content Placeholder 2"/>
-          <p:cNvSpPr>
-            <a:spLocks noGrp="1"/>
-          </p:cNvSpPr>
-          <p:nvPr>
-            <p:ph idx="1"/>
-          </p:nvPr>
-        </p:nvSpPr>
-        <p:spPr/>
-        <p:txBody>
-          <a:bodyPr/>
-          <a:lstStyle/>
-          <a:p>
-            <a:pPr marL="457200" lvl="0" indent="-419100">
-              <a:buClr>
-                <a:schemeClr val="dk1"/>
-              </a:buClr>
-              <a:buSzPct val="166666"/>
-              <a:buFont typeface="Arial"/>
-              <a:buChar char="•"/>
-            </a:pPr>
-            <a:r>
-              <a:rPr lang="en" dirty="0"/>
-              <a:t>Switches are not perfect</a:t>
-            </a:r>
-          </a:p>
-          <a:p>
-            <a:pPr marL="457200" lvl="0" indent="-419100">
-              <a:buClr>
-                <a:schemeClr val="dk1"/>
-              </a:buClr>
-              <a:buSzPct val="166666"/>
-              <a:buFont typeface="Arial"/>
-              <a:buChar char="•"/>
-            </a:pPr>
-            <a:r>
-              <a:rPr lang="en" dirty="0"/>
-              <a:t>The contact connection and disconnect are not clean</a:t>
-            </a:r>
-          </a:p>
-          <a:p>
-            <a:pPr marL="457200" lvl="0" indent="-419100">
-              <a:buClr>
-                <a:schemeClr val="dk1"/>
-              </a:buClr>
-              <a:buSzPct val="166666"/>
-              <a:buFont typeface="Arial"/>
-              <a:buChar char="•"/>
-            </a:pPr>
-            <a:r>
-              <a:rPr lang="en" dirty="0"/>
-              <a:t>Produces a period of instability in the signal</a:t>
-            </a:r>
-            <a:endParaRPr lang="en-US" dirty="0"/>
-          </a:p>
-        </p:txBody>
-      </p:sp>
-      <p:sp>
-        <p:nvSpPr>
-          <p:cNvPr id="4" name="Slide Number Placeholder 3"/>
-          <p:cNvSpPr>
-            <a:spLocks noGrp="1"/>
-          </p:cNvSpPr>
-          <p:nvPr>
-            <p:ph type="sldNum" sz="quarter" idx="12"/>
-          </p:nvPr>
-        </p:nvSpPr>
-        <p:spPr/>
-        <p:txBody>
-          <a:bodyPr/>
-          <a:lstStyle/>
-          <a:p>
-            <a:fld id="{B2ACCBA8-5022-9E46-8DEA-AF9CA5E1705D}" type="slidenum">
-              <a:rPr lang="en-US" smtClean="0"/>
-              <a:t>8</a:t>
-            </a:fld>
-            <a:endParaRPr lang="en-US"/>
-          </a:p>
-        </p:txBody>
-      </p:sp>
-    </p:spTree>
-    <p:extLst>
-      <p:ext uri="{BB962C8B-B14F-4D97-AF65-F5344CB8AC3E}">
-        <p14:creationId xmlns:p14="http://schemas.microsoft.com/office/powerpoint/2010/main" val="2619593168"/>
       </p:ext>
     </p:extLst>
   </p:cSld>
@@ -6795,7 +6975,66 @@
           <a:p>
             <a:r>
               <a:rPr lang="en" dirty="0"/>
-              <a:t>Debouncing an Input</a:t>
+              <a:t>Why Debounce?</a:t>
+            </a:r>
+            <a:endParaRPr lang="en-US" dirty="0"/>
+          </a:p>
+        </p:txBody>
+      </p:sp>
+      <p:sp>
+        <p:nvSpPr>
+          <p:cNvPr id="3" name="Content Placeholder 2"/>
+          <p:cNvSpPr>
+            <a:spLocks noGrp="1"/>
+          </p:cNvSpPr>
+          <p:nvPr>
+            <p:ph idx="1"/>
+          </p:nvPr>
+        </p:nvSpPr>
+        <p:spPr/>
+        <p:txBody>
+          <a:bodyPr/>
+          <a:lstStyle/>
+          <a:p>
+            <a:pPr marL="457200" lvl="0" indent="-419100">
+              <a:buClr>
+                <a:schemeClr val="dk1"/>
+              </a:buClr>
+              <a:buSzPct val="166666"/>
+              <a:buFont typeface="Arial"/>
+              <a:buChar char="•"/>
+            </a:pPr>
+            <a:r>
+              <a:rPr lang="en" dirty="0"/>
+              <a:t>Switches are not perfect</a:t>
+            </a:r>
+          </a:p>
+          <a:p>
+            <a:pPr marL="457200" lvl="0" indent="-419100">
+              <a:buClr>
+                <a:schemeClr val="dk1"/>
+              </a:buClr>
+              <a:buSzPct val="166666"/>
+              <a:buFont typeface="Arial"/>
+              <a:buChar char="•"/>
+            </a:pPr>
+            <a:r>
+              <a:rPr lang="en" dirty="0"/>
+              <a:t>The contact connection and disconnect are not clean</a:t>
+            </a:r>
+          </a:p>
+          <a:p>
+            <a:pPr marL="457200" lvl="0" indent="-419100">
+              <a:buClr>
+                <a:schemeClr val="dk1"/>
+              </a:buClr>
+              <a:buSzPct val="166666"/>
+              <a:buFont typeface="Arial"/>
+              <a:buChar char="•"/>
+            </a:pPr>
+            <a:r>
+              <a:rPr lang="en" dirty="0"/>
+              <a:t>Produces a period of instability in the signal</a:t>
             </a:r>
             <a:endParaRPr lang="en-US" dirty="0"/>
           </a:p>
@@ -6824,35 +7063,10 @@
           </a:p>
         </p:txBody>
       </p:sp>
-      <p:sp>
-        <p:nvSpPr>
-          <p:cNvPr id="5" name="Shape 139"/>
-          <p:cNvSpPr/>
-          <p:nvPr/>
-        </p:nvSpPr>
-        <p:spPr>
-          <a:xfrm>
-            <a:off x="4423407" y="1425513"/>
-            <a:ext cx="6657769" cy="5447266"/>
-          </a:xfrm>
-          <a:prstGeom prst="rect">
-            <a:avLst/>
-          </a:prstGeom>
-          <a:blipFill>
-            <a:blip r:embed="rId2"/>
-            <a:stretch>
-              <a:fillRect/>
-            </a:stretch>
-          </a:blipFill>
-          <a:ln>
-            <a:noFill/>
-          </a:ln>
-        </p:spPr>
-      </p:sp>
     </p:spTree>
     <p:extLst>
       <p:ext uri="{BB962C8B-B14F-4D97-AF65-F5344CB8AC3E}">
-        <p14:creationId xmlns:p14="http://schemas.microsoft.com/office/powerpoint/2010/main" val="3462022439"/>
+        <p14:creationId xmlns:p14="http://schemas.microsoft.com/office/powerpoint/2010/main" val="2619593168"/>
       </p:ext>
     </p:extLst>
   </p:cSld>

</xml_diff>